<commit_message>
Actualizar las notas de la presentación
</commit_message>
<xml_diff>
--- a/Presentacion_SemanaHD2024_MThomae.pptx
+++ b/Presentacion_SemanaHD2024_MThomae.pptx
@@ -531,19 +531,7 @@
           <a:bodyPr/>
           <a:lstStyle/>
           <a:p>
-            <a:r>
-              <a:rPr lang="en-US" dirty="0" err="1"/>
-              <a:t>Exportar</a:t>
-            </a:r>
-            <a:r>
-              <a:rPr lang="en-US" dirty="0"/>
-              <a:t> </a:t>
-            </a:r>
-            <a:r>
-              <a:rPr lang="en-US" dirty="0" err="1"/>
-              <a:t>MusicXML</a:t>
-            </a:r>
-            <a:endParaRPr lang="en-US" dirty="0"/>
+            <a:endParaRPr lang="en-CA" dirty="0"/>
           </a:p>
         </p:txBody>
       </p:sp>
@@ -564,7 +552,7 @@
           <a:p>
             <a:fld id="{F0D413E3-D7D5-FA47-AC82-B3DDF4FE716B}" type="slidenum">
               <a:rPr lang="en-US" smtClean="0"/>
-              <a:t>5</a:t>
+              <a:t>1</a:t>
             </a:fld>
             <a:endParaRPr lang="en-US"/>
           </a:p>
@@ -573,7 +561,7 @@
     </p:spTree>
     <p:extLst>
       <p:ext uri="{BB962C8B-B14F-4D97-AF65-F5344CB8AC3E}">
-        <p14:creationId xmlns:p14="http://schemas.microsoft.com/office/powerpoint/2010/main" val="809090891"/>
+        <p14:creationId xmlns:p14="http://schemas.microsoft.com/office/powerpoint/2010/main" val="65308544"/>
       </p:ext>
     </p:extLst>
   </p:cSld>
@@ -627,482 +615,54 @@
           <a:bodyPr/>
           <a:lstStyle/>
           <a:p>
-            <a:r>
-              <a:rPr lang="es-ES_tradnl" dirty="0" err="1"/>
-              <a:t>Start</a:t>
-            </a:r>
+            <a:pPr marL="171450" indent="-171450">
+              <a:buFontTx/>
+              <a:buChar char="-"/>
+            </a:pPr>
             <a:r>
               <a:rPr lang="es-ES_tradnl" dirty="0"/>
-              <a:t> </a:t>
-            </a:r>
-            <a:r>
-              <a:rPr lang="es-ES_tradnl" dirty="0" err="1"/>
-              <a:t>with</a:t>
-            </a:r>
+              <a:t>Acceso a directrices de MEI</a:t>
+            </a:r>
+          </a:p>
+          <a:p>
+            <a:pPr marL="171450" indent="-171450">
+              <a:buFontTx/>
+              <a:buChar char="-"/>
+            </a:pPr>
             <a:r>
               <a:rPr lang="es-ES_tradnl" dirty="0"/>
-              <a:t> STAFFDEF:</a:t>
+              <a:t>Se puede usar en múltiples idiomas, incluyendo español</a:t>
             </a:r>
           </a:p>
           <a:p>
             <a:pPr marL="171450" indent="-171450">
-              <a:buFont typeface="Arial" panose="020B0604020202020204" pitchFamily="34" charset="0"/>
-              <a:buChar char="•"/>
-            </a:pPr>
-            <a:r>
-              <a:rPr lang="es-ES_tradnl" dirty="0"/>
-              <a:t>n=“1”</a:t>
-            </a:r>
-          </a:p>
-          <a:p>
-            <a:pPr marL="171450" indent="-171450">
-              <a:buFont typeface="Arial" panose="020B0604020202020204" pitchFamily="34" charset="0"/>
-              <a:buChar char="•"/>
-            </a:pPr>
-            <a:r>
-              <a:rPr lang="es-ES_tradnl" dirty="0" err="1"/>
-              <a:t>lines</a:t>
-            </a:r>
-            <a:r>
-              <a:rPr lang="es-ES_tradnl" dirty="0"/>
-              <a:t>=“5”</a:t>
-            </a:r>
-          </a:p>
-          <a:p>
-            <a:pPr marL="171450" indent="-171450">
-              <a:buFont typeface="Arial" panose="020B0604020202020204" pitchFamily="34" charset="0"/>
-              <a:buChar char="•"/>
-            </a:pPr>
-            <a:r>
-              <a:rPr lang="es-ES_tradnl" dirty="0" err="1"/>
-              <a:t>clef</a:t>
-            </a:r>
-            <a:endParaRPr lang="es-ES_tradnl" dirty="0"/>
-          </a:p>
-          <a:p>
-            <a:pPr marL="628650" lvl="1" indent="-171450">
-              <a:buFont typeface="Arial" panose="020B0604020202020204" pitchFamily="34" charset="0"/>
-              <a:buChar char="•"/>
-            </a:pPr>
-            <a:r>
-              <a:rPr lang="es-ES_tradnl" dirty="0"/>
-              <a:t>.</a:t>
-            </a:r>
-            <a:r>
-              <a:rPr lang="es-ES_tradnl" dirty="0" err="1"/>
-              <a:t>shape</a:t>
-            </a:r>
-            <a:r>
-              <a:rPr lang="es-ES_tradnl" dirty="0"/>
-              <a:t>=“G”</a:t>
-            </a:r>
-          </a:p>
-          <a:p>
-            <a:pPr marL="628650" lvl="1" indent="-171450">
-              <a:buFont typeface="Arial" panose="020B0604020202020204" pitchFamily="34" charset="0"/>
-              <a:buChar char="•"/>
-            </a:pPr>
-            <a:r>
-              <a:rPr lang="es-ES_tradnl" dirty="0"/>
-              <a:t>.line=“2”</a:t>
-            </a:r>
-          </a:p>
-          <a:p>
-            <a:pPr marL="628650" lvl="1" indent="-171450">
-              <a:buFont typeface="Arial" panose="020B0604020202020204" pitchFamily="34" charset="0"/>
-              <a:buChar char="•"/>
+              <a:buFontTx/>
+              <a:buChar char="-"/>
             </a:pPr>
             <a:endParaRPr lang="es-ES_tradnl" dirty="0"/>
           </a:p>
           <a:p>
-            <a:pPr marL="171450" lvl="0" indent="-171450">
-              <a:buFont typeface="Arial" panose="020B0604020202020204" pitchFamily="34" charset="0"/>
-              <a:buChar char="•"/>
+            <a:pPr marL="171450" indent="-171450">
+              <a:buFontTx/>
+              <a:buChar char="-"/>
             </a:pPr>
             <a:r>
-              <a:rPr lang="es-ES_tradnl" dirty="0" err="1"/>
-              <a:t>Things</a:t>
-            </a:r>
-            <a:r>
               <a:rPr lang="es-ES_tradnl" dirty="0"/>
-              <a:t> </a:t>
-            </a:r>
-            <a:r>
-              <a:rPr lang="es-ES_tradnl" dirty="0" err="1"/>
-              <a:t>that</a:t>
-            </a:r>
+              <a:t>Abrir ejercicio completo para que vean lo de la renderización, acceso a directrices, español (cuando empecemos verán el auto-completado y validación)</a:t>
+            </a:r>
+          </a:p>
+          <a:p>
+            <a:pPr marL="171450" indent="-171450">
+              <a:buFontTx/>
+              <a:buChar char="-"/>
+            </a:pPr>
             <a:r>
               <a:rPr lang="es-ES_tradnl" dirty="0"/>
-              <a:t> are </a:t>
-            </a:r>
-            <a:r>
-              <a:rPr lang="es-ES_tradnl" dirty="0" err="1"/>
-              <a:t>shared</a:t>
-            </a:r>
-            <a:r>
-              <a:rPr lang="es-ES_tradnl" dirty="0"/>
-              <a:t> </a:t>
-            </a:r>
-            <a:r>
-              <a:rPr lang="es-ES_tradnl" dirty="0" err="1"/>
-              <a:t>with</a:t>
-            </a:r>
-            <a:r>
-              <a:rPr lang="es-ES_tradnl" dirty="0"/>
-              <a:t> </a:t>
-            </a:r>
-            <a:r>
-              <a:rPr lang="es-ES_tradnl" dirty="0" err="1"/>
-              <a:t>all</a:t>
-            </a:r>
-            <a:r>
-              <a:rPr lang="es-ES_tradnl" dirty="0"/>
-              <a:t> </a:t>
-            </a:r>
-            <a:r>
-              <a:rPr lang="es-ES_tradnl" dirty="0" err="1"/>
-              <a:t>staves</a:t>
-            </a:r>
-            <a:r>
-              <a:rPr lang="es-ES_tradnl" dirty="0"/>
-              <a:t>:</a:t>
-            </a:r>
-          </a:p>
-          <a:p>
-            <a:pPr marL="628650" lvl="1" indent="-171450">
-              <a:buFont typeface="Arial" panose="020B0604020202020204" pitchFamily="34" charset="0"/>
-              <a:buChar char="•"/>
-            </a:pPr>
-            <a:r>
-              <a:rPr lang="es-ES_tradnl" dirty="0" err="1"/>
-              <a:t>key.sig</a:t>
-            </a:r>
-            <a:r>
-              <a:rPr lang="es-ES_tradnl" dirty="0"/>
-              <a:t>="1s”  </a:t>
-            </a:r>
-            <a:r>
-              <a:rPr lang="es-ES_tradnl" dirty="0">
-                <a:sym typeface="Wingdings" pitchFamily="2" charset="2"/>
-              </a:rPr>
-              <a:t>  </a:t>
-            </a:r>
-            <a:r>
-              <a:rPr lang="en-CA" b="1" i="0" dirty="0" err="1">
-                <a:solidFill>
-                  <a:srgbClr val="202122"/>
-                </a:solidFill>
-                <a:effectLst/>
-                <a:latin typeface="Arial" panose="020B0604020202020204" pitchFamily="34" charset="0"/>
-              </a:rPr>
-              <a:t>armadura</a:t>
-            </a:r>
-            <a:r>
-              <a:rPr lang="en-CA" b="1" i="0" dirty="0">
-                <a:solidFill>
-                  <a:srgbClr val="202122"/>
-                </a:solidFill>
-                <a:effectLst/>
-                <a:latin typeface="Arial" panose="020B0604020202020204" pitchFamily="34" charset="0"/>
-              </a:rPr>
-              <a:t> de </a:t>
-            </a:r>
-            <a:r>
-              <a:rPr lang="en-CA" b="1" i="0" dirty="0" err="1">
-                <a:solidFill>
-                  <a:srgbClr val="202122"/>
-                </a:solidFill>
-                <a:effectLst/>
-                <a:latin typeface="Arial" panose="020B0604020202020204" pitchFamily="34" charset="0"/>
-              </a:rPr>
-              <a:t>tonalidad</a:t>
-            </a:r>
-            <a:endParaRPr lang="es-ES_tradnl" dirty="0"/>
-          </a:p>
-          <a:p>
-            <a:pPr marL="628650" lvl="1" indent="-171450">
-              <a:buFont typeface="Arial" panose="020B0604020202020204" pitchFamily="34" charset="0"/>
-              <a:buChar char="•"/>
-            </a:pPr>
-            <a:r>
-              <a:rPr lang="es-ES_tradnl" dirty="0"/>
-              <a:t>meter</a:t>
-            </a:r>
-          </a:p>
-          <a:p>
-            <a:pPr marL="1085850" lvl="2" indent="-171450">
-              <a:buFont typeface="Arial" panose="020B0604020202020204" pitchFamily="34" charset="0"/>
-              <a:buChar char="•"/>
-            </a:pPr>
-            <a:r>
-              <a:rPr lang="es-ES_tradnl" dirty="0"/>
-              <a:t>.</a:t>
-            </a:r>
-            <a:r>
-              <a:rPr lang="es-ES_tradnl" dirty="0" err="1"/>
-              <a:t>unit</a:t>
-            </a:r>
-            <a:r>
-              <a:rPr lang="es-ES_tradnl" dirty="0"/>
-              <a:t>=“4”</a:t>
-            </a:r>
-          </a:p>
-          <a:p>
-            <a:pPr marL="1085850" lvl="2" indent="-171450">
-              <a:buFont typeface="Arial" panose="020B0604020202020204" pitchFamily="34" charset="0"/>
-              <a:buChar char="•"/>
-            </a:pPr>
-            <a:r>
-              <a:rPr lang="es-ES_tradnl" dirty="0"/>
-              <a:t>.</a:t>
-            </a:r>
-            <a:r>
-              <a:rPr lang="es-ES_tradnl" dirty="0" err="1"/>
-              <a:t>count</a:t>
-            </a:r>
-            <a:r>
-              <a:rPr lang="es-ES_tradnl" dirty="0"/>
-              <a:t>="3”</a:t>
-            </a:r>
-          </a:p>
-          <a:p>
-            <a:pPr marL="1085850" lvl="2" indent="-171450">
-              <a:buFont typeface="Arial" panose="020B0604020202020204" pitchFamily="34" charset="0"/>
-              <a:buChar char="•"/>
-            </a:pPr>
-            <a:endParaRPr lang="es-ES_tradnl" dirty="0"/>
-          </a:p>
-          <a:p>
-            <a:pPr marL="171450" lvl="0" indent="-171450">
-              <a:buFont typeface="Arial" panose="020B0604020202020204" pitchFamily="34" charset="0"/>
-              <a:buChar char="•"/>
-            </a:pPr>
-            <a:r>
-              <a:rPr lang="es-ES_tradnl" dirty="0"/>
-              <a:t>Pasar plantilla</a:t>
-            </a:r>
-          </a:p>
-          <a:p>
-            <a:pPr marL="171450" lvl="0" indent="-171450">
-              <a:buFont typeface="Arial" panose="020B0604020202020204" pitchFamily="34" charset="0"/>
-              <a:buChar char="•"/>
-            </a:pPr>
-            <a:r>
-              <a:rPr lang="es-ES_tradnl" dirty="0"/>
-              <a:t>Explicar</a:t>
-            </a:r>
-          </a:p>
-          <a:p>
-            <a:pPr marL="171450" lvl="0" indent="-171450">
-              <a:buFont typeface="Arial" panose="020B0604020202020204" pitchFamily="34" charset="0"/>
-              <a:buChar char="•"/>
-            </a:pPr>
-            <a:endParaRPr lang="es-ES_tradnl" dirty="0"/>
-          </a:p>
-          <a:p>
-            <a:pPr marL="171450" lvl="0" indent="-171450">
-              <a:buFont typeface="Arial" panose="020B0604020202020204" pitchFamily="34" charset="0"/>
-              <a:buChar char="•"/>
-            </a:pPr>
-            <a:r>
-              <a:rPr lang="es-ES_tradnl" dirty="0"/>
-              <a:t>EMPEZAR:</a:t>
-            </a:r>
-          </a:p>
-          <a:p>
-            <a:pPr marL="171450" lvl="0" indent="-171450">
-              <a:buFont typeface="Arial" panose="020B0604020202020204" pitchFamily="34" charset="0"/>
-              <a:buChar char="•"/>
-            </a:pPr>
-            <a:r>
-              <a:rPr lang="es-ES_tradnl" dirty="0" err="1"/>
-              <a:t>Let’s</a:t>
-            </a:r>
-            <a:r>
-              <a:rPr lang="es-ES_tradnl" dirty="0"/>
-              <a:t> </a:t>
-            </a:r>
-            <a:r>
-              <a:rPr lang="es-ES_tradnl" dirty="0" err="1"/>
-              <a:t>get</a:t>
-            </a:r>
-            <a:r>
-              <a:rPr lang="es-ES_tradnl" dirty="0"/>
-              <a:t> </a:t>
-            </a:r>
-            <a:r>
-              <a:rPr lang="es-ES_tradnl" dirty="0" err="1"/>
-              <a:t>into</a:t>
-            </a:r>
-            <a:r>
-              <a:rPr lang="es-ES_tradnl" dirty="0"/>
-              <a:t> </a:t>
-            </a:r>
-            <a:r>
-              <a:rPr lang="es-ES_tradnl" dirty="0" err="1"/>
-              <a:t>the</a:t>
-            </a:r>
-            <a:r>
-              <a:rPr lang="es-ES_tradnl" dirty="0"/>
-              <a:t> LAYER </a:t>
-            </a:r>
-            <a:r>
-              <a:rPr lang="es-ES_tradnl" dirty="0" err="1"/>
-              <a:t>of</a:t>
-            </a:r>
-            <a:r>
-              <a:rPr lang="es-ES_tradnl" dirty="0"/>
-              <a:t> </a:t>
-            </a:r>
-            <a:r>
-              <a:rPr lang="es-ES_tradnl" dirty="0" err="1"/>
-              <a:t>that</a:t>
-            </a:r>
-            <a:r>
-              <a:rPr lang="es-ES_tradnl" dirty="0"/>
-              <a:t> STAFF and </a:t>
-            </a:r>
-            <a:r>
-              <a:rPr lang="es-ES_tradnl" dirty="0" err="1"/>
-              <a:t>encode</a:t>
-            </a:r>
-            <a:r>
-              <a:rPr lang="es-ES_tradnl" dirty="0"/>
-              <a:t> </a:t>
-            </a:r>
-            <a:r>
-              <a:rPr lang="es-ES_tradnl" dirty="0" err="1"/>
-              <a:t>the</a:t>
-            </a:r>
-            <a:r>
-              <a:rPr lang="es-ES_tradnl" dirty="0"/>
-              <a:t> music </a:t>
-            </a:r>
-            <a:r>
-              <a:rPr lang="es-ES_tradnl" dirty="0" err="1"/>
-              <a:t>content</a:t>
-            </a:r>
-            <a:r>
-              <a:rPr lang="es-ES_tradnl" dirty="0"/>
-              <a:t> (</a:t>
-            </a:r>
-            <a:r>
-              <a:rPr lang="es-ES_tradnl" dirty="0" err="1"/>
-              <a:t>rests</a:t>
-            </a:r>
-            <a:r>
-              <a:rPr lang="es-ES_tradnl" dirty="0"/>
-              <a:t> and notes)</a:t>
-            </a:r>
-          </a:p>
-          <a:p>
-            <a:pPr marL="628650" lvl="1" indent="-171450">
-              <a:buFont typeface="Arial" panose="020B0604020202020204" pitchFamily="34" charset="0"/>
-              <a:buChar char="•"/>
-            </a:pPr>
-            <a:r>
-              <a:rPr lang="es-ES_tradnl" dirty="0" err="1"/>
-              <a:t>Rests</a:t>
-            </a:r>
-            <a:r>
-              <a:rPr lang="es-ES_tradnl" dirty="0"/>
-              <a:t> </a:t>
-            </a:r>
-            <a:r>
-              <a:rPr lang="es-ES_tradnl" dirty="0">
-                <a:sym typeface="Wingdings" pitchFamily="2" charset="2"/>
-              </a:rPr>
-              <a:t> </a:t>
-            </a:r>
-            <a:r>
-              <a:rPr lang="es-ES_tradnl" dirty="0" err="1">
-                <a:sym typeface="Wingdings" pitchFamily="2" charset="2"/>
-              </a:rPr>
-              <a:t>only</a:t>
-            </a:r>
-            <a:r>
-              <a:rPr lang="es-ES_tradnl" dirty="0">
-                <a:sym typeface="Wingdings" pitchFamily="2" charset="2"/>
-              </a:rPr>
-              <a:t> @</a:t>
-            </a:r>
-            <a:r>
-              <a:rPr lang="es-ES_tradnl" dirty="0" err="1">
-                <a:sym typeface="Wingdings" pitchFamily="2" charset="2"/>
-              </a:rPr>
-              <a:t>dur</a:t>
-            </a:r>
-            <a:endParaRPr lang="es-ES_tradnl" dirty="0">
-              <a:sym typeface="Wingdings" pitchFamily="2" charset="2"/>
-            </a:endParaRPr>
-          </a:p>
-          <a:p>
-            <a:pPr marL="628650" lvl="1" indent="-171450">
-              <a:buFont typeface="Arial" panose="020B0604020202020204" pitchFamily="34" charset="0"/>
-              <a:buChar char="•"/>
-            </a:pPr>
-            <a:r>
-              <a:rPr lang="es-ES_tradnl" dirty="0">
-                <a:sym typeface="Wingdings" pitchFamily="2" charset="2"/>
-              </a:rPr>
-              <a:t>Notes  @</a:t>
-            </a:r>
-            <a:r>
-              <a:rPr lang="es-ES_tradnl" dirty="0" err="1">
-                <a:sym typeface="Wingdings" pitchFamily="2" charset="2"/>
-              </a:rPr>
-              <a:t>dur</a:t>
-            </a:r>
-            <a:r>
-              <a:rPr lang="es-ES_tradnl" dirty="0">
-                <a:sym typeface="Wingdings" pitchFamily="2" charset="2"/>
-              </a:rPr>
-              <a:t>, </a:t>
-            </a:r>
-            <a:r>
-              <a:rPr lang="es-ES_tradnl" dirty="0" err="1">
-                <a:sym typeface="Wingdings" pitchFamily="2" charset="2"/>
-              </a:rPr>
-              <a:t>but</a:t>
-            </a:r>
-            <a:r>
-              <a:rPr lang="es-ES_tradnl" dirty="0">
-                <a:sym typeface="Wingdings" pitchFamily="2" charset="2"/>
-              </a:rPr>
-              <a:t> </a:t>
-            </a:r>
-            <a:r>
-              <a:rPr lang="es-ES_tradnl" dirty="0" err="1">
-                <a:sym typeface="Wingdings" pitchFamily="2" charset="2"/>
-              </a:rPr>
-              <a:t>also</a:t>
-            </a:r>
-            <a:r>
-              <a:rPr lang="es-ES_tradnl" dirty="0">
-                <a:sym typeface="Wingdings" pitchFamily="2" charset="2"/>
-              </a:rPr>
-              <a:t> pitch and octave</a:t>
-            </a:r>
-          </a:p>
-          <a:p>
-            <a:pPr marL="628650" lvl="1" indent="-171450">
-              <a:buFont typeface="Arial" panose="020B0604020202020204" pitchFamily="34" charset="0"/>
-              <a:buChar char="•"/>
-            </a:pPr>
-            <a:endParaRPr lang="es-ES_tradnl" dirty="0">
-              <a:sym typeface="Wingdings" pitchFamily="2" charset="2"/>
-            </a:endParaRPr>
-          </a:p>
-          <a:p>
-            <a:pPr marL="171450" lvl="0" indent="-171450">
-              <a:buFont typeface="Arial" panose="020B0604020202020204" pitchFamily="34" charset="0"/>
-              <a:buChar char="•"/>
-            </a:pPr>
-            <a:r>
-              <a:rPr lang="es-ES_tradnl" dirty="0">
-                <a:sym typeface="Wingdings" pitchFamily="2" charset="2"/>
-              </a:rPr>
-              <a:t>Ahora probemos con el texto (las sílabas)</a:t>
+              <a:t>Se </a:t>
+            </a:r>
+            <a:r>
+              <a:rPr lang="es-ES_tradnl"/>
+              <a:t>puede escuchar</a:t>
             </a:r>
             <a:endParaRPr lang="es-ES_tradnl" dirty="0"/>
           </a:p>
@@ -1125,7 +685,7 @@
           <a:p>
             <a:fld id="{F0D413E3-D7D5-FA47-AC82-B3DDF4FE716B}" type="slidenum">
               <a:rPr lang="en-US" smtClean="0"/>
-              <a:t>18</a:t>
+              <a:t>16</a:t>
             </a:fld>
             <a:endParaRPr lang="en-US"/>
           </a:p>
@@ -1134,7 +694,7 @@
     </p:spTree>
     <p:extLst>
       <p:ext uri="{BB962C8B-B14F-4D97-AF65-F5344CB8AC3E}">
-        <p14:creationId xmlns:p14="http://schemas.microsoft.com/office/powerpoint/2010/main" val="1046868578"/>
+        <p14:creationId xmlns:p14="http://schemas.microsoft.com/office/powerpoint/2010/main" val="3018378519"/>
       </p:ext>
     </p:extLst>
   </p:cSld>
@@ -1188,484 +748,7 @@
           <a:bodyPr/>
           <a:lstStyle/>
           <a:p>
-            <a:r>
-              <a:rPr lang="es-ES_tradnl" dirty="0" err="1"/>
-              <a:t>Start</a:t>
-            </a:r>
-            <a:r>
-              <a:rPr lang="es-ES_tradnl" dirty="0"/>
-              <a:t> </a:t>
-            </a:r>
-            <a:r>
-              <a:rPr lang="es-ES_tradnl" dirty="0" err="1"/>
-              <a:t>with</a:t>
-            </a:r>
-            <a:r>
-              <a:rPr lang="es-ES_tradnl" dirty="0"/>
-              <a:t> STAFFDEF:</a:t>
-            </a:r>
-          </a:p>
-          <a:p>
-            <a:pPr marL="171450" indent="-171450">
-              <a:buFont typeface="Arial" panose="020B0604020202020204" pitchFamily="34" charset="0"/>
-              <a:buChar char="•"/>
-            </a:pPr>
-            <a:r>
-              <a:rPr lang="es-ES_tradnl" dirty="0"/>
-              <a:t>n=“1”</a:t>
-            </a:r>
-          </a:p>
-          <a:p>
-            <a:pPr marL="171450" indent="-171450">
-              <a:buFont typeface="Arial" panose="020B0604020202020204" pitchFamily="34" charset="0"/>
-              <a:buChar char="•"/>
-            </a:pPr>
-            <a:r>
-              <a:rPr lang="es-ES_tradnl" dirty="0" err="1"/>
-              <a:t>lines</a:t>
-            </a:r>
-            <a:r>
-              <a:rPr lang="es-ES_tradnl" dirty="0"/>
-              <a:t>=“5”</a:t>
-            </a:r>
-          </a:p>
-          <a:p>
-            <a:pPr marL="171450" indent="-171450">
-              <a:buFont typeface="Arial" panose="020B0604020202020204" pitchFamily="34" charset="0"/>
-              <a:buChar char="•"/>
-            </a:pPr>
-            <a:r>
-              <a:rPr lang="es-ES_tradnl" dirty="0" err="1"/>
-              <a:t>clef</a:t>
-            </a:r>
-            <a:endParaRPr lang="es-ES_tradnl" dirty="0"/>
-          </a:p>
-          <a:p>
-            <a:pPr marL="628650" lvl="1" indent="-171450">
-              <a:buFont typeface="Arial" panose="020B0604020202020204" pitchFamily="34" charset="0"/>
-              <a:buChar char="•"/>
-            </a:pPr>
-            <a:r>
-              <a:rPr lang="es-ES_tradnl" dirty="0"/>
-              <a:t>.</a:t>
-            </a:r>
-            <a:r>
-              <a:rPr lang="es-ES_tradnl" dirty="0" err="1"/>
-              <a:t>shape</a:t>
-            </a:r>
-            <a:r>
-              <a:rPr lang="es-ES_tradnl" dirty="0"/>
-              <a:t>=“G”</a:t>
-            </a:r>
-          </a:p>
-          <a:p>
-            <a:pPr marL="628650" lvl="1" indent="-171450">
-              <a:buFont typeface="Arial" panose="020B0604020202020204" pitchFamily="34" charset="0"/>
-              <a:buChar char="•"/>
-            </a:pPr>
-            <a:r>
-              <a:rPr lang="es-ES_tradnl" dirty="0"/>
-              <a:t>.line=“2”</a:t>
-            </a:r>
-          </a:p>
-          <a:p>
-            <a:pPr marL="628650" lvl="1" indent="-171450">
-              <a:buFont typeface="Arial" panose="020B0604020202020204" pitchFamily="34" charset="0"/>
-              <a:buChar char="•"/>
-            </a:pPr>
-            <a:endParaRPr lang="es-ES_tradnl" dirty="0"/>
-          </a:p>
-          <a:p>
-            <a:pPr marL="171450" lvl="0" indent="-171450">
-              <a:buFont typeface="Arial" panose="020B0604020202020204" pitchFamily="34" charset="0"/>
-              <a:buChar char="•"/>
-            </a:pPr>
-            <a:r>
-              <a:rPr lang="es-ES_tradnl" dirty="0" err="1"/>
-              <a:t>Things</a:t>
-            </a:r>
-            <a:r>
-              <a:rPr lang="es-ES_tradnl" dirty="0"/>
-              <a:t> </a:t>
-            </a:r>
-            <a:r>
-              <a:rPr lang="es-ES_tradnl" dirty="0" err="1"/>
-              <a:t>that</a:t>
-            </a:r>
-            <a:r>
-              <a:rPr lang="es-ES_tradnl" dirty="0"/>
-              <a:t> are </a:t>
-            </a:r>
-            <a:r>
-              <a:rPr lang="es-ES_tradnl" dirty="0" err="1"/>
-              <a:t>shared</a:t>
-            </a:r>
-            <a:r>
-              <a:rPr lang="es-ES_tradnl" dirty="0"/>
-              <a:t> </a:t>
-            </a:r>
-            <a:r>
-              <a:rPr lang="es-ES_tradnl" dirty="0" err="1"/>
-              <a:t>with</a:t>
-            </a:r>
-            <a:r>
-              <a:rPr lang="es-ES_tradnl" dirty="0"/>
-              <a:t> </a:t>
-            </a:r>
-            <a:r>
-              <a:rPr lang="es-ES_tradnl" dirty="0" err="1"/>
-              <a:t>all</a:t>
-            </a:r>
-            <a:r>
-              <a:rPr lang="es-ES_tradnl" dirty="0"/>
-              <a:t> </a:t>
-            </a:r>
-            <a:r>
-              <a:rPr lang="es-ES_tradnl" dirty="0" err="1"/>
-              <a:t>staves</a:t>
-            </a:r>
-            <a:r>
-              <a:rPr lang="es-ES_tradnl" dirty="0"/>
-              <a:t>:</a:t>
-            </a:r>
-          </a:p>
-          <a:p>
-            <a:pPr marL="628650" lvl="1" indent="-171450">
-              <a:buFont typeface="Arial" panose="020B0604020202020204" pitchFamily="34" charset="0"/>
-              <a:buChar char="•"/>
-            </a:pPr>
-            <a:r>
-              <a:rPr lang="es-ES_tradnl" dirty="0" err="1"/>
-              <a:t>key.sig</a:t>
-            </a:r>
-            <a:r>
-              <a:rPr lang="es-ES_tradnl" dirty="0"/>
-              <a:t>="1s”  </a:t>
-            </a:r>
-            <a:r>
-              <a:rPr lang="es-ES_tradnl" dirty="0">
-                <a:sym typeface="Wingdings" pitchFamily="2" charset="2"/>
-              </a:rPr>
-              <a:t>  </a:t>
-            </a:r>
-            <a:r>
-              <a:rPr lang="en-CA" b="1" i="0" dirty="0" err="1">
-                <a:solidFill>
-                  <a:srgbClr val="202122"/>
-                </a:solidFill>
-                <a:effectLst/>
-                <a:latin typeface="Arial" panose="020B0604020202020204" pitchFamily="34" charset="0"/>
-              </a:rPr>
-              <a:t>armadura</a:t>
-            </a:r>
-            <a:r>
-              <a:rPr lang="en-CA" b="1" i="0" dirty="0">
-                <a:solidFill>
-                  <a:srgbClr val="202122"/>
-                </a:solidFill>
-                <a:effectLst/>
-                <a:latin typeface="Arial" panose="020B0604020202020204" pitchFamily="34" charset="0"/>
-              </a:rPr>
-              <a:t> de </a:t>
-            </a:r>
-            <a:r>
-              <a:rPr lang="en-CA" b="1" i="0" dirty="0" err="1">
-                <a:solidFill>
-                  <a:srgbClr val="202122"/>
-                </a:solidFill>
-                <a:effectLst/>
-                <a:latin typeface="Arial" panose="020B0604020202020204" pitchFamily="34" charset="0"/>
-              </a:rPr>
-              <a:t>tonalidad</a:t>
-            </a:r>
-            <a:endParaRPr lang="es-ES_tradnl" dirty="0"/>
-          </a:p>
-          <a:p>
-            <a:pPr marL="628650" lvl="1" indent="-171450">
-              <a:buFont typeface="Arial" panose="020B0604020202020204" pitchFamily="34" charset="0"/>
-              <a:buChar char="•"/>
-            </a:pPr>
-            <a:r>
-              <a:rPr lang="es-ES_tradnl" dirty="0"/>
-              <a:t>meter</a:t>
-            </a:r>
-          </a:p>
-          <a:p>
-            <a:pPr marL="1085850" lvl="2" indent="-171450">
-              <a:buFont typeface="Arial" panose="020B0604020202020204" pitchFamily="34" charset="0"/>
-              <a:buChar char="•"/>
-            </a:pPr>
-            <a:r>
-              <a:rPr lang="es-ES_tradnl" dirty="0"/>
-              <a:t>.</a:t>
-            </a:r>
-            <a:r>
-              <a:rPr lang="es-ES_tradnl" dirty="0" err="1"/>
-              <a:t>unit</a:t>
-            </a:r>
-            <a:r>
-              <a:rPr lang="es-ES_tradnl" dirty="0"/>
-              <a:t>=“4”</a:t>
-            </a:r>
-          </a:p>
-          <a:p>
-            <a:pPr marL="1085850" lvl="2" indent="-171450">
-              <a:buFont typeface="Arial" panose="020B0604020202020204" pitchFamily="34" charset="0"/>
-              <a:buChar char="•"/>
-            </a:pPr>
-            <a:r>
-              <a:rPr lang="es-ES_tradnl" dirty="0"/>
-              <a:t>.</a:t>
-            </a:r>
-            <a:r>
-              <a:rPr lang="es-ES_tradnl" dirty="0" err="1"/>
-              <a:t>count</a:t>
-            </a:r>
-            <a:r>
-              <a:rPr lang="es-ES_tradnl" dirty="0"/>
-              <a:t>="3”</a:t>
-            </a:r>
-          </a:p>
-          <a:p>
-            <a:pPr marL="1085850" lvl="2" indent="-171450">
-              <a:buFont typeface="Arial" panose="020B0604020202020204" pitchFamily="34" charset="0"/>
-              <a:buChar char="•"/>
-            </a:pPr>
-            <a:endParaRPr lang="es-ES_tradnl" dirty="0"/>
-          </a:p>
-          <a:p>
-            <a:pPr marL="171450" lvl="0" indent="-171450">
-              <a:buFont typeface="Arial" panose="020B0604020202020204" pitchFamily="34" charset="0"/>
-              <a:buChar char="•"/>
-            </a:pPr>
-            <a:r>
-              <a:rPr lang="es-ES_tradnl" dirty="0"/>
-              <a:t>Pasar plantilla</a:t>
-            </a:r>
-          </a:p>
-          <a:p>
-            <a:pPr marL="171450" lvl="0" indent="-171450">
-              <a:buFont typeface="Arial" panose="020B0604020202020204" pitchFamily="34" charset="0"/>
-              <a:buChar char="•"/>
-            </a:pPr>
-            <a:r>
-              <a:rPr lang="es-ES_tradnl" dirty="0"/>
-              <a:t>Explicar</a:t>
-            </a:r>
-          </a:p>
-          <a:p>
-            <a:pPr marL="171450" lvl="0" indent="-171450">
-              <a:buFont typeface="Arial" panose="020B0604020202020204" pitchFamily="34" charset="0"/>
-              <a:buChar char="•"/>
-            </a:pPr>
-            <a:endParaRPr lang="es-ES_tradnl" dirty="0"/>
-          </a:p>
-          <a:p>
-            <a:pPr marL="171450" lvl="0" indent="-171450">
-              <a:buFont typeface="Arial" panose="020B0604020202020204" pitchFamily="34" charset="0"/>
-              <a:buChar char="•"/>
-            </a:pPr>
-            <a:r>
-              <a:rPr lang="es-ES_tradnl" dirty="0"/>
-              <a:t>EMPEZAR:</a:t>
-            </a:r>
-          </a:p>
-          <a:p>
-            <a:pPr marL="171450" lvl="0" indent="-171450">
-              <a:buFont typeface="Arial" panose="020B0604020202020204" pitchFamily="34" charset="0"/>
-              <a:buChar char="•"/>
-            </a:pPr>
-            <a:r>
-              <a:rPr lang="es-ES_tradnl" dirty="0" err="1"/>
-              <a:t>Let’s</a:t>
-            </a:r>
-            <a:r>
-              <a:rPr lang="es-ES_tradnl" dirty="0"/>
-              <a:t> </a:t>
-            </a:r>
-            <a:r>
-              <a:rPr lang="es-ES_tradnl" dirty="0" err="1"/>
-              <a:t>get</a:t>
-            </a:r>
-            <a:r>
-              <a:rPr lang="es-ES_tradnl" dirty="0"/>
-              <a:t> </a:t>
-            </a:r>
-            <a:r>
-              <a:rPr lang="es-ES_tradnl" dirty="0" err="1"/>
-              <a:t>into</a:t>
-            </a:r>
-            <a:r>
-              <a:rPr lang="es-ES_tradnl" dirty="0"/>
-              <a:t> </a:t>
-            </a:r>
-            <a:r>
-              <a:rPr lang="es-ES_tradnl" dirty="0" err="1"/>
-              <a:t>the</a:t>
-            </a:r>
-            <a:r>
-              <a:rPr lang="es-ES_tradnl" dirty="0"/>
-              <a:t> LAYER </a:t>
-            </a:r>
-            <a:r>
-              <a:rPr lang="es-ES_tradnl" dirty="0" err="1"/>
-              <a:t>of</a:t>
-            </a:r>
-            <a:r>
-              <a:rPr lang="es-ES_tradnl" dirty="0"/>
-              <a:t> </a:t>
-            </a:r>
-            <a:r>
-              <a:rPr lang="es-ES_tradnl" dirty="0" err="1"/>
-              <a:t>that</a:t>
-            </a:r>
-            <a:r>
-              <a:rPr lang="es-ES_tradnl" dirty="0"/>
-              <a:t> STAFF and </a:t>
-            </a:r>
-            <a:r>
-              <a:rPr lang="es-ES_tradnl" dirty="0" err="1"/>
-              <a:t>encode</a:t>
-            </a:r>
-            <a:r>
-              <a:rPr lang="es-ES_tradnl" dirty="0"/>
-              <a:t> </a:t>
-            </a:r>
-            <a:r>
-              <a:rPr lang="es-ES_tradnl" dirty="0" err="1"/>
-              <a:t>the</a:t>
-            </a:r>
-            <a:r>
-              <a:rPr lang="es-ES_tradnl" dirty="0"/>
-              <a:t> music </a:t>
-            </a:r>
-            <a:r>
-              <a:rPr lang="es-ES_tradnl" dirty="0" err="1"/>
-              <a:t>content</a:t>
-            </a:r>
-            <a:r>
-              <a:rPr lang="es-ES_tradnl" dirty="0"/>
-              <a:t> (</a:t>
-            </a:r>
-            <a:r>
-              <a:rPr lang="es-ES_tradnl" dirty="0" err="1"/>
-              <a:t>rests</a:t>
-            </a:r>
-            <a:r>
-              <a:rPr lang="es-ES_tradnl" dirty="0"/>
-              <a:t> and notes)</a:t>
-            </a:r>
-          </a:p>
-          <a:p>
-            <a:pPr marL="628650" lvl="1" indent="-171450">
-              <a:buFont typeface="Arial" panose="020B0604020202020204" pitchFamily="34" charset="0"/>
-              <a:buChar char="•"/>
-            </a:pPr>
-            <a:r>
-              <a:rPr lang="es-ES_tradnl" dirty="0" err="1"/>
-              <a:t>Rests</a:t>
-            </a:r>
-            <a:r>
-              <a:rPr lang="es-ES_tradnl" dirty="0"/>
-              <a:t> </a:t>
-            </a:r>
-            <a:r>
-              <a:rPr lang="es-ES_tradnl" dirty="0">
-                <a:sym typeface="Wingdings" pitchFamily="2" charset="2"/>
-              </a:rPr>
-              <a:t> </a:t>
-            </a:r>
-            <a:r>
-              <a:rPr lang="es-ES_tradnl" dirty="0" err="1">
-                <a:sym typeface="Wingdings" pitchFamily="2" charset="2"/>
-              </a:rPr>
-              <a:t>only</a:t>
-            </a:r>
-            <a:r>
-              <a:rPr lang="es-ES_tradnl" dirty="0">
-                <a:sym typeface="Wingdings" pitchFamily="2" charset="2"/>
-              </a:rPr>
-              <a:t> @</a:t>
-            </a:r>
-            <a:r>
-              <a:rPr lang="es-ES_tradnl" dirty="0" err="1">
-                <a:sym typeface="Wingdings" pitchFamily="2" charset="2"/>
-              </a:rPr>
-              <a:t>dur</a:t>
-            </a:r>
-            <a:endParaRPr lang="es-ES_tradnl" dirty="0">
-              <a:sym typeface="Wingdings" pitchFamily="2" charset="2"/>
-            </a:endParaRPr>
-          </a:p>
-          <a:p>
-            <a:pPr marL="628650" lvl="1" indent="-171450">
-              <a:buFont typeface="Arial" panose="020B0604020202020204" pitchFamily="34" charset="0"/>
-              <a:buChar char="•"/>
-            </a:pPr>
-            <a:r>
-              <a:rPr lang="es-ES_tradnl" dirty="0">
-                <a:sym typeface="Wingdings" pitchFamily="2" charset="2"/>
-              </a:rPr>
-              <a:t>Notes  @</a:t>
-            </a:r>
-            <a:r>
-              <a:rPr lang="es-ES_tradnl" dirty="0" err="1">
-                <a:sym typeface="Wingdings" pitchFamily="2" charset="2"/>
-              </a:rPr>
-              <a:t>dur</a:t>
-            </a:r>
-            <a:r>
-              <a:rPr lang="es-ES_tradnl" dirty="0">
-                <a:sym typeface="Wingdings" pitchFamily="2" charset="2"/>
-              </a:rPr>
-              <a:t>, </a:t>
-            </a:r>
-            <a:r>
-              <a:rPr lang="es-ES_tradnl" dirty="0" err="1">
-                <a:sym typeface="Wingdings" pitchFamily="2" charset="2"/>
-              </a:rPr>
-              <a:t>but</a:t>
-            </a:r>
-            <a:r>
-              <a:rPr lang="es-ES_tradnl" dirty="0">
-                <a:sym typeface="Wingdings" pitchFamily="2" charset="2"/>
-              </a:rPr>
-              <a:t> </a:t>
-            </a:r>
-            <a:r>
-              <a:rPr lang="es-ES_tradnl" dirty="0" err="1">
-                <a:sym typeface="Wingdings" pitchFamily="2" charset="2"/>
-              </a:rPr>
-              <a:t>also</a:t>
-            </a:r>
-            <a:r>
-              <a:rPr lang="es-ES_tradnl" dirty="0">
-                <a:sym typeface="Wingdings" pitchFamily="2" charset="2"/>
-              </a:rPr>
-              <a:t> pitch and octave</a:t>
-            </a:r>
-          </a:p>
-          <a:p>
-            <a:pPr marL="628650" lvl="1" indent="-171450">
-              <a:buFont typeface="Arial" panose="020B0604020202020204" pitchFamily="34" charset="0"/>
-              <a:buChar char="•"/>
-            </a:pPr>
-            <a:endParaRPr lang="es-ES_tradnl" dirty="0">
-              <a:sym typeface="Wingdings" pitchFamily="2" charset="2"/>
-            </a:endParaRPr>
-          </a:p>
-          <a:p>
-            <a:pPr marL="171450" lvl="0" indent="-171450">
-              <a:buFont typeface="Arial" panose="020B0604020202020204" pitchFamily="34" charset="0"/>
-              <a:buChar char="•"/>
-            </a:pPr>
-            <a:r>
-              <a:rPr lang="es-ES_tradnl" dirty="0">
-                <a:sym typeface="Wingdings" pitchFamily="2" charset="2"/>
-              </a:rPr>
-              <a:t>Ahora probemos con el texto (las sílabas)</a:t>
-            </a:r>
-            <a:endParaRPr lang="es-ES_tradnl" dirty="0"/>
+            <a:endParaRPr lang="en-CA" dirty="0"/>
           </a:p>
         </p:txBody>
       </p:sp>
@@ -1686,6 +769,1128 @@
           <a:p>
             <a:fld id="{F0D413E3-D7D5-FA47-AC82-B3DDF4FE716B}" type="slidenum">
               <a:rPr lang="en-US" smtClean="0"/>
+              <a:t>17</a:t>
+            </a:fld>
+            <a:endParaRPr lang="en-US"/>
+          </a:p>
+        </p:txBody>
+      </p:sp>
+    </p:spTree>
+    <p:extLst>
+      <p:ext uri="{BB962C8B-B14F-4D97-AF65-F5344CB8AC3E}">
+        <p14:creationId xmlns:p14="http://schemas.microsoft.com/office/powerpoint/2010/main" val="3515691731"/>
+      </p:ext>
+    </p:extLst>
+  </p:cSld>
+  <p:clrMapOvr>
+    <a:masterClrMapping/>
+  </p:clrMapOvr>
+</p:notes>
+</file>
+
+<file path=ppt/notesSlides/notesSlide12.xml><?xml version="1.0" encoding="utf-8"?>
+<p:notes xmlns:a="http://schemas.openxmlformats.org/drawingml/2006/main" xmlns:r="http://schemas.openxmlformats.org/officeDocument/2006/relationships" xmlns:p="http://schemas.openxmlformats.org/presentationml/2006/main">
+  <p:cSld>
+    <p:spTree>
+      <p:nvGrpSpPr>
+        <p:cNvPr id="1" name=""/>
+        <p:cNvGrpSpPr/>
+        <p:nvPr/>
+      </p:nvGrpSpPr>
+      <p:grpSpPr>
+        <a:xfrm>
+          <a:off x="0" y="0"/>
+          <a:ext cx="0" cy="0"/>
+          <a:chOff x="0" y="0"/>
+          <a:chExt cx="0" cy="0"/>
+        </a:xfrm>
+      </p:grpSpPr>
+      <p:sp>
+        <p:nvSpPr>
+          <p:cNvPr id="2" name="Slide Image Placeholder 1"/>
+          <p:cNvSpPr>
+            <a:spLocks noGrp="1" noRot="1" noChangeAspect="1"/>
+          </p:cNvSpPr>
+          <p:nvPr>
+            <p:ph type="sldImg"/>
+          </p:nvPr>
+        </p:nvSpPr>
+        <p:spPr/>
+      </p:sp>
+      <p:sp>
+        <p:nvSpPr>
+          <p:cNvPr id="3" name="Notes Placeholder 2"/>
+          <p:cNvSpPr>
+            <a:spLocks noGrp="1"/>
+          </p:cNvSpPr>
+          <p:nvPr>
+            <p:ph type="body" idx="1"/>
+          </p:nvPr>
+        </p:nvSpPr>
+        <p:spPr/>
+        <p:txBody>
+          <a:bodyPr/>
+          <a:lstStyle/>
+          <a:p>
+            <a:r>
+              <a:rPr lang="es-ES_tradnl" dirty="0" err="1"/>
+              <a:t>Start</a:t>
+            </a:r>
+            <a:r>
+              <a:rPr lang="es-ES_tradnl" dirty="0"/>
+              <a:t> </a:t>
+            </a:r>
+            <a:r>
+              <a:rPr lang="es-ES_tradnl" dirty="0" err="1"/>
+              <a:t>with</a:t>
+            </a:r>
+            <a:r>
+              <a:rPr lang="es-ES_tradnl" dirty="0"/>
+              <a:t> STAFFDEF:</a:t>
+            </a:r>
+          </a:p>
+          <a:p>
+            <a:pPr marL="171450" indent="-171450">
+              <a:buFont typeface="Arial" panose="020B0604020202020204" pitchFamily="34" charset="0"/>
+              <a:buChar char="•"/>
+            </a:pPr>
+            <a:r>
+              <a:rPr lang="es-ES_tradnl" dirty="0"/>
+              <a:t>n=“1”</a:t>
+            </a:r>
+          </a:p>
+          <a:p>
+            <a:pPr marL="171450" indent="-171450">
+              <a:buFont typeface="Arial" panose="020B0604020202020204" pitchFamily="34" charset="0"/>
+              <a:buChar char="•"/>
+            </a:pPr>
+            <a:r>
+              <a:rPr lang="es-ES_tradnl" dirty="0" err="1"/>
+              <a:t>lines</a:t>
+            </a:r>
+            <a:r>
+              <a:rPr lang="es-ES_tradnl" dirty="0"/>
+              <a:t>=“5”</a:t>
+            </a:r>
+          </a:p>
+          <a:p>
+            <a:pPr marL="171450" indent="-171450">
+              <a:buFont typeface="Arial" panose="020B0604020202020204" pitchFamily="34" charset="0"/>
+              <a:buChar char="•"/>
+            </a:pPr>
+            <a:r>
+              <a:rPr lang="es-ES_tradnl" dirty="0" err="1"/>
+              <a:t>clef</a:t>
+            </a:r>
+            <a:endParaRPr lang="es-ES_tradnl" dirty="0"/>
+          </a:p>
+          <a:p>
+            <a:pPr marL="628650" lvl="1" indent="-171450">
+              <a:buFont typeface="Arial" panose="020B0604020202020204" pitchFamily="34" charset="0"/>
+              <a:buChar char="•"/>
+            </a:pPr>
+            <a:r>
+              <a:rPr lang="es-ES_tradnl" dirty="0"/>
+              <a:t>.</a:t>
+            </a:r>
+            <a:r>
+              <a:rPr lang="es-ES_tradnl" dirty="0" err="1"/>
+              <a:t>shape</a:t>
+            </a:r>
+            <a:r>
+              <a:rPr lang="es-ES_tradnl" dirty="0"/>
+              <a:t>=“G”</a:t>
+            </a:r>
+          </a:p>
+          <a:p>
+            <a:pPr marL="628650" lvl="1" indent="-171450">
+              <a:buFont typeface="Arial" panose="020B0604020202020204" pitchFamily="34" charset="0"/>
+              <a:buChar char="•"/>
+            </a:pPr>
+            <a:r>
+              <a:rPr lang="es-ES_tradnl" dirty="0"/>
+              <a:t>.line=“2”</a:t>
+            </a:r>
+          </a:p>
+          <a:p>
+            <a:pPr marL="628650" lvl="1" indent="-171450">
+              <a:buFont typeface="Arial" panose="020B0604020202020204" pitchFamily="34" charset="0"/>
+              <a:buChar char="•"/>
+            </a:pPr>
+            <a:endParaRPr lang="es-ES_tradnl" dirty="0"/>
+          </a:p>
+          <a:p>
+            <a:pPr marL="171450" lvl="0" indent="-171450">
+              <a:buFont typeface="Arial" panose="020B0604020202020204" pitchFamily="34" charset="0"/>
+              <a:buChar char="•"/>
+            </a:pPr>
+            <a:r>
+              <a:rPr lang="es-ES_tradnl" dirty="0" err="1"/>
+              <a:t>Things</a:t>
+            </a:r>
+            <a:r>
+              <a:rPr lang="es-ES_tradnl" dirty="0"/>
+              <a:t> </a:t>
+            </a:r>
+            <a:r>
+              <a:rPr lang="es-ES_tradnl" dirty="0" err="1"/>
+              <a:t>that</a:t>
+            </a:r>
+            <a:r>
+              <a:rPr lang="es-ES_tradnl" dirty="0"/>
+              <a:t> are </a:t>
+            </a:r>
+            <a:r>
+              <a:rPr lang="es-ES_tradnl" dirty="0" err="1"/>
+              <a:t>shared</a:t>
+            </a:r>
+            <a:r>
+              <a:rPr lang="es-ES_tradnl" dirty="0"/>
+              <a:t> </a:t>
+            </a:r>
+            <a:r>
+              <a:rPr lang="es-ES_tradnl" dirty="0" err="1"/>
+              <a:t>with</a:t>
+            </a:r>
+            <a:r>
+              <a:rPr lang="es-ES_tradnl" dirty="0"/>
+              <a:t> </a:t>
+            </a:r>
+            <a:r>
+              <a:rPr lang="es-ES_tradnl" dirty="0" err="1"/>
+              <a:t>all</a:t>
+            </a:r>
+            <a:r>
+              <a:rPr lang="es-ES_tradnl" dirty="0"/>
+              <a:t> </a:t>
+            </a:r>
+            <a:r>
+              <a:rPr lang="es-ES_tradnl" dirty="0" err="1"/>
+              <a:t>staves</a:t>
+            </a:r>
+            <a:r>
+              <a:rPr lang="es-ES_tradnl" dirty="0"/>
+              <a:t>:</a:t>
+            </a:r>
+          </a:p>
+          <a:p>
+            <a:pPr marL="628650" lvl="1" indent="-171450">
+              <a:buFont typeface="Arial" panose="020B0604020202020204" pitchFamily="34" charset="0"/>
+              <a:buChar char="•"/>
+            </a:pPr>
+            <a:r>
+              <a:rPr lang="es-ES_tradnl" dirty="0" err="1"/>
+              <a:t>key.sig</a:t>
+            </a:r>
+            <a:r>
+              <a:rPr lang="es-ES_tradnl" dirty="0"/>
+              <a:t>="1s”  </a:t>
+            </a:r>
+            <a:r>
+              <a:rPr lang="es-ES_tradnl" dirty="0">
+                <a:sym typeface="Wingdings" pitchFamily="2" charset="2"/>
+              </a:rPr>
+              <a:t>  </a:t>
+            </a:r>
+            <a:r>
+              <a:rPr lang="en-CA" b="1" i="0" dirty="0" err="1">
+                <a:solidFill>
+                  <a:srgbClr val="202122"/>
+                </a:solidFill>
+                <a:effectLst/>
+                <a:latin typeface="Arial" panose="020B0604020202020204" pitchFamily="34" charset="0"/>
+              </a:rPr>
+              <a:t>armadura</a:t>
+            </a:r>
+            <a:r>
+              <a:rPr lang="en-CA" b="1" i="0" dirty="0">
+                <a:solidFill>
+                  <a:srgbClr val="202122"/>
+                </a:solidFill>
+                <a:effectLst/>
+                <a:latin typeface="Arial" panose="020B0604020202020204" pitchFamily="34" charset="0"/>
+              </a:rPr>
+              <a:t> de </a:t>
+            </a:r>
+            <a:r>
+              <a:rPr lang="en-CA" b="1" i="0" dirty="0" err="1">
+                <a:solidFill>
+                  <a:srgbClr val="202122"/>
+                </a:solidFill>
+                <a:effectLst/>
+                <a:latin typeface="Arial" panose="020B0604020202020204" pitchFamily="34" charset="0"/>
+              </a:rPr>
+              <a:t>tonalidad</a:t>
+            </a:r>
+            <a:endParaRPr lang="es-ES_tradnl" dirty="0"/>
+          </a:p>
+          <a:p>
+            <a:pPr marL="628650" lvl="1" indent="-171450">
+              <a:buFont typeface="Arial" panose="020B0604020202020204" pitchFamily="34" charset="0"/>
+              <a:buChar char="•"/>
+            </a:pPr>
+            <a:r>
+              <a:rPr lang="es-ES_tradnl" dirty="0"/>
+              <a:t>meter</a:t>
+            </a:r>
+          </a:p>
+          <a:p>
+            <a:pPr marL="1085850" lvl="2" indent="-171450">
+              <a:buFont typeface="Arial" panose="020B0604020202020204" pitchFamily="34" charset="0"/>
+              <a:buChar char="•"/>
+            </a:pPr>
+            <a:r>
+              <a:rPr lang="es-ES_tradnl" dirty="0"/>
+              <a:t>.</a:t>
+            </a:r>
+            <a:r>
+              <a:rPr lang="es-ES_tradnl" dirty="0" err="1"/>
+              <a:t>unit</a:t>
+            </a:r>
+            <a:r>
+              <a:rPr lang="es-ES_tradnl" dirty="0"/>
+              <a:t>=“4”</a:t>
+            </a:r>
+          </a:p>
+          <a:p>
+            <a:pPr marL="1085850" lvl="2" indent="-171450">
+              <a:buFont typeface="Arial" panose="020B0604020202020204" pitchFamily="34" charset="0"/>
+              <a:buChar char="•"/>
+            </a:pPr>
+            <a:r>
+              <a:rPr lang="es-ES_tradnl" dirty="0"/>
+              <a:t>.</a:t>
+            </a:r>
+            <a:r>
+              <a:rPr lang="es-ES_tradnl" dirty="0" err="1"/>
+              <a:t>count</a:t>
+            </a:r>
+            <a:r>
+              <a:rPr lang="es-ES_tradnl" dirty="0"/>
+              <a:t>="3”</a:t>
+            </a:r>
+          </a:p>
+          <a:p>
+            <a:pPr marL="1085850" lvl="2" indent="-171450">
+              <a:buFont typeface="Arial" panose="020B0604020202020204" pitchFamily="34" charset="0"/>
+              <a:buChar char="•"/>
+            </a:pPr>
+            <a:endParaRPr lang="es-ES_tradnl" dirty="0"/>
+          </a:p>
+          <a:p>
+            <a:pPr marL="171450" lvl="0" indent="-171450">
+              <a:buFont typeface="Arial" panose="020B0604020202020204" pitchFamily="34" charset="0"/>
+              <a:buChar char="•"/>
+            </a:pPr>
+            <a:r>
+              <a:rPr lang="es-ES_tradnl" dirty="0"/>
+              <a:t>Pasar plantilla</a:t>
+            </a:r>
+          </a:p>
+          <a:p>
+            <a:pPr marL="171450" lvl="0" indent="-171450">
+              <a:buFont typeface="Arial" panose="020B0604020202020204" pitchFamily="34" charset="0"/>
+              <a:buChar char="•"/>
+            </a:pPr>
+            <a:r>
+              <a:rPr lang="es-ES_tradnl" dirty="0"/>
+              <a:t>Explicar</a:t>
+            </a:r>
+          </a:p>
+          <a:p>
+            <a:pPr marL="171450" lvl="0" indent="-171450">
+              <a:buFont typeface="Arial" panose="020B0604020202020204" pitchFamily="34" charset="0"/>
+              <a:buChar char="•"/>
+            </a:pPr>
+            <a:endParaRPr lang="es-ES_tradnl" dirty="0"/>
+          </a:p>
+          <a:p>
+            <a:pPr marL="171450" lvl="0" indent="-171450">
+              <a:buFont typeface="Arial" panose="020B0604020202020204" pitchFamily="34" charset="0"/>
+              <a:buChar char="•"/>
+            </a:pPr>
+            <a:r>
+              <a:rPr lang="es-ES_tradnl" dirty="0"/>
+              <a:t>EMPEZAR:</a:t>
+            </a:r>
+          </a:p>
+          <a:p>
+            <a:pPr marL="171450" lvl="0" indent="-171450">
+              <a:buFont typeface="Arial" panose="020B0604020202020204" pitchFamily="34" charset="0"/>
+              <a:buChar char="•"/>
+            </a:pPr>
+            <a:r>
+              <a:rPr lang="es-ES_tradnl" dirty="0" err="1"/>
+              <a:t>Let’s</a:t>
+            </a:r>
+            <a:r>
+              <a:rPr lang="es-ES_tradnl" dirty="0"/>
+              <a:t> </a:t>
+            </a:r>
+            <a:r>
+              <a:rPr lang="es-ES_tradnl" dirty="0" err="1"/>
+              <a:t>get</a:t>
+            </a:r>
+            <a:r>
+              <a:rPr lang="es-ES_tradnl" dirty="0"/>
+              <a:t> </a:t>
+            </a:r>
+            <a:r>
+              <a:rPr lang="es-ES_tradnl" dirty="0" err="1"/>
+              <a:t>into</a:t>
+            </a:r>
+            <a:r>
+              <a:rPr lang="es-ES_tradnl" dirty="0"/>
+              <a:t> </a:t>
+            </a:r>
+            <a:r>
+              <a:rPr lang="es-ES_tradnl" dirty="0" err="1"/>
+              <a:t>the</a:t>
+            </a:r>
+            <a:r>
+              <a:rPr lang="es-ES_tradnl" dirty="0"/>
+              <a:t> LAYER </a:t>
+            </a:r>
+            <a:r>
+              <a:rPr lang="es-ES_tradnl" dirty="0" err="1"/>
+              <a:t>of</a:t>
+            </a:r>
+            <a:r>
+              <a:rPr lang="es-ES_tradnl" dirty="0"/>
+              <a:t> </a:t>
+            </a:r>
+            <a:r>
+              <a:rPr lang="es-ES_tradnl" dirty="0" err="1"/>
+              <a:t>that</a:t>
+            </a:r>
+            <a:r>
+              <a:rPr lang="es-ES_tradnl" dirty="0"/>
+              <a:t> STAFF and </a:t>
+            </a:r>
+            <a:r>
+              <a:rPr lang="es-ES_tradnl" dirty="0" err="1"/>
+              <a:t>encode</a:t>
+            </a:r>
+            <a:r>
+              <a:rPr lang="es-ES_tradnl" dirty="0"/>
+              <a:t> </a:t>
+            </a:r>
+            <a:r>
+              <a:rPr lang="es-ES_tradnl" dirty="0" err="1"/>
+              <a:t>the</a:t>
+            </a:r>
+            <a:r>
+              <a:rPr lang="es-ES_tradnl" dirty="0"/>
+              <a:t> music </a:t>
+            </a:r>
+            <a:r>
+              <a:rPr lang="es-ES_tradnl" dirty="0" err="1"/>
+              <a:t>content</a:t>
+            </a:r>
+            <a:r>
+              <a:rPr lang="es-ES_tradnl" dirty="0"/>
+              <a:t> (</a:t>
+            </a:r>
+            <a:r>
+              <a:rPr lang="es-ES_tradnl" dirty="0" err="1"/>
+              <a:t>rests</a:t>
+            </a:r>
+            <a:r>
+              <a:rPr lang="es-ES_tradnl" dirty="0"/>
+              <a:t> and notes)</a:t>
+            </a:r>
+          </a:p>
+          <a:p>
+            <a:pPr marL="628650" lvl="1" indent="-171450">
+              <a:buFont typeface="Arial" panose="020B0604020202020204" pitchFamily="34" charset="0"/>
+              <a:buChar char="•"/>
+            </a:pPr>
+            <a:r>
+              <a:rPr lang="es-ES_tradnl" dirty="0" err="1"/>
+              <a:t>Rests</a:t>
+            </a:r>
+            <a:r>
+              <a:rPr lang="es-ES_tradnl" dirty="0"/>
+              <a:t> </a:t>
+            </a:r>
+            <a:r>
+              <a:rPr lang="es-ES_tradnl" dirty="0">
+                <a:sym typeface="Wingdings" pitchFamily="2" charset="2"/>
+              </a:rPr>
+              <a:t> </a:t>
+            </a:r>
+            <a:r>
+              <a:rPr lang="es-ES_tradnl" dirty="0" err="1">
+                <a:sym typeface="Wingdings" pitchFamily="2" charset="2"/>
+              </a:rPr>
+              <a:t>only</a:t>
+            </a:r>
+            <a:r>
+              <a:rPr lang="es-ES_tradnl" dirty="0">
+                <a:sym typeface="Wingdings" pitchFamily="2" charset="2"/>
+              </a:rPr>
+              <a:t> @</a:t>
+            </a:r>
+            <a:r>
+              <a:rPr lang="es-ES_tradnl" dirty="0" err="1">
+                <a:sym typeface="Wingdings" pitchFamily="2" charset="2"/>
+              </a:rPr>
+              <a:t>dur</a:t>
+            </a:r>
+            <a:endParaRPr lang="es-ES_tradnl" dirty="0">
+              <a:sym typeface="Wingdings" pitchFamily="2" charset="2"/>
+            </a:endParaRPr>
+          </a:p>
+          <a:p>
+            <a:pPr marL="628650" lvl="1" indent="-171450">
+              <a:buFont typeface="Arial" panose="020B0604020202020204" pitchFamily="34" charset="0"/>
+              <a:buChar char="•"/>
+            </a:pPr>
+            <a:r>
+              <a:rPr lang="es-ES_tradnl" dirty="0">
+                <a:sym typeface="Wingdings" pitchFamily="2" charset="2"/>
+              </a:rPr>
+              <a:t>Notes  @</a:t>
+            </a:r>
+            <a:r>
+              <a:rPr lang="es-ES_tradnl" dirty="0" err="1">
+                <a:sym typeface="Wingdings" pitchFamily="2" charset="2"/>
+              </a:rPr>
+              <a:t>dur</a:t>
+            </a:r>
+            <a:r>
+              <a:rPr lang="es-ES_tradnl" dirty="0">
+                <a:sym typeface="Wingdings" pitchFamily="2" charset="2"/>
+              </a:rPr>
+              <a:t>, </a:t>
+            </a:r>
+            <a:r>
+              <a:rPr lang="es-ES_tradnl" dirty="0" err="1">
+                <a:sym typeface="Wingdings" pitchFamily="2" charset="2"/>
+              </a:rPr>
+              <a:t>but</a:t>
+            </a:r>
+            <a:r>
+              <a:rPr lang="es-ES_tradnl" dirty="0">
+                <a:sym typeface="Wingdings" pitchFamily="2" charset="2"/>
+              </a:rPr>
+              <a:t> </a:t>
+            </a:r>
+            <a:r>
+              <a:rPr lang="es-ES_tradnl" dirty="0" err="1">
+                <a:sym typeface="Wingdings" pitchFamily="2" charset="2"/>
+              </a:rPr>
+              <a:t>also</a:t>
+            </a:r>
+            <a:r>
+              <a:rPr lang="es-ES_tradnl" dirty="0">
+                <a:sym typeface="Wingdings" pitchFamily="2" charset="2"/>
+              </a:rPr>
+              <a:t> pitch and octave</a:t>
+            </a:r>
+          </a:p>
+          <a:p>
+            <a:pPr marL="628650" lvl="1" indent="-171450">
+              <a:buFont typeface="Arial" panose="020B0604020202020204" pitchFamily="34" charset="0"/>
+              <a:buChar char="•"/>
+            </a:pPr>
+            <a:endParaRPr lang="es-ES_tradnl" dirty="0">
+              <a:sym typeface="Wingdings" pitchFamily="2" charset="2"/>
+            </a:endParaRPr>
+          </a:p>
+          <a:p>
+            <a:pPr marL="171450" lvl="0" indent="-171450">
+              <a:buFont typeface="Arial" panose="020B0604020202020204" pitchFamily="34" charset="0"/>
+              <a:buChar char="•"/>
+            </a:pPr>
+            <a:r>
+              <a:rPr lang="es-ES_tradnl" dirty="0">
+                <a:sym typeface="Wingdings" pitchFamily="2" charset="2"/>
+              </a:rPr>
+              <a:t>Ahora probemos con el texto (las sílabas)</a:t>
+            </a:r>
+            <a:endParaRPr lang="es-ES_tradnl" dirty="0"/>
+          </a:p>
+        </p:txBody>
+      </p:sp>
+      <p:sp>
+        <p:nvSpPr>
+          <p:cNvPr id="4" name="Slide Number Placeholder 3"/>
+          <p:cNvSpPr>
+            <a:spLocks noGrp="1"/>
+          </p:cNvSpPr>
+          <p:nvPr>
+            <p:ph type="sldNum" sz="quarter" idx="5"/>
+          </p:nvPr>
+        </p:nvSpPr>
+        <p:spPr/>
+        <p:txBody>
+          <a:bodyPr/>
+          <a:lstStyle/>
+          <a:p>
+            <a:fld id="{F0D413E3-D7D5-FA47-AC82-B3DDF4FE716B}" type="slidenum">
+              <a:rPr lang="en-US" smtClean="0"/>
+              <a:t>18</a:t>
+            </a:fld>
+            <a:endParaRPr lang="en-US"/>
+          </a:p>
+        </p:txBody>
+      </p:sp>
+    </p:spTree>
+    <p:extLst>
+      <p:ext uri="{BB962C8B-B14F-4D97-AF65-F5344CB8AC3E}">
+        <p14:creationId xmlns:p14="http://schemas.microsoft.com/office/powerpoint/2010/main" val="1046868578"/>
+      </p:ext>
+    </p:extLst>
+  </p:cSld>
+  <p:clrMapOvr>
+    <a:masterClrMapping/>
+  </p:clrMapOvr>
+</p:notes>
+</file>
+
+<file path=ppt/notesSlides/notesSlide13.xml><?xml version="1.0" encoding="utf-8"?>
+<p:notes xmlns:a="http://schemas.openxmlformats.org/drawingml/2006/main" xmlns:r="http://schemas.openxmlformats.org/officeDocument/2006/relationships" xmlns:p="http://schemas.openxmlformats.org/presentationml/2006/main">
+  <p:cSld>
+    <p:spTree>
+      <p:nvGrpSpPr>
+        <p:cNvPr id="1" name=""/>
+        <p:cNvGrpSpPr/>
+        <p:nvPr/>
+      </p:nvGrpSpPr>
+      <p:grpSpPr>
+        <a:xfrm>
+          <a:off x="0" y="0"/>
+          <a:ext cx="0" cy="0"/>
+          <a:chOff x="0" y="0"/>
+          <a:chExt cx="0" cy="0"/>
+        </a:xfrm>
+      </p:grpSpPr>
+      <p:sp>
+        <p:nvSpPr>
+          <p:cNvPr id="2" name="Slide Image Placeholder 1"/>
+          <p:cNvSpPr>
+            <a:spLocks noGrp="1" noRot="1" noChangeAspect="1"/>
+          </p:cNvSpPr>
+          <p:nvPr>
+            <p:ph type="sldImg"/>
+          </p:nvPr>
+        </p:nvSpPr>
+        <p:spPr/>
+      </p:sp>
+      <p:sp>
+        <p:nvSpPr>
+          <p:cNvPr id="3" name="Notes Placeholder 2"/>
+          <p:cNvSpPr>
+            <a:spLocks noGrp="1"/>
+          </p:cNvSpPr>
+          <p:nvPr>
+            <p:ph type="body" idx="1"/>
+          </p:nvPr>
+        </p:nvSpPr>
+        <p:spPr/>
+        <p:txBody>
+          <a:bodyPr/>
+          <a:lstStyle/>
+          <a:p>
+            <a:r>
+              <a:rPr lang="es-ES_tradnl" dirty="0" err="1"/>
+              <a:t>Start</a:t>
+            </a:r>
+            <a:r>
+              <a:rPr lang="es-ES_tradnl" dirty="0"/>
+              <a:t> </a:t>
+            </a:r>
+            <a:r>
+              <a:rPr lang="es-ES_tradnl" dirty="0" err="1"/>
+              <a:t>with</a:t>
+            </a:r>
+            <a:r>
+              <a:rPr lang="es-ES_tradnl" dirty="0"/>
+              <a:t> STAFFDEF:</a:t>
+            </a:r>
+          </a:p>
+          <a:p>
+            <a:pPr marL="171450" indent="-171450">
+              <a:buFont typeface="Arial" panose="020B0604020202020204" pitchFamily="34" charset="0"/>
+              <a:buChar char="•"/>
+            </a:pPr>
+            <a:r>
+              <a:rPr lang="es-ES_tradnl" dirty="0"/>
+              <a:t>n=“1”</a:t>
+            </a:r>
+          </a:p>
+          <a:p>
+            <a:pPr marL="171450" indent="-171450">
+              <a:buFont typeface="Arial" panose="020B0604020202020204" pitchFamily="34" charset="0"/>
+              <a:buChar char="•"/>
+            </a:pPr>
+            <a:r>
+              <a:rPr lang="es-ES_tradnl" dirty="0" err="1"/>
+              <a:t>lines</a:t>
+            </a:r>
+            <a:r>
+              <a:rPr lang="es-ES_tradnl" dirty="0"/>
+              <a:t>=“5”</a:t>
+            </a:r>
+          </a:p>
+          <a:p>
+            <a:pPr marL="171450" indent="-171450">
+              <a:buFont typeface="Arial" panose="020B0604020202020204" pitchFamily="34" charset="0"/>
+              <a:buChar char="•"/>
+            </a:pPr>
+            <a:r>
+              <a:rPr lang="es-ES_tradnl" dirty="0" err="1"/>
+              <a:t>clef</a:t>
+            </a:r>
+            <a:endParaRPr lang="es-ES_tradnl" dirty="0"/>
+          </a:p>
+          <a:p>
+            <a:pPr marL="628650" lvl="1" indent="-171450">
+              <a:buFont typeface="Arial" panose="020B0604020202020204" pitchFamily="34" charset="0"/>
+              <a:buChar char="•"/>
+            </a:pPr>
+            <a:r>
+              <a:rPr lang="es-ES_tradnl" dirty="0"/>
+              <a:t>.</a:t>
+            </a:r>
+            <a:r>
+              <a:rPr lang="es-ES_tradnl" dirty="0" err="1"/>
+              <a:t>shape</a:t>
+            </a:r>
+            <a:r>
+              <a:rPr lang="es-ES_tradnl" dirty="0"/>
+              <a:t>=“G”</a:t>
+            </a:r>
+          </a:p>
+          <a:p>
+            <a:pPr marL="628650" lvl="1" indent="-171450">
+              <a:buFont typeface="Arial" panose="020B0604020202020204" pitchFamily="34" charset="0"/>
+              <a:buChar char="•"/>
+            </a:pPr>
+            <a:r>
+              <a:rPr lang="es-ES_tradnl" dirty="0"/>
+              <a:t>.line=“2”</a:t>
+            </a:r>
+          </a:p>
+          <a:p>
+            <a:pPr marL="628650" lvl="1" indent="-171450">
+              <a:buFont typeface="Arial" panose="020B0604020202020204" pitchFamily="34" charset="0"/>
+              <a:buChar char="•"/>
+            </a:pPr>
+            <a:endParaRPr lang="es-ES_tradnl" dirty="0"/>
+          </a:p>
+          <a:p>
+            <a:pPr marL="171450" lvl="0" indent="-171450">
+              <a:buFont typeface="Arial" panose="020B0604020202020204" pitchFamily="34" charset="0"/>
+              <a:buChar char="•"/>
+            </a:pPr>
+            <a:r>
+              <a:rPr lang="es-ES_tradnl" dirty="0" err="1"/>
+              <a:t>Things</a:t>
+            </a:r>
+            <a:r>
+              <a:rPr lang="es-ES_tradnl" dirty="0"/>
+              <a:t> </a:t>
+            </a:r>
+            <a:r>
+              <a:rPr lang="es-ES_tradnl" dirty="0" err="1"/>
+              <a:t>that</a:t>
+            </a:r>
+            <a:r>
+              <a:rPr lang="es-ES_tradnl" dirty="0"/>
+              <a:t> are </a:t>
+            </a:r>
+            <a:r>
+              <a:rPr lang="es-ES_tradnl" dirty="0" err="1"/>
+              <a:t>shared</a:t>
+            </a:r>
+            <a:r>
+              <a:rPr lang="es-ES_tradnl" dirty="0"/>
+              <a:t> </a:t>
+            </a:r>
+            <a:r>
+              <a:rPr lang="es-ES_tradnl" dirty="0" err="1"/>
+              <a:t>with</a:t>
+            </a:r>
+            <a:r>
+              <a:rPr lang="es-ES_tradnl" dirty="0"/>
+              <a:t> </a:t>
+            </a:r>
+            <a:r>
+              <a:rPr lang="es-ES_tradnl" dirty="0" err="1"/>
+              <a:t>all</a:t>
+            </a:r>
+            <a:r>
+              <a:rPr lang="es-ES_tradnl" dirty="0"/>
+              <a:t> </a:t>
+            </a:r>
+            <a:r>
+              <a:rPr lang="es-ES_tradnl" dirty="0" err="1"/>
+              <a:t>staves</a:t>
+            </a:r>
+            <a:r>
+              <a:rPr lang="es-ES_tradnl" dirty="0"/>
+              <a:t>:</a:t>
+            </a:r>
+          </a:p>
+          <a:p>
+            <a:pPr marL="628650" lvl="1" indent="-171450">
+              <a:buFont typeface="Arial" panose="020B0604020202020204" pitchFamily="34" charset="0"/>
+              <a:buChar char="•"/>
+            </a:pPr>
+            <a:r>
+              <a:rPr lang="es-ES_tradnl" dirty="0" err="1"/>
+              <a:t>key.sig</a:t>
+            </a:r>
+            <a:r>
+              <a:rPr lang="es-ES_tradnl" dirty="0"/>
+              <a:t>="1s”  </a:t>
+            </a:r>
+            <a:r>
+              <a:rPr lang="es-ES_tradnl" dirty="0">
+                <a:sym typeface="Wingdings" pitchFamily="2" charset="2"/>
+              </a:rPr>
+              <a:t>  </a:t>
+            </a:r>
+            <a:r>
+              <a:rPr lang="en-CA" b="1" i="0" dirty="0" err="1">
+                <a:solidFill>
+                  <a:srgbClr val="202122"/>
+                </a:solidFill>
+                <a:effectLst/>
+                <a:latin typeface="Arial" panose="020B0604020202020204" pitchFamily="34" charset="0"/>
+              </a:rPr>
+              <a:t>armadura</a:t>
+            </a:r>
+            <a:r>
+              <a:rPr lang="en-CA" b="1" i="0" dirty="0">
+                <a:solidFill>
+                  <a:srgbClr val="202122"/>
+                </a:solidFill>
+                <a:effectLst/>
+                <a:latin typeface="Arial" panose="020B0604020202020204" pitchFamily="34" charset="0"/>
+              </a:rPr>
+              <a:t> de </a:t>
+            </a:r>
+            <a:r>
+              <a:rPr lang="en-CA" b="1" i="0" dirty="0" err="1">
+                <a:solidFill>
+                  <a:srgbClr val="202122"/>
+                </a:solidFill>
+                <a:effectLst/>
+                <a:latin typeface="Arial" panose="020B0604020202020204" pitchFamily="34" charset="0"/>
+              </a:rPr>
+              <a:t>tonalidad</a:t>
+            </a:r>
+            <a:endParaRPr lang="es-ES_tradnl" dirty="0"/>
+          </a:p>
+          <a:p>
+            <a:pPr marL="628650" lvl="1" indent="-171450">
+              <a:buFont typeface="Arial" panose="020B0604020202020204" pitchFamily="34" charset="0"/>
+              <a:buChar char="•"/>
+            </a:pPr>
+            <a:r>
+              <a:rPr lang="es-ES_tradnl" dirty="0"/>
+              <a:t>meter</a:t>
+            </a:r>
+          </a:p>
+          <a:p>
+            <a:pPr marL="1085850" lvl="2" indent="-171450">
+              <a:buFont typeface="Arial" panose="020B0604020202020204" pitchFamily="34" charset="0"/>
+              <a:buChar char="•"/>
+            </a:pPr>
+            <a:r>
+              <a:rPr lang="es-ES_tradnl" dirty="0"/>
+              <a:t>.</a:t>
+            </a:r>
+            <a:r>
+              <a:rPr lang="es-ES_tradnl" dirty="0" err="1"/>
+              <a:t>unit</a:t>
+            </a:r>
+            <a:r>
+              <a:rPr lang="es-ES_tradnl" dirty="0"/>
+              <a:t>=“4”</a:t>
+            </a:r>
+          </a:p>
+          <a:p>
+            <a:pPr marL="1085850" lvl="2" indent="-171450">
+              <a:buFont typeface="Arial" panose="020B0604020202020204" pitchFamily="34" charset="0"/>
+              <a:buChar char="•"/>
+            </a:pPr>
+            <a:r>
+              <a:rPr lang="es-ES_tradnl" dirty="0"/>
+              <a:t>.</a:t>
+            </a:r>
+            <a:r>
+              <a:rPr lang="es-ES_tradnl" dirty="0" err="1"/>
+              <a:t>count</a:t>
+            </a:r>
+            <a:r>
+              <a:rPr lang="es-ES_tradnl" dirty="0"/>
+              <a:t>="3”</a:t>
+            </a:r>
+          </a:p>
+          <a:p>
+            <a:pPr marL="1085850" lvl="2" indent="-171450">
+              <a:buFont typeface="Arial" panose="020B0604020202020204" pitchFamily="34" charset="0"/>
+              <a:buChar char="•"/>
+            </a:pPr>
+            <a:endParaRPr lang="es-ES_tradnl" dirty="0"/>
+          </a:p>
+          <a:p>
+            <a:pPr marL="171450" lvl="0" indent="-171450">
+              <a:buFont typeface="Arial" panose="020B0604020202020204" pitchFamily="34" charset="0"/>
+              <a:buChar char="•"/>
+            </a:pPr>
+            <a:r>
+              <a:rPr lang="es-ES_tradnl" dirty="0"/>
+              <a:t>Pasar plantilla</a:t>
+            </a:r>
+          </a:p>
+          <a:p>
+            <a:pPr marL="171450" lvl="0" indent="-171450">
+              <a:buFont typeface="Arial" panose="020B0604020202020204" pitchFamily="34" charset="0"/>
+              <a:buChar char="•"/>
+            </a:pPr>
+            <a:r>
+              <a:rPr lang="es-ES_tradnl" dirty="0"/>
+              <a:t>Explicar</a:t>
+            </a:r>
+          </a:p>
+          <a:p>
+            <a:pPr marL="171450" lvl="0" indent="-171450">
+              <a:buFont typeface="Arial" panose="020B0604020202020204" pitchFamily="34" charset="0"/>
+              <a:buChar char="•"/>
+            </a:pPr>
+            <a:endParaRPr lang="es-ES_tradnl" dirty="0"/>
+          </a:p>
+          <a:p>
+            <a:pPr marL="171450" lvl="0" indent="-171450">
+              <a:buFont typeface="Arial" panose="020B0604020202020204" pitchFamily="34" charset="0"/>
+              <a:buChar char="•"/>
+            </a:pPr>
+            <a:r>
+              <a:rPr lang="es-ES_tradnl" dirty="0"/>
+              <a:t>EMPEZAR:</a:t>
+            </a:r>
+          </a:p>
+          <a:p>
+            <a:pPr marL="171450" lvl="0" indent="-171450">
+              <a:buFont typeface="Arial" panose="020B0604020202020204" pitchFamily="34" charset="0"/>
+              <a:buChar char="•"/>
+            </a:pPr>
+            <a:r>
+              <a:rPr lang="es-ES_tradnl" dirty="0" err="1"/>
+              <a:t>Let’s</a:t>
+            </a:r>
+            <a:r>
+              <a:rPr lang="es-ES_tradnl" dirty="0"/>
+              <a:t> </a:t>
+            </a:r>
+            <a:r>
+              <a:rPr lang="es-ES_tradnl" dirty="0" err="1"/>
+              <a:t>get</a:t>
+            </a:r>
+            <a:r>
+              <a:rPr lang="es-ES_tradnl" dirty="0"/>
+              <a:t> </a:t>
+            </a:r>
+            <a:r>
+              <a:rPr lang="es-ES_tradnl" dirty="0" err="1"/>
+              <a:t>into</a:t>
+            </a:r>
+            <a:r>
+              <a:rPr lang="es-ES_tradnl" dirty="0"/>
+              <a:t> </a:t>
+            </a:r>
+            <a:r>
+              <a:rPr lang="es-ES_tradnl" dirty="0" err="1"/>
+              <a:t>the</a:t>
+            </a:r>
+            <a:r>
+              <a:rPr lang="es-ES_tradnl" dirty="0"/>
+              <a:t> LAYER </a:t>
+            </a:r>
+            <a:r>
+              <a:rPr lang="es-ES_tradnl" dirty="0" err="1"/>
+              <a:t>of</a:t>
+            </a:r>
+            <a:r>
+              <a:rPr lang="es-ES_tradnl" dirty="0"/>
+              <a:t> </a:t>
+            </a:r>
+            <a:r>
+              <a:rPr lang="es-ES_tradnl" dirty="0" err="1"/>
+              <a:t>that</a:t>
+            </a:r>
+            <a:r>
+              <a:rPr lang="es-ES_tradnl" dirty="0"/>
+              <a:t> STAFF and </a:t>
+            </a:r>
+            <a:r>
+              <a:rPr lang="es-ES_tradnl" dirty="0" err="1"/>
+              <a:t>encode</a:t>
+            </a:r>
+            <a:r>
+              <a:rPr lang="es-ES_tradnl" dirty="0"/>
+              <a:t> </a:t>
+            </a:r>
+            <a:r>
+              <a:rPr lang="es-ES_tradnl" dirty="0" err="1"/>
+              <a:t>the</a:t>
+            </a:r>
+            <a:r>
+              <a:rPr lang="es-ES_tradnl" dirty="0"/>
+              <a:t> music </a:t>
+            </a:r>
+            <a:r>
+              <a:rPr lang="es-ES_tradnl" dirty="0" err="1"/>
+              <a:t>content</a:t>
+            </a:r>
+            <a:r>
+              <a:rPr lang="es-ES_tradnl" dirty="0"/>
+              <a:t> (</a:t>
+            </a:r>
+            <a:r>
+              <a:rPr lang="es-ES_tradnl" dirty="0" err="1"/>
+              <a:t>rests</a:t>
+            </a:r>
+            <a:r>
+              <a:rPr lang="es-ES_tradnl" dirty="0"/>
+              <a:t> and notes)</a:t>
+            </a:r>
+          </a:p>
+          <a:p>
+            <a:pPr marL="628650" lvl="1" indent="-171450">
+              <a:buFont typeface="Arial" panose="020B0604020202020204" pitchFamily="34" charset="0"/>
+              <a:buChar char="•"/>
+            </a:pPr>
+            <a:r>
+              <a:rPr lang="es-ES_tradnl" dirty="0" err="1"/>
+              <a:t>Rests</a:t>
+            </a:r>
+            <a:r>
+              <a:rPr lang="es-ES_tradnl" dirty="0"/>
+              <a:t> </a:t>
+            </a:r>
+            <a:r>
+              <a:rPr lang="es-ES_tradnl" dirty="0">
+                <a:sym typeface="Wingdings" pitchFamily="2" charset="2"/>
+              </a:rPr>
+              <a:t> </a:t>
+            </a:r>
+            <a:r>
+              <a:rPr lang="es-ES_tradnl" dirty="0" err="1">
+                <a:sym typeface="Wingdings" pitchFamily="2" charset="2"/>
+              </a:rPr>
+              <a:t>only</a:t>
+            </a:r>
+            <a:r>
+              <a:rPr lang="es-ES_tradnl" dirty="0">
+                <a:sym typeface="Wingdings" pitchFamily="2" charset="2"/>
+              </a:rPr>
+              <a:t> @</a:t>
+            </a:r>
+            <a:r>
+              <a:rPr lang="es-ES_tradnl" dirty="0" err="1">
+                <a:sym typeface="Wingdings" pitchFamily="2" charset="2"/>
+              </a:rPr>
+              <a:t>dur</a:t>
+            </a:r>
+            <a:endParaRPr lang="es-ES_tradnl" dirty="0">
+              <a:sym typeface="Wingdings" pitchFamily="2" charset="2"/>
+            </a:endParaRPr>
+          </a:p>
+          <a:p>
+            <a:pPr marL="628650" lvl="1" indent="-171450">
+              <a:buFont typeface="Arial" panose="020B0604020202020204" pitchFamily="34" charset="0"/>
+              <a:buChar char="•"/>
+            </a:pPr>
+            <a:r>
+              <a:rPr lang="es-ES_tradnl" dirty="0">
+                <a:sym typeface="Wingdings" pitchFamily="2" charset="2"/>
+              </a:rPr>
+              <a:t>Notes  @</a:t>
+            </a:r>
+            <a:r>
+              <a:rPr lang="es-ES_tradnl" dirty="0" err="1">
+                <a:sym typeface="Wingdings" pitchFamily="2" charset="2"/>
+              </a:rPr>
+              <a:t>dur</a:t>
+            </a:r>
+            <a:r>
+              <a:rPr lang="es-ES_tradnl" dirty="0">
+                <a:sym typeface="Wingdings" pitchFamily="2" charset="2"/>
+              </a:rPr>
+              <a:t>, </a:t>
+            </a:r>
+            <a:r>
+              <a:rPr lang="es-ES_tradnl" dirty="0" err="1">
+                <a:sym typeface="Wingdings" pitchFamily="2" charset="2"/>
+              </a:rPr>
+              <a:t>but</a:t>
+            </a:r>
+            <a:r>
+              <a:rPr lang="es-ES_tradnl" dirty="0">
+                <a:sym typeface="Wingdings" pitchFamily="2" charset="2"/>
+              </a:rPr>
+              <a:t> </a:t>
+            </a:r>
+            <a:r>
+              <a:rPr lang="es-ES_tradnl" dirty="0" err="1">
+                <a:sym typeface="Wingdings" pitchFamily="2" charset="2"/>
+              </a:rPr>
+              <a:t>also</a:t>
+            </a:r>
+            <a:r>
+              <a:rPr lang="es-ES_tradnl" dirty="0">
+                <a:sym typeface="Wingdings" pitchFamily="2" charset="2"/>
+              </a:rPr>
+              <a:t> pitch and octave</a:t>
+            </a:r>
+          </a:p>
+          <a:p>
+            <a:pPr marL="628650" lvl="1" indent="-171450">
+              <a:buFont typeface="Arial" panose="020B0604020202020204" pitchFamily="34" charset="0"/>
+              <a:buChar char="•"/>
+            </a:pPr>
+            <a:endParaRPr lang="es-ES_tradnl" dirty="0">
+              <a:sym typeface="Wingdings" pitchFamily="2" charset="2"/>
+            </a:endParaRPr>
+          </a:p>
+          <a:p>
+            <a:pPr marL="171450" lvl="0" indent="-171450">
+              <a:buFont typeface="Arial" panose="020B0604020202020204" pitchFamily="34" charset="0"/>
+              <a:buChar char="•"/>
+            </a:pPr>
+            <a:r>
+              <a:rPr lang="es-ES_tradnl" dirty="0">
+                <a:sym typeface="Wingdings" pitchFamily="2" charset="2"/>
+              </a:rPr>
+              <a:t>Ahora probemos con el texto (las sílabas)</a:t>
+            </a:r>
+            <a:endParaRPr lang="es-ES_tradnl" dirty="0"/>
+          </a:p>
+        </p:txBody>
+      </p:sp>
+      <p:sp>
+        <p:nvSpPr>
+          <p:cNvPr id="4" name="Slide Number Placeholder 3"/>
+          <p:cNvSpPr>
+            <a:spLocks noGrp="1"/>
+          </p:cNvSpPr>
+          <p:nvPr>
+            <p:ph type="sldNum" sz="quarter" idx="5"/>
+          </p:nvPr>
+        </p:nvSpPr>
+        <p:spPr/>
+        <p:txBody>
+          <a:bodyPr/>
+          <a:lstStyle/>
+          <a:p>
+            <a:fld id="{F0D413E3-D7D5-FA47-AC82-B3DDF4FE716B}" type="slidenum">
+              <a:rPr lang="en-US" smtClean="0"/>
               <a:t>19</a:t>
             </a:fld>
             <a:endParaRPr lang="en-US"/>
@@ -1705,7 +1910,166 @@
 </p:notes>
 </file>
 
-<file path=ppt/notesSlides/notesSlide12.xml><?xml version="1.0" encoding="utf-8"?>
+<file path=ppt/notesSlides/notesSlide14.xml><?xml version="1.0" encoding="utf-8"?>
+<p:notes xmlns:a="http://schemas.openxmlformats.org/drawingml/2006/main" xmlns:r="http://schemas.openxmlformats.org/officeDocument/2006/relationships" xmlns:p="http://schemas.openxmlformats.org/presentationml/2006/main">
+  <p:cSld>
+    <p:spTree>
+      <p:nvGrpSpPr>
+        <p:cNvPr id="1" name=""/>
+        <p:cNvGrpSpPr/>
+        <p:nvPr/>
+      </p:nvGrpSpPr>
+      <p:grpSpPr>
+        <a:xfrm>
+          <a:off x="0" y="0"/>
+          <a:ext cx="0" cy="0"/>
+          <a:chOff x="0" y="0"/>
+          <a:chExt cx="0" cy="0"/>
+        </a:xfrm>
+      </p:grpSpPr>
+      <p:sp>
+        <p:nvSpPr>
+          <p:cNvPr id="2" name="Slide Image Placeholder 1"/>
+          <p:cNvSpPr>
+            <a:spLocks noGrp="1" noRot="1" noChangeAspect="1"/>
+          </p:cNvSpPr>
+          <p:nvPr>
+            <p:ph type="sldImg"/>
+          </p:nvPr>
+        </p:nvSpPr>
+        <p:spPr/>
+      </p:sp>
+      <p:sp>
+        <p:nvSpPr>
+          <p:cNvPr id="3" name="Notes Placeholder 2"/>
+          <p:cNvSpPr>
+            <a:spLocks noGrp="1"/>
+          </p:cNvSpPr>
+          <p:nvPr>
+            <p:ph type="body" idx="1"/>
+          </p:nvPr>
+        </p:nvSpPr>
+        <p:spPr/>
+        <p:txBody>
+          <a:bodyPr/>
+          <a:lstStyle/>
+          <a:p>
+            <a:r>
+              <a:rPr lang="en-CA" dirty="0"/>
+              <a:t>- </a:t>
+            </a:r>
+            <a:r>
+              <a:rPr lang="en-CA" dirty="0" err="1"/>
+              <a:t>Ahora</a:t>
+            </a:r>
+            <a:r>
+              <a:rPr lang="en-CA" dirty="0"/>
+              <a:t> se </a:t>
+            </a:r>
+            <a:r>
+              <a:rPr lang="en-CA" dirty="0" err="1"/>
+              <a:t>puede</a:t>
+            </a:r>
+            <a:r>
+              <a:rPr lang="en-CA" dirty="0"/>
+              <a:t> exporter MEI </a:t>
+            </a:r>
+            <a:r>
+              <a:rPr lang="en-CA" dirty="0" err="1"/>
+              <a:t>desde</a:t>
+            </a:r>
+            <a:r>
+              <a:rPr lang="en-CA" dirty="0"/>
+              <a:t> </a:t>
+            </a:r>
+            <a:r>
+              <a:rPr lang="en-CA" dirty="0" err="1"/>
+              <a:t>MuseScore</a:t>
+            </a:r>
+            <a:r>
+              <a:rPr lang="en-CA" dirty="0"/>
+              <a:t> (antes solo se podia </a:t>
+            </a:r>
+            <a:r>
+              <a:rPr lang="en-CA" dirty="0" err="1"/>
+              <a:t>en</a:t>
+            </a:r>
+            <a:r>
+              <a:rPr lang="en-CA" dirty="0"/>
+              <a:t> Sibelius </a:t>
+            </a:r>
+            <a:r>
+              <a:rPr lang="en-CA" dirty="0" err="1"/>
+              <a:t>por</a:t>
+            </a:r>
+            <a:r>
+              <a:rPr lang="en-CA" dirty="0"/>
+              <a:t> medio de un plugin, </a:t>
+            </a:r>
+            <a:r>
+              <a:rPr lang="en-CA" dirty="0" err="1"/>
+              <a:t>ahora</a:t>
+            </a:r>
+            <a:r>
+              <a:rPr lang="en-CA" dirty="0"/>
+              <a:t> hay uno para </a:t>
+            </a:r>
+            <a:r>
+              <a:rPr lang="en-CA" dirty="0" err="1"/>
+              <a:t>MuseScore</a:t>
+            </a:r>
+            <a:r>
+              <a:rPr lang="en-CA" dirty="0"/>
+              <a:t> </a:t>
+            </a:r>
+            <a:r>
+              <a:rPr lang="en-CA" dirty="0" err="1"/>
+              <a:t>también</a:t>
+            </a:r>
+            <a:r>
+              <a:rPr lang="en-CA" dirty="0"/>
+              <a:t>)</a:t>
+            </a:r>
+          </a:p>
+        </p:txBody>
+      </p:sp>
+      <p:sp>
+        <p:nvSpPr>
+          <p:cNvPr id="4" name="Slide Number Placeholder 3"/>
+          <p:cNvSpPr>
+            <a:spLocks noGrp="1"/>
+          </p:cNvSpPr>
+          <p:nvPr>
+            <p:ph type="sldNum" sz="quarter" idx="5"/>
+          </p:nvPr>
+        </p:nvSpPr>
+        <p:spPr/>
+        <p:txBody>
+          <a:bodyPr/>
+          <a:lstStyle/>
+          <a:p>
+            <a:fld id="{F0D413E3-D7D5-FA47-AC82-B3DDF4FE716B}" type="slidenum">
+              <a:rPr lang="en-US" smtClean="0"/>
+              <a:t>23</a:t>
+            </a:fld>
+            <a:endParaRPr lang="en-US"/>
+          </a:p>
+        </p:txBody>
+      </p:sp>
+    </p:spTree>
+    <p:extLst>
+      <p:ext uri="{BB962C8B-B14F-4D97-AF65-F5344CB8AC3E}">
+        <p14:creationId xmlns:p14="http://schemas.microsoft.com/office/powerpoint/2010/main" val="2804210910"/>
+      </p:ext>
+    </p:extLst>
+  </p:cSld>
+  <p:clrMapOvr>
+    <a:masterClrMapping/>
+  </p:clrMapOvr>
+</p:notes>
+</file>
+
+<file path=ppt/notesSlides/notesSlide15.xml><?xml version="1.0" encoding="utf-8"?>
 <p:notes xmlns:a="http://schemas.openxmlformats.org/drawingml/2006/main" xmlns:r="http://schemas.openxmlformats.org/officeDocument/2006/relationships" xmlns:p="http://schemas.openxmlformats.org/presentationml/2006/main">
   <p:cSld>
     <p:spTree>
@@ -1895,7 +2259,7 @@
           <a:p>
             <a:r>
               <a:rPr lang="en-US" dirty="0" err="1"/>
-              <a:t>Importar</a:t>
+              <a:t>Exportar</a:t>
             </a:r>
             <a:r>
               <a:rPr lang="en-US" dirty="0"/>
@@ -1926,7 +2290,7 @@
           <a:p>
             <a:fld id="{F0D413E3-D7D5-FA47-AC82-B3DDF4FE716B}" type="slidenum">
               <a:rPr lang="en-US" smtClean="0"/>
-              <a:t>6</a:t>
+              <a:t>5</a:t>
             </a:fld>
             <a:endParaRPr lang="en-US"/>
           </a:p>
@@ -1935,7 +2299,7 @@
     </p:spTree>
     <p:extLst>
       <p:ext uri="{BB962C8B-B14F-4D97-AF65-F5344CB8AC3E}">
-        <p14:creationId xmlns:p14="http://schemas.microsoft.com/office/powerpoint/2010/main" val="4219768113"/>
+        <p14:creationId xmlns:p14="http://schemas.microsoft.com/office/powerpoint/2010/main" val="809090891"/>
       </p:ext>
     </p:extLst>
   </p:cSld>
@@ -1990,124 +2354,16 @@
           <a:lstStyle/>
           <a:p>
             <a:r>
-              <a:rPr lang="en-CA" b="0" i="0" u="none" strike="noStrike" dirty="0" err="1">
-                <a:solidFill>
-                  <a:srgbClr val="177C12"/>
-                </a:solidFill>
-                <a:effectLst/>
-                <a:latin typeface="ui-sans-serif"/>
-              </a:rPr>
-              <a:t>Usa</a:t>
-            </a:r>
-            <a:r>
-              <a:rPr lang="en-CA" b="0" i="0" u="none" strike="noStrike" dirty="0">
-                <a:solidFill>
-                  <a:srgbClr val="177C12"/>
-                </a:solidFill>
-                <a:effectLst/>
-                <a:latin typeface="ui-sans-serif"/>
-              </a:rPr>
-              <a:t> un </a:t>
-            </a:r>
-            <a:r>
-              <a:rPr lang="en-CA" b="0" i="0" u="none" strike="noStrike" dirty="0" err="1">
-                <a:solidFill>
-                  <a:srgbClr val="177C12"/>
-                </a:solidFill>
-                <a:effectLst/>
-                <a:latin typeface="ui-sans-serif"/>
-              </a:rPr>
-              <a:t>lenguaje</a:t>
-            </a:r>
-            <a:r>
-              <a:rPr lang="en-CA" b="0" i="0" u="none" strike="noStrike" dirty="0">
-                <a:solidFill>
-                  <a:srgbClr val="177C12"/>
-                </a:solidFill>
-                <a:effectLst/>
-                <a:latin typeface="ui-sans-serif"/>
-              </a:rPr>
-              <a:t> de </a:t>
-            </a:r>
-            <a:r>
-              <a:rPr lang="en-CA" b="0" i="0" u="none" strike="noStrike" dirty="0" err="1">
-                <a:solidFill>
-                  <a:srgbClr val="177C12"/>
-                </a:solidFill>
-                <a:effectLst/>
-                <a:latin typeface="ui-sans-serif"/>
-              </a:rPr>
-              <a:t>etiquetado</a:t>
-            </a:r>
-            <a:r>
-              <a:rPr lang="en-CA" b="0" i="0" u="none" strike="noStrike" dirty="0">
-                <a:solidFill>
-                  <a:srgbClr val="177C12"/>
-                </a:solidFill>
-                <a:effectLst/>
-                <a:latin typeface="ui-sans-serif"/>
-              </a:rPr>
-              <a:t> (pitch, step, octave, duration) con </a:t>
-            </a:r>
-            <a:r>
-              <a:rPr lang="en-CA" b="0" i="0" u="none" strike="noStrike" dirty="0" err="1">
-                <a:solidFill>
-                  <a:srgbClr val="177C12"/>
-                </a:solidFill>
-                <a:effectLst/>
-                <a:latin typeface="ui-sans-serif"/>
-              </a:rPr>
-              <a:t>una</a:t>
-            </a:r>
-            <a:r>
-              <a:rPr lang="en-CA" b="0" i="0" u="none" strike="noStrike" dirty="0">
-                <a:solidFill>
-                  <a:srgbClr val="177C12"/>
-                </a:solidFill>
-                <a:effectLst/>
-                <a:latin typeface="ui-sans-serif"/>
-              </a:rPr>
+              <a:rPr lang="en-US" dirty="0" err="1"/>
+              <a:t>Importar</a:t>
+            </a:r>
+            <a:r>
+              <a:rPr lang="en-US" dirty="0"/>
               <a:t> </a:t>
             </a:r>
             <a:r>
-              <a:rPr lang="en-CA" b="0" i="0" u="none" strike="noStrike" dirty="0" err="1">
-                <a:solidFill>
-                  <a:srgbClr val="177C12"/>
-                </a:solidFill>
-                <a:effectLst/>
-                <a:latin typeface="ui-sans-serif"/>
-              </a:rPr>
-              <a:t>estructura</a:t>
-            </a:r>
-            <a:r>
-              <a:rPr lang="en-CA" b="0" i="0" u="none" strike="noStrike" dirty="0">
-                <a:solidFill>
-                  <a:srgbClr val="177C12"/>
-                </a:solidFill>
-                <a:effectLst/>
-                <a:latin typeface="ui-sans-serif"/>
-              </a:rPr>
-              <a:t> </a:t>
-            </a:r>
-            <a:r>
-              <a:rPr lang="en-CA" b="0" i="0" u="none" strike="noStrike" dirty="0" err="1">
-                <a:solidFill>
-                  <a:srgbClr val="177C12"/>
-                </a:solidFill>
-                <a:effectLst/>
-                <a:latin typeface="ui-sans-serif"/>
-              </a:rPr>
-              <a:t>jerárquica</a:t>
-            </a:r>
-            <a:r>
-              <a:rPr lang="en-CA" b="0" i="0" u="none" strike="noStrike" dirty="0">
-                <a:solidFill>
-                  <a:srgbClr val="177C12"/>
-                </a:solidFill>
-                <a:effectLst/>
-                <a:latin typeface="ui-sans-serif"/>
-              </a:rPr>
-              <a:t>.</a:t>
+              <a:rPr lang="en-US" dirty="0" err="1"/>
+              <a:t>MusicXML</a:t>
             </a:r>
             <a:endParaRPr lang="en-US" dirty="0"/>
           </a:p>
@@ -2130,7 +2386,7 @@
           <a:p>
             <a:fld id="{F0D413E3-D7D5-FA47-AC82-B3DDF4FE716B}" type="slidenum">
               <a:rPr lang="en-US" smtClean="0"/>
-              <a:t>8</a:t>
+              <a:t>6</a:t>
             </a:fld>
             <a:endParaRPr lang="en-US"/>
           </a:p>
@@ -2139,7 +2395,7 @@
     </p:spTree>
     <p:extLst>
       <p:ext uri="{BB962C8B-B14F-4D97-AF65-F5344CB8AC3E}">
-        <p14:creationId xmlns:p14="http://schemas.microsoft.com/office/powerpoint/2010/main" val="132822716"/>
+        <p14:creationId xmlns:p14="http://schemas.microsoft.com/office/powerpoint/2010/main" val="4219768113"/>
       </p:ext>
     </p:extLst>
   </p:cSld>
@@ -2193,6 +2449,126 @@
           <a:bodyPr/>
           <a:lstStyle/>
           <a:p>
+            <a:r>
+              <a:rPr lang="en-CA" b="0" i="0" u="none" strike="noStrike" dirty="0" err="1">
+                <a:solidFill>
+                  <a:srgbClr val="177C12"/>
+                </a:solidFill>
+                <a:effectLst/>
+                <a:latin typeface="ui-sans-serif"/>
+              </a:rPr>
+              <a:t>Usa</a:t>
+            </a:r>
+            <a:r>
+              <a:rPr lang="en-CA" b="0" i="0" u="none" strike="noStrike" dirty="0">
+                <a:solidFill>
+                  <a:srgbClr val="177C12"/>
+                </a:solidFill>
+                <a:effectLst/>
+                <a:latin typeface="ui-sans-serif"/>
+              </a:rPr>
+              <a:t> un </a:t>
+            </a:r>
+            <a:r>
+              <a:rPr lang="en-CA" b="0" i="0" u="none" strike="noStrike" dirty="0" err="1">
+                <a:solidFill>
+                  <a:srgbClr val="177C12"/>
+                </a:solidFill>
+                <a:effectLst/>
+                <a:latin typeface="ui-sans-serif"/>
+              </a:rPr>
+              <a:t>lenguaje</a:t>
+            </a:r>
+            <a:r>
+              <a:rPr lang="en-CA" b="0" i="0" u="none" strike="noStrike" dirty="0">
+                <a:solidFill>
+                  <a:srgbClr val="177C12"/>
+                </a:solidFill>
+                <a:effectLst/>
+                <a:latin typeface="ui-sans-serif"/>
+              </a:rPr>
+              <a:t> de </a:t>
+            </a:r>
+            <a:r>
+              <a:rPr lang="en-CA" b="0" i="0" u="none" strike="noStrike" dirty="0" err="1">
+                <a:solidFill>
+                  <a:srgbClr val="177C12"/>
+                </a:solidFill>
+                <a:effectLst/>
+                <a:latin typeface="ui-sans-serif"/>
+              </a:rPr>
+              <a:t>etiquetado</a:t>
+            </a:r>
+            <a:r>
+              <a:rPr lang="en-CA" b="0" i="0" u="none" strike="noStrike" dirty="0">
+                <a:solidFill>
+                  <a:srgbClr val="177C12"/>
+                </a:solidFill>
+                <a:effectLst/>
+                <a:latin typeface="ui-sans-serif"/>
+              </a:rPr>
+              <a:t> (pitch, step, octave, duration) con </a:t>
+            </a:r>
+            <a:r>
+              <a:rPr lang="en-CA" b="0" i="0" u="none" strike="noStrike" dirty="0" err="1">
+                <a:solidFill>
+                  <a:srgbClr val="177C12"/>
+                </a:solidFill>
+                <a:effectLst/>
+                <a:latin typeface="ui-sans-serif"/>
+              </a:rPr>
+              <a:t>una</a:t>
+            </a:r>
+            <a:r>
+              <a:rPr lang="en-CA" b="0" i="0" u="none" strike="noStrike" dirty="0">
+                <a:solidFill>
+                  <a:srgbClr val="177C12"/>
+                </a:solidFill>
+                <a:effectLst/>
+                <a:latin typeface="ui-sans-serif"/>
+              </a:rPr>
+              <a:t> </a:t>
+            </a:r>
+            <a:r>
+              <a:rPr lang="en-CA" b="0" i="0" u="none" strike="noStrike" dirty="0" err="1">
+                <a:solidFill>
+                  <a:srgbClr val="177C12"/>
+                </a:solidFill>
+                <a:effectLst/>
+                <a:latin typeface="ui-sans-serif"/>
+              </a:rPr>
+              <a:t>estructura</a:t>
+            </a:r>
+            <a:r>
+              <a:rPr lang="en-CA" b="0" i="0" u="none" strike="noStrike" dirty="0">
+                <a:solidFill>
+                  <a:srgbClr val="177C12"/>
+                </a:solidFill>
+                <a:effectLst/>
+                <a:latin typeface="ui-sans-serif"/>
+              </a:rPr>
+              <a:t> </a:t>
+            </a:r>
+            <a:r>
+              <a:rPr lang="en-CA" b="0" i="0" u="none" strike="noStrike" dirty="0" err="1">
+                <a:solidFill>
+                  <a:srgbClr val="177C12"/>
+                </a:solidFill>
+                <a:effectLst/>
+                <a:latin typeface="ui-sans-serif"/>
+              </a:rPr>
+              <a:t>jerárquica</a:t>
+            </a:r>
+            <a:r>
+              <a:rPr lang="en-CA" b="0" i="0" u="none" strike="noStrike" dirty="0">
+                <a:solidFill>
+                  <a:srgbClr val="177C12"/>
+                </a:solidFill>
+                <a:effectLst/>
+                <a:latin typeface="ui-sans-serif"/>
+              </a:rPr>
+              <a:t>.</a:t>
+            </a:r>
             <a:endParaRPr lang="en-US" dirty="0"/>
           </a:p>
         </p:txBody>
@@ -2214,7 +2590,7 @@
           <a:p>
             <a:fld id="{F0D413E3-D7D5-FA47-AC82-B3DDF4FE716B}" type="slidenum">
               <a:rPr lang="en-US" smtClean="0"/>
-              <a:t>10</a:t>
+              <a:t>8</a:t>
             </a:fld>
             <a:endParaRPr lang="en-US"/>
           </a:p>
@@ -2223,7 +2599,7 @@
     </p:spTree>
     <p:extLst>
       <p:ext uri="{BB962C8B-B14F-4D97-AF65-F5344CB8AC3E}">
-        <p14:creationId xmlns:p14="http://schemas.microsoft.com/office/powerpoint/2010/main" val="2404454673"/>
+        <p14:creationId xmlns:p14="http://schemas.microsoft.com/office/powerpoint/2010/main" val="132822716"/>
       </p:ext>
     </p:extLst>
   </p:cSld>
@@ -2277,54 +2653,6 @@
           <a:bodyPr/>
           <a:lstStyle/>
           <a:p>
-            <a:r>
-              <a:rPr lang="en-US" dirty="0"/>
-              <a:t>[2] no solo </a:t>
-            </a:r>
-            <a:r>
-              <a:rPr lang="en-US" dirty="0" err="1"/>
-              <a:t>el</a:t>
-            </a:r>
-            <a:r>
-              <a:rPr lang="en-US" dirty="0"/>
-              <a:t> compositor, la </a:t>
-            </a:r>
-            <a:r>
-              <a:rPr lang="en-US" dirty="0" err="1"/>
-              <a:t>fecha</a:t>
-            </a:r>
-            <a:r>
-              <a:rPr lang="en-US" dirty="0"/>
-              <a:t> de </a:t>
-            </a:r>
-            <a:r>
-              <a:rPr lang="en-US" dirty="0" err="1"/>
-              <a:t>composición</a:t>
-            </a:r>
-            <a:r>
-              <a:rPr lang="en-US" dirty="0"/>
-              <a:t> y </a:t>
-            </a:r>
-            <a:r>
-              <a:rPr lang="en-US" dirty="0" err="1"/>
-              <a:t>el</a:t>
-            </a:r>
-            <a:r>
-              <a:rPr lang="en-US" dirty="0"/>
-              <a:t> </a:t>
-            </a:r>
-            <a:r>
-              <a:rPr lang="en-US" dirty="0" err="1"/>
-              <a:t>nombre</a:t>
-            </a:r>
-            <a:r>
-              <a:rPr lang="en-US" dirty="0"/>
-              <a:t> de la </a:t>
-            </a:r>
-            <a:r>
-              <a:rPr lang="en-US" dirty="0" err="1"/>
-              <a:t>obra</a:t>
-            </a:r>
             <a:endParaRPr lang="en-US" dirty="0"/>
           </a:p>
         </p:txBody>
@@ -2346,6 +2674,138 @@
           <a:p>
             <a:fld id="{F0D413E3-D7D5-FA47-AC82-B3DDF4FE716B}" type="slidenum">
               <a:rPr lang="en-US" smtClean="0"/>
+              <a:t>10</a:t>
+            </a:fld>
+            <a:endParaRPr lang="en-US"/>
+          </a:p>
+        </p:txBody>
+      </p:sp>
+    </p:spTree>
+    <p:extLst>
+      <p:ext uri="{BB962C8B-B14F-4D97-AF65-F5344CB8AC3E}">
+        <p14:creationId xmlns:p14="http://schemas.microsoft.com/office/powerpoint/2010/main" val="2404454673"/>
+      </p:ext>
+    </p:extLst>
+  </p:cSld>
+  <p:clrMapOvr>
+    <a:masterClrMapping/>
+  </p:clrMapOvr>
+</p:notes>
+</file>
+
+<file path=ppt/notesSlides/notesSlide6.xml><?xml version="1.0" encoding="utf-8"?>
+<p:notes xmlns:a="http://schemas.openxmlformats.org/drawingml/2006/main" xmlns:r="http://schemas.openxmlformats.org/officeDocument/2006/relationships" xmlns:p="http://schemas.openxmlformats.org/presentationml/2006/main">
+  <p:cSld>
+    <p:spTree>
+      <p:nvGrpSpPr>
+        <p:cNvPr id="1" name=""/>
+        <p:cNvGrpSpPr/>
+        <p:nvPr/>
+      </p:nvGrpSpPr>
+      <p:grpSpPr>
+        <a:xfrm>
+          <a:off x="0" y="0"/>
+          <a:ext cx="0" cy="0"/>
+          <a:chOff x="0" y="0"/>
+          <a:chExt cx="0" cy="0"/>
+        </a:xfrm>
+      </p:grpSpPr>
+      <p:sp>
+        <p:nvSpPr>
+          <p:cNvPr id="2" name="Slide Image Placeholder 1"/>
+          <p:cNvSpPr>
+            <a:spLocks noGrp="1" noRot="1" noChangeAspect="1"/>
+          </p:cNvSpPr>
+          <p:nvPr>
+            <p:ph type="sldImg"/>
+          </p:nvPr>
+        </p:nvSpPr>
+        <p:spPr/>
+      </p:sp>
+      <p:sp>
+        <p:nvSpPr>
+          <p:cNvPr id="3" name="Notes Placeholder 2"/>
+          <p:cNvSpPr>
+            <a:spLocks noGrp="1"/>
+          </p:cNvSpPr>
+          <p:nvPr>
+            <p:ph type="body" idx="1"/>
+          </p:nvPr>
+        </p:nvSpPr>
+        <p:spPr/>
+        <p:txBody>
+          <a:bodyPr/>
+          <a:lstStyle/>
+          <a:p>
+            <a:r>
+              <a:rPr lang="en-US" dirty="0"/>
+              <a:t>[2] no solo </a:t>
+            </a:r>
+            <a:r>
+              <a:rPr lang="en-US" dirty="0" err="1"/>
+              <a:t>el</a:t>
+            </a:r>
+            <a:r>
+              <a:rPr lang="en-US" dirty="0"/>
+              <a:t> compositor, la </a:t>
+            </a:r>
+            <a:r>
+              <a:rPr lang="en-US" dirty="0" err="1"/>
+              <a:t>fecha</a:t>
+            </a:r>
+            <a:r>
+              <a:rPr lang="en-US" dirty="0"/>
+              <a:t> de </a:t>
+            </a:r>
+            <a:r>
+              <a:rPr lang="en-US" dirty="0" err="1"/>
+              <a:t>composición</a:t>
+            </a:r>
+            <a:r>
+              <a:rPr lang="en-US" dirty="0"/>
+              <a:t> y </a:t>
+            </a:r>
+            <a:r>
+              <a:rPr lang="en-US" dirty="0" err="1"/>
+              <a:t>el</a:t>
+            </a:r>
+            <a:r>
+              <a:rPr lang="en-US" dirty="0"/>
+              <a:t> </a:t>
+            </a:r>
+            <a:r>
+              <a:rPr lang="en-US" dirty="0" err="1"/>
+              <a:t>nombre</a:t>
+            </a:r>
+            <a:r>
+              <a:rPr lang="en-US" dirty="0"/>
+              <a:t> de la </a:t>
+            </a:r>
+            <a:r>
+              <a:rPr lang="en-US" dirty="0" err="1"/>
+              <a:t>obra</a:t>
+            </a:r>
+            <a:endParaRPr lang="en-US" dirty="0"/>
+          </a:p>
+        </p:txBody>
+      </p:sp>
+      <p:sp>
+        <p:nvSpPr>
+          <p:cNvPr id="4" name="Slide Number Placeholder 3"/>
+          <p:cNvSpPr>
+            <a:spLocks noGrp="1"/>
+          </p:cNvSpPr>
+          <p:nvPr>
+            <p:ph type="sldNum" sz="quarter" idx="5"/>
+          </p:nvPr>
+        </p:nvSpPr>
+        <p:spPr/>
+        <p:txBody>
+          <a:bodyPr/>
+          <a:lstStyle/>
+          <a:p>
+            <a:fld id="{F0D413E3-D7D5-FA47-AC82-B3DDF4FE716B}" type="slidenum">
+              <a:rPr lang="en-US" smtClean="0"/>
               <a:t>11</a:t>
             </a:fld>
             <a:endParaRPr lang="en-US"/>
@@ -2365,7 +2825,7 @@
 </p:notes>
 </file>
 
-<file path=ppt/notesSlides/notesSlide6.xml><?xml version="1.0" encoding="utf-8"?>
+<file path=ppt/notesSlides/notesSlide7.xml><?xml version="1.0" encoding="utf-8"?>
 <p:notes xmlns:a="http://schemas.openxmlformats.org/drawingml/2006/main" xmlns:r="http://schemas.openxmlformats.org/officeDocument/2006/relationships" xmlns:p="http://schemas.openxmlformats.org/presentationml/2006/main">
   <p:cSld>
     <p:spTree>
@@ -2557,90 +3017,6 @@
 </p:notes>
 </file>
 
-<file path=ppt/notesSlides/notesSlide7.xml><?xml version="1.0" encoding="utf-8"?>
-<p:notes xmlns:a="http://schemas.openxmlformats.org/drawingml/2006/main" xmlns:r="http://schemas.openxmlformats.org/officeDocument/2006/relationships" xmlns:p="http://schemas.openxmlformats.org/presentationml/2006/main">
-  <p:cSld>
-    <p:spTree>
-      <p:nvGrpSpPr>
-        <p:cNvPr id="1" name=""/>
-        <p:cNvGrpSpPr/>
-        <p:nvPr/>
-      </p:nvGrpSpPr>
-      <p:grpSpPr>
-        <a:xfrm>
-          <a:off x="0" y="0"/>
-          <a:ext cx="0" cy="0"/>
-          <a:chOff x="0" y="0"/>
-          <a:chExt cx="0" cy="0"/>
-        </a:xfrm>
-      </p:grpSpPr>
-      <p:sp>
-        <p:nvSpPr>
-          <p:cNvPr id="2" name="Slide Image Placeholder 1"/>
-          <p:cNvSpPr>
-            <a:spLocks noGrp="1" noRot="1" noChangeAspect="1"/>
-          </p:cNvSpPr>
-          <p:nvPr>
-            <p:ph type="sldImg"/>
-          </p:nvPr>
-        </p:nvSpPr>
-        <p:spPr/>
-      </p:sp>
-      <p:sp>
-        <p:nvSpPr>
-          <p:cNvPr id="3" name="Notes Placeholder 2"/>
-          <p:cNvSpPr>
-            <a:spLocks noGrp="1"/>
-          </p:cNvSpPr>
-          <p:nvPr>
-            <p:ph type="body" idx="1"/>
-          </p:nvPr>
-        </p:nvSpPr>
-        <p:spPr/>
-        <p:txBody>
-          <a:bodyPr/>
-          <a:lstStyle/>
-          <a:p>
-            <a:endParaRPr lang="en-US" dirty="0"/>
-          </a:p>
-        </p:txBody>
-      </p:sp>
-      <p:sp>
-        <p:nvSpPr>
-          <p:cNvPr id="4" name="Slide Number Placeholder 3"/>
-          <p:cNvSpPr>
-            <a:spLocks noGrp="1"/>
-          </p:cNvSpPr>
-          <p:nvPr>
-            <p:ph type="sldNum" sz="quarter" idx="5"/>
-          </p:nvPr>
-        </p:nvSpPr>
-        <p:spPr/>
-        <p:txBody>
-          <a:bodyPr/>
-          <a:lstStyle/>
-          <a:p>
-            <a:fld id="{F0D413E3-D7D5-FA47-AC82-B3DDF4FE716B}" type="slidenum">
-              <a:rPr lang="en-US" smtClean="0"/>
-              <a:t>13</a:t>
-            </a:fld>
-            <a:endParaRPr lang="en-US"/>
-          </a:p>
-        </p:txBody>
-      </p:sp>
-    </p:spTree>
-    <p:extLst>
-      <p:ext uri="{BB962C8B-B14F-4D97-AF65-F5344CB8AC3E}">
-        <p14:creationId xmlns:p14="http://schemas.microsoft.com/office/powerpoint/2010/main" val="4081250399"/>
-      </p:ext>
-    </p:extLst>
-  </p:cSld>
-  <p:clrMapOvr>
-    <a:masterClrMapping/>
-  </p:clrMapOvr>
-</p:notes>
-</file>
-
 <file path=ppt/notesSlides/notesSlide8.xml><?xml version="1.0" encoding="utf-8"?>
 <p:notes xmlns:a="http://schemas.openxmlformats.org/drawingml/2006/main" xmlns:r="http://schemas.openxmlformats.org/officeDocument/2006/relationships" xmlns:p="http://schemas.openxmlformats.org/presentationml/2006/main">
   <p:cSld>
@@ -2706,7 +3082,7 @@
           <a:p>
             <a:fld id="{F0D413E3-D7D5-FA47-AC82-B3DDF4FE716B}" type="slidenum">
               <a:rPr lang="en-US" smtClean="0"/>
-              <a:t>14</a:t>
+              <a:t>13</a:t>
             </a:fld>
             <a:endParaRPr lang="en-US"/>
           </a:p>
@@ -2715,7 +3091,7 @@
     </p:spTree>
     <p:extLst>
       <p:ext uri="{BB962C8B-B14F-4D97-AF65-F5344CB8AC3E}">
-        <p14:creationId xmlns:p14="http://schemas.microsoft.com/office/powerpoint/2010/main" val="3452265536"/>
+        <p14:creationId xmlns:p14="http://schemas.microsoft.com/office/powerpoint/2010/main" val="4081250399"/>
       </p:ext>
     </p:extLst>
   </p:cSld>
@@ -2769,7 +3145,7 @@
           <a:bodyPr/>
           <a:lstStyle/>
           <a:p>
-            <a:endParaRPr lang="es-ES_tradnl" dirty="0"/>
+            <a:endParaRPr lang="en-US" dirty="0"/>
           </a:p>
         </p:txBody>
       </p:sp>
@@ -2790,7 +3166,7 @@
           <a:p>
             <a:fld id="{F0D413E3-D7D5-FA47-AC82-B3DDF4FE716B}" type="slidenum">
               <a:rPr lang="en-US" smtClean="0"/>
-              <a:t>16</a:t>
+              <a:t>14</a:t>
             </a:fld>
             <a:endParaRPr lang="en-US"/>
           </a:p>
@@ -2799,7 +3175,7 @@
     </p:spTree>
     <p:extLst>
       <p:ext uri="{BB962C8B-B14F-4D97-AF65-F5344CB8AC3E}">
-        <p14:creationId xmlns:p14="http://schemas.microsoft.com/office/powerpoint/2010/main" val="3018378519"/>
+        <p14:creationId xmlns:p14="http://schemas.microsoft.com/office/powerpoint/2010/main" val="3452265536"/>
       </p:ext>
     </p:extLst>
   </p:cSld>
@@ -11525,7 +11901,7 @@
           </p:nvPr>
         </p:nvPicPr>
         <p:blipFill rotWithShape="1">
-          <a:blip r:embed="rId2"/>
+          <a:blip r:embed="rId3"/>
           <a:srcRect l="607" t="4281" r="-222" b="17447"/>
           <a:stretch/>
         </p:blipFill>
@@ -12819,7 +13195,7 @@
           </p:nvPr>
         </p:nvPicPr>
         <p:blipFill rotWithShape="1">
-          <a:blip r:embed="rId2"/>
+          <a:blip r:embed="rId3"/>
           <a:srcRect l="607" t="21483" r="46685" b="49418"/>
           <a:stretch/>
         </p:blipFill>
@@ -12934,7 +13310,7 @@
             </a:pPr>
             <a:r>
               <a:rPr lang="es-ES_tradnl" sz="2000" dirty="0">
-                <a:hlinkClick r:id="rId3"/>
+                <a:hlinkClick r:id="rId4"/>
               </a:rPr>
               <a:t>Paso 10: Definir el tercer pentagrama (staffDef con @n=3)</a:t>
             </a:r>
@@ -12947,18 +13323,18 @@
             </a:pPr>
             <a:r>
               <a:rPr lang="es-ES_tradnl" sz="2000" dirty="0">
-                <a:hlinkClick r:id="rId4"/>
+                <a:hlinkClick r:id="rId5"/>
               </a:rPr>
               <a:t>Paso 11: Crear el tercer pentagrama (staff con @n=3) y rellenar todos los compases </a:t>
             </a:r>
             <a:br>
               <a:rPr lang="es-ES_tradnl" sz="2000" dirty="0">
-                <a:hlinkClick r:id="rId4"/>
+                <a:hlinkClick r:id="rId5"/>
               </a:rPr>
             </a:br>
             <a:r>
               <a:rPr lang="es-ES_tradnl" sz="2000" dirty="0">
-                <a:hlinkClick r:id="rId4"/>
+                <a:hlinkClick r:id="rId5"/>
               </a:rPr>
               <a:t>(mismas notas que la segunda voz, copiar y pegar)</a:t>
             </a:r>
@@ -12971,7 +13347,7 @@
             </a:pPr>
             <a:r>
               <a:rPr lang="es-ES_tradnl" sz="2000" dirty="0">
-                <a:hlinkClick r:id="rId5"/>
+                <a:hlinkClick r:id="rId6"/>
               </a:rPr>
               <a:t>Paso 12: Cambiar la octava de las notas</a:t>
             </a:r>
@@ -12984,7 +13360,7 @@
             </a:pPr>
             <a:r>
               <a:rPr lang="es-ES_tradnl" sz="2000" dirty="0">
-                <a:hlinkClick r:id="rId6"/>
+                <a:hlinkClick r:id="rId7"/>
               </a:rPr>
               <a:t>Paso 13: Definir el cuarto pentagrama (staffDef con @n=4)</a:t>
             </a:r>
@@ -12997,18 +13373,18 @@
             </a:pPr>
             <a:r>
               <a:rPr lang="es-ES_tradnl" sz="2000" dirty="0">
-                <a:hlinkClick r:id="rId7"/>
+                <a:hlinkClick r:id="rId8"/>
               </a:rPr>
               <a:t>Paso 14: Crear el cuarto pentagrama (staff con @n=4) en cada &lt;measure&gt; y </a:t>
             </a:r>
             <a:br>
               <a:rPr lang="es-ES_tradnl" sz="2000" dirty="0">
-                <a:hlinkClick r:id="rId7"/>
+                <a:hlinkClick r:id="rId8"/>
               </a:rPr>
             </a:br>
             <a:r>
               <a:rPr lang="es-ES_tradnl" sz="2000" dirty="0">
-                <a:hlinkClick r:id="rId7"/>
+                <a:hlinkClick r:id="rId8"/>
               </a:rPr>
               <a:t>rellenar estos compases (mismas notas que la tercera voz, copiar y pegar)</a:t>
             </a:r>
@@ -13136,15 +13512,15 @@
         </p:nvSpPr>
         <p:spPr>
           <a:xfrm>
-            <a:off x="838200" y="2695873"/>
-            <a:ext cx="10537826" cy="954107"/>
+            <a:off x="838200" y="2411154"/>
+            <a:ext cx="10537826" cy="1867659"/>
           </a:xfrm>
           <a:prstGeom prst="rect">
             <a:avLst/>
           </a:prstGeom>
         </p:spPr>
         <p:txBody>
-          <a:bodyPr vert="horz" wrap="square" lIns="91440" tIns="45720" rIns="91440" bIns="45720" rtlCol="0" anchor="b" anchorCtr="0">
+          <a:bodyPr vert="horz" wrap="square" lIns="91440" tIns="45720" rIns="91440" bIns="45720" rtlCol="0" anchor="ctr" anchorCtr="0">
             <a:normAutofit/>
           </a:bodyPr>
           <a:lstStyle>
@@ -13177,7 +13553,7 @@
               <a:defRPr/>
             </a:pPr>
             <a:r>
-              <a:rPr kumimoji="0" lang="en-US" sz="2700" b="1" i="0" u="none" strike="noStrike" kern="1200" cap="none" spc="0" normalizeH="0" baseline="0" noProof="0" dirty="0">
+              <a:rPr kumimoji="0" lang="en-US" sz="3600" b="1" i="0" u="none" strike="noStrike" kern="1200" cap="none" spc="0" normalizeH="0" baseline="0" noProof="0" dirty="0">
                 <a:ln>
                   <a:noFill/>
                 </a:ln>
@@ -13194,7 +13570,7 @@
               <a:t>¡</a:t>
             </a:r>
             <a:r>
-              <a:rPr kumimoji="0" lang="en-US" sz="2700" b="1" i="0" u="none" strike="noStrike" kern="1200" cap="none" spc="0" normalizeH="0" baseline="0" noProof="0" dirty="0" err="1">
+              <a:rPr kumimoji="0" lang="en-US" sz="3600" b="1" i="0" u="none" strike="noStrike" kern="1200" cap="none" spc="0" normalizeH="0" baseline="0" noProof="0" dirty="0" err="1">
                 <a:ln>
                   <a:noFill/>
                 </a:ln>
@@ -13211,7 +13587,7 @@
               <a:t>Muchas</a:t>
             </a:r>
             <a:r>
-              <a:rPr kumimoji="0" lang="en-US" sz="2700" b="1" i="0" u="none" strike="noStrike" kern="1200" cap="none" spc="0" normalizeH="0" baseline="0" noProof="0" dirty="0">
+              <a:rPr kumimoji="0" lang="en-US" sz="3600" b="1" i="0" u="none" strike="noStrike" kern="1200" cap="none" spc="0" normalizeH="0" baseline="0" noProof="0" dirty="0">
                 <a:ln>
                   <a:noFill/>
                 </a:ln>
@@ -13239,20 +13615,26 @@
               <a:defRPr/>
             </a:pPr>
             <a:r>
-              <a:rPr lang="en-US" sz="2700" b="1" kern="1200" dirty="0">
+              <a:rPr lang="en-US" sz="3600" b="1" kern="1200" dirty="0">
                 <a:solidFill>
-                  <a:schemeClr val="bg1"/>
+                  <a:srgbClr val="00B0F0"/>
                 </a:solidFill>
                 <a:latin typeface="+mj-lt"/>
                 <a:ea typeface="+mj-ea"/>
                 <a:cs typeface="+mj-cs"/>
-                <a:hlinkClick r:id="rId3"/>
+                <a:hlinkClick r:id="rId3">
+                  <a:extLst>
+                    <a:ext uri="{A12FA001-AC4F-418D-AE19-62706E023703}">
+                      <ahyp:hlinkClr xmlns:ahyp="http://schemas.microsoft.com/office/drawing/2018/hyperlinkcolor" val="tx"/>
+                    </a:ext>
+                  </a:extLst>
+                </a:hlinkClick>
               </a:rPr>
               <a:t>martha.thomae@fcsh.unl.pt</a:t>
             </a:r>
-            <a:endParaRPr lang="en-US" sz="2700" b="1" kern="1200" dirty="0">
+            <a:endParaRPr lang="en-US" sz="3600" b="1" kern="1200" dirty="0">
               <a:solidFill>
-                <a:schemeClr val="bg1"/>
+                <a:srgbClr val="00B0F0"/>
               </a:solidFill>
               <a:latin typeface="+mj-lt"/>
               <a:ea typeface="+mj-ea"/>

</xml_diff>

<commit_message>
Añadir página final "recursos" a la presentación
</commit_message>
<xml_diff>
--- a/Presentacion_SemanaHD2024_MThomae.pptx
+++ b/Presentacion_SemanaHD2024_MThomae.pptx
@@ -5,7 +5,7 @@
     <p:sldMasterId id="2147483648" r:id="rId1"/>
   </p:sldMasterIdLst>
   <p:notesMasterIdLst>
-    <p:notesMasterId r:id="rId26"/>
+    <p:notesMasterId r:id="rId27"/>
   </p:notesMasterIdLst>
   <p:sldIdLst>
     <p:sldId id="256" r:id="rId2"/>
@@ -32,6 +32,7 @@
     <p:sldId id="282" r:id="rId23"/>
     <p:sldId id="430" r:id="rId24"/>
     <p:sldId id="425" r:id="rId25"/>
+    <p:sldId id="431" r:id="rId26"/>
   </p:sldIdLst>
   <p:sldSz cx="12192000" cy="6858000"/>
   <p:notesSz cx="6858000" cy="9144000"/>
@@ -2204,6 +2205,198 @@
     <p:extLst>
       <p:ext uri="{BB962C8B-B14F-4D97-AF65-F5344CB8AC3E}">
         <p14:creationId xmlns:p14="http://schemas.microsoft.com/office/powerpoint/2010/main" val="1819166443"/>
+      </p:ext>
+    </p:extLst>
+  </p:cSld>
+  <p:clrMapOvr>
+    <a:masterClrMapping/>
+  </p:clrMapOvr>
+</p:notes>
+</file>
+
+<file path=ppt/notesSlides/notesSlide16.xml><?xml version="1.0" encoding="utf-8"?>
+<p:notes xmlns:a="http://schemas.openxmlformats.org/drawingml/2006/main" xmlns:r="http://schemas.openxmlformats.org/officeDocument/2006/relationships" xmlns:p="http://schemas.openxmlformats.org/presentationml/2006/main">
+  <p:cSld>
+    <p:spTree>
+      <p:nvGrpSpPr>
+        <p:cNvPr id="1" name=""/>
+        <p:cNvGrpSpPr/>
+        <p:nvPr/>
+      </p:nvGrpSpPr>
+      <p:grpSpPr>
+        <a:xfrm>
+          <a:off x="0" y="0"/>
+          <a:ext cx="0" cy="0"/>
+          <a:chOff x="0" y="0"/>
+          <a:chExt cx="0" cy="0"/>
+        </a:xfrm>
+      </p:grpSpPr>
+      <p:sp>
+        <p:nvSpPr>
+          <p:cNvPr id="2" name="Slide Image Placeholder 1"/>
+          <p:cNvSpPr>
+            <a:spLocks noGrp="1" noRot="1" noChangeAspect="1"/>
+          </p:cNvSpPr>
+          <p:nvPr>
+            <p:ph type="sldImg"/>
+          </p:nvPr>
+        </p:nvSpPr>
+        <p:spPr/>
+      </p:sp>
+      <p:sp>
+        <p:nvSpPr>
+          <p:cNvPr id="3" name="Notes Placeholder 2"/>
+          <p:cNvSpPr>
+            <a:spLocks noGrp="1"/>
+          </p:cNvSpPr>
+          <p:nvPr>
+            <p:ph type="body" idx="1"/>
+          </p:nvPr>
+        </p:nvSpPr>
+        <p:spPr/>
+        <p:txBody>
+          <a:bodyPr/>
+          <a:lstStyle/>
+          <a:p>
+            <a:r>
+              <a:rPr lang="en-US" dirty="0"/>
+              <a:t>[2] no solo </a:t>
+            </a:r>
+            <a:r>
+              <a:rPr lang="en-US" dirty="0" err="1"/>
+              <a:t>el</a:t>
+            </a:r>
+            <a:r>
+              <a:rPr lang="en-US" dirty="0"/>
+              <a:t> compositor, la </a:t>
+            </a:r>
+            <a:r>
+              <a:rPr lang="en-US" dirty="0" err="1"/>
+              <a:t>fecha</a:t>
+            </a:r>
+            <a:r>
+              <a:rPr lang="en-US" dirty="0"/>
+              <a:t> de </a:t>
+            </a:r>
+            <a:r>
+              <a:rPr lang="en-US" dirty="0" err="1"/>
+              <a:t>composición</a:t>
+            </a:r>
+            <a:r>
+              <a:rPr lang="en-US" dirty="0"/>
+              <a:t> y </a:t>
+            </a:r>
+            <a:r>
+              <a:rPr lang="en-US" dirty="0" err="1"/>
+              <a:t>el</a:t>
+            </a:r>
+            <a:r>
+              <a:rPr lang="en-US" dirty="0"/>
+              <a:t> </a:t>
+            </a:r>
+            <a:r>
+              <a:rPr lang="en-US" dirty="0" err="1"/>
+              <a:t>nombre</a:t>
+            </a:r>
+            <a:r>
+              <a:rPr lang="en-US" dirty="0"/>
+              <a:t> de la </a:t>
+            </a:r>
+            <a:r>
+              <a:rPr lang="en-US" dirty="0" err="1"/>
+              <a:t>obra</a:t>
+            </a:r>
+            <a:endParaRPr lang="en-US" dirty="0"/>
+          </a:p>
+        </p:txBody>
+      </p:sp>
+      <p:sp>
+        <p:nvSpPr>
+          <p:cNvPr id="4" name="Slide Number Placeholder 3"/>
+          <p:cNvSpPr>
+            <a:spLocks noGrp="1"/>
+          </p:cNvSpPr>
+          <p:nvPr>
+            <p:ph type="sldNum" sz="quarter" idx="5"/>
+          </p:nvPr>
+        </p:nvSpPr>
+        <p:spPr/>
+        <p:txBody>
+          <a:bodyPr/>
+          <a:lstStyle/>
+          <a:p>
+            <a:pPr marL="0" marR="0" lvl="0" indent="0" algn="r" defTabSz="914400" rtl="0" eaLnBrk="1" fontAlgn="auto" latinLnBrk="0" hangingPunct="1">
+              <a:lnSpc>
+                <a:spcPct val="100000"/>
+              </a:lnSpc>
+              <a:spcBef>
+                <a:spcPts val="0"/>
+              </a:spcBef>
+              <a:spcAft>
+                <a:spcPts val="0"/>
+              </a:spcAft>
+              <a:buClrTx/>
+              <a:buSzTx/>
+              <a:buFontTx/>
+              <a:buNone/>
+              <a:tabLst/>
+              <a:defRPr/>
+            </a:pPr>
+            <a:fld id="{F0D413E3-D7D5-FA47-AC82-B3DDF4FE716B}" type="slidenum">
+              <a:rPr kumimoji="0" lang="en-US" sz="1200" b="0" i="0" u="none" strike="noStrike" kern="1200" cap="none" spc="0" normalizeH="0" baseline="0" noProof="0" smtClean="0">
+                <a:ln>
+                  <a:noFill/>
+                </a:ln>
+                <a:solidFill>
+                  <a:prstClr val="black"/>
+                </a:solidFill>
+                <a:effectLst/>
+                <a:uLnTx/>
+                <a:uFillTx/>
+                <a:latin typeface="Calibri" panose="020F0502020204030204"/>
+                <a:ea typeface="+mn-ea"/>
+                <a:cs typeface="+mn-cs"/>
+              </a:rPr>
+              <a:pPr marL="0" marR="0" lvl="0" indent="0" algn="r" defTabSz="914400" rtl="0" eaLnBrk="1" fontAlgn="auto" latinLnBrk="0" hangingPunct="1">
+                <a:lnSpc>
+                  <a:spcPct val="100000"/>
+                </a:lnSpc>
+                <a:spcBef>
+                  <a:spcPts val="0"/>
+                </a:spcBef>
+                <a:spcAft>
+                  <a:spcPts val="0"/>
+                </a:spcAft>
+                <a:buClrTx/>
+                <a:buSzTx/>
+                <a:buFontTx/>
+                <a:buNone/>
+                <a:tabLst/>
+                <a:defRPr/>
+              </a:pPr>
+              <a:t>25</a:t>
+            </a:fld>
+            <a:endParaRPr kumimoji="0" lang="en-US" sz="1200" b="0" i="0" u="none" strike="noStrike" kern="1200" cap="none" spc="0" normalizeH="0" baseline="0" noProof="0">
+              <a:ln>
+                <a:noFill/>
+              </a:ln>
+              <a:solidFill>
+                <a:prstClr val="black"/>
+              </a:solidFill>
+              <a:effectLst/>
+              <a:uLnTx/>
+              <a:uFillTx/>
+              <a:latin typeface="Calibri" panose="020F0502020204030204"/>
+              <a:ea typeface="+mn-ea"/>
+              <a:cs typeface="+mn-cs"/>
+            </a:endParaRPr>
+          </a:p>
+        </p:txBody>
+      </p:sp>
+    </p:spTree>
+    <p:extLst>
+      <p:ext uri="{BB962C8B-B14F-4D97-AF65-F5344CB8AC3E}">
+        <p14:creationId xmlns:p14="http://schemas.microsoft.com/office/powerpoint/2010/main" val="3009342080"/>
       </p:ext>
     </p:extLst>
   </p:cSld>
@@ -22334,6 +22527,1202 @@
     <p:extLst>
       <p:ext uri="{BB962C8B-B14F-4D97-AF65-F5344CB8AC3E}">
         <p14:creationId xmlns:p14="http://schemas.microsoft.com/office/powerpoint/2010/main" val="2295455503"/>
+      </p:ext>
+    </p:extLst>
+  </p:cSld>
+  <p:clrMapOvr>
+    <a:masterClrMapping/>
+  </p:clrMapOvr>
+</p:sld>
+</file>
+
+<file path=ppt/slides/slide25.xml><?xml version="1.0" encoding="utf-8"?>
+<p:sld xmlns:a="http://schemas.openxmlformats.org/drawingml/2006/main" xmlns:r="http://schemas.openxmlformats.org/officeDocument/2006/relationships" xmlns:p="http://schemas.openxmlformats.org/presentationml/2006/main">
+  <p:cSld>
+    <p:bg>
+      <p:bgPr>
+        <a:solidFill>
+          <a:schemeClr val="bg1"/>
+        </a:solidFill>
+        <a:effectLst/>
+      </p:bgPr>
+    </p:bg>
+    <p:spTree>
+      <p:nvGrpSpPr>
+        <p:cNvPr id="1" name=""/>
+        <p:cNvGrpSpPr/>
+        <p:nvPr/>
+      </p:nvGrpSpPr>
+      <p:grpSpPr>
+        <a:xfrm>
+          <a:off x="0" y="0"/>
+          <a:ext cx="0" cy="0"/>
+          <a:chOff x="0" y="0"/>
+          <a:chExt cx="0" cy="0"/>
+        </a:xfrm>
+      </p:grpSpPr>
+      <p:sp useBgFill="1">
+        <p:nvSpPr>
+          <p:cNvPr id="15" name="Rectangle 10">
+            <a:extLst>
+              <a:ext uri="{FF2B5EF4-FFF2-40B4-BE49-F238E27FC236}">
+                <a16:creationId xmlns:a16="http://schemas.microsoft.com/office/drawing/2014/main" id="{45D37F4E-DDB4-456B-97E0-9937730A039F}"/>
+              </a:ext>
+              <a:ext uri="{C183D7F6-B498-43B3-948B-1728B52AA6E4}">
+                <adec:decorative xmlns:adec="http://schemas.microsoft.com/office/drawing/2017/decorative" val="1"/>
+              </a:ext>
+            </a:extLst>
+          </p:cNvPr>
+          <p:cNvSpPr>
+            <a:spLocks noGrp="1" noRot="1" noChangeAspect="1" noMove="1" noResize="1" noEditPoints="1" noAdjustHandles="1" noChangeArrowheads="1" noChangeShapeType="1" noTextEdit="1"/>
+          </p:cNvSpPr>
+          <p:nvPr>
+            <p:extLst>
+              <p:ext uri="{386F3935-93C4-4BCD-93E2-E3B085C9AB24}">
+                <p16:designElem xmlns:p16="http://schemas.microsoft.com/office/powerpoint/2015/main" val="1"/>
+              </p:ext>
+            </p:extLst>
+          </p:nvPr>
+        </p:nvSpPr>
+        <p:spPr>
+          <a:xfrm>
+            <a:off x="0" y="0"/>
+            <a:ext cx="12188952" cy="6858000"/>
+          </a:xfrm>
+          <a:prstGeom prst="rect">
+            <a:avLst/>
+          </a:prstGeom>
+          <a:ln>
+            <a:noFill/>
+          </a:ln>
+        </p:spPr>
+        <p:style>
+          <a:lnRef idx="2">
+            <a:schemeClr val="accent1">
+              <a:shade val="50000"/>
+            </a:schemeClr>
+          </a:lnRef>
+          <a:fillRef idx="1">
+            <a:schemeClr val="accent1"/>
+          </a:fillRef>
+          <a:effectRef idx="0">
+            <a:schemeClr val="accent1"/>
+          </a:effectRef>
+          <a:fontRef idx="minor">
+            <a:schemeClr val="lt1"/>
+          </a:fontRef>
+        </p:style>
+        <p:txBody>
+          <a:bodyPr rtlCol="0" anchor="ctr"/>
+          <a:lstStyle/>
+          <a:p>
+            <a:pPr marL="0" marR="0" lvl="0" indent="0" algn="ctr" defTabSz="914400" rtl="0" eaLnBrk="1" fontAlgn="auto" latinLnBrk="0" hangingPunct="1">
+              <a:lnSpc>
+                <a:spcPct val="100000"/>
+              </a:lnSpc>
+              <a:spcBef>
+                <a:spcPts val="0"/>
+              </a:spcBef>
+              <a:spcAft>
+                <a:spcPts val="0"/>
+              </a:spcAft>
+              <a:buClrTx/>
+              <a:buSzTx/>
+              <a:buFontTx/>
+              <a:buNone/>
+              <a:tabLst/>
+              <a:defRPr/>
+            </a:pPr>
+            <a:endParaRPr kumimoji="0" lang="en-US" sz="1800" b="0" i="0" u="none" strike="noStrike" kern="1200" cap="none" spc="0" normalizeH="0" baseline="0" noProof="0">
+              <a:ln>
+                <a:noFill/>
+              </a:ln>
+              <a:solidFill>
+                <a:prstClr val="white"/>
+              </a:solidFill>
+              <a:effectLst/>
+              <a:uLnTx/>
+              <a:uFillTx/>
+              <a:latin typeface="Calibri" panose="020F0502020204030204"/>
+              <a:ea typeface="+mn-ea"/>
+              <a:cs typeface="+mn-cs"/>
+            </a:endParaRPr>
+          </a:p>
+        </p:txBody>
+      </p:sp>
+      <p:sp>
+        <p:nvSpPr>
+          <p:cNvPr id="2" name="Title 1">
+            <a:extLst>
+              <a:ext uri="{FF2B5EF4-FFF2-40B4-BE49-F238E27FC236}">
+                <a16:creationId xmlns:a16="http://schemas.microsoft.com/office/drawing/2014/main" id="{75CDF3A2-ADBD-F6DD-4F7E-498D7D4CB98B}"/>
+              </a:ext>
+            </a:extLst>
+          </p:cNvPr>
+          <p:cNvSpPr>
+            <a:spLocks noGrp="1"/>
+          </p:cNvSpPr>
+          <p:nvPr>
+            <p:ph type="title"/>
+          </p:nvPr>
+        </p:nvSpPr>
+        <p:spPr>
+          <a:xfrm>
+            <a:off x="572493" y="540802"/>
+            <a:ext cx="11018520" cy="1132152"/>
+          </a:xfrm>
+        </p:spPr>
+        <p:txBody>
+          <a:bodyPr anchor="b">
+            <a:normAutofit/>
+          </a:bodyPr>
+          <a:lstStyle/>
+          <a:p>
+            <a:r>
+              <a:rPr lang="en-US" sz="5400" dirty="0" err="1"/>
+              <a:t>Recursos</a:t>
+            </a:r>
+            <a:endParaRPr lang="en-US" sz="5400" dirty="0"/>
+          </a:p>
+        </p:txBody>
+      </p:sp>
+      <p:sp>
+        <p:nvSpPr>
+          <p:cNvPr id="16" name="sketchy line">
+            <a:extLst>
+              <a:ext uri="{FF2B5EF4-FFF2-40B4-BE49-F238E27FC236}">
+                <a16:creationId xmlns:a16="http://schemas.microsoft.com/office/drawing/2014/main" id="{B2DD41CD-8F47-4F56-AD12-4E2FF7696987}"/>
+              </a:ext>
+              <a:ext uri="{C183D7F6-B498-43B3-948B-1728B52AA6E4}">
+                <adec:decorative xmlns:adec="http://schemas.microsoft.com/office/drawing/2017/decorative" val="1"/>
+              </a:ext>
+            </a:extLst>
+          </p:cNvPr>
+          <p:cNvSpPr>
+            <a:spLocks noGrp="1" noRot="1" noChangeAspect="1" noMove="1" noResize="1" noEditPoints="1" noAdjustHandles="1" noChangeArrowheads="1" noChangeShapeType="1" noTextEdit="1"/>
+          </p:cNvSpPr>
+          <p:nvPr>
+            <p:extLst>
+              <p:ext uri="{386F3935-93C4-4BCD-93E2-E3B085C9AB24}">
+                <p16:designElem xmlns:p16="http://schemas.microsoft.com/office/powerpoint/2015/main" val="1"/>
+              </p:ext>
+            </p:extLst>
+          </p:nvPr>
+        </p:nvSpPr>
+        <p:spPr>
+          <a:xfrm>
+            <a:off x="572493" y="1681544"/>
+            <a:ext cx="10972800" cy="18288"/>
+          </a:xfrm>
+          <a:custGeom>
+            <a:avLst/>
+            <a:gdLst>
+              <a:gd name="connsiteX0" fmla="*/ 0 w 10972800"/>
+              <a:gd name="connsiteY0" fmla="*/ 0 h 18288"/>
+              <a:gd name="connsiteX1" fmla="*/ 356616 w 10972800"/>
+              <a:gd name="connsiteY1" fmla="*/ 0 h 18288"/>
+              <a:gd name="connsiteX2" fmla="*/ 1042416 w 10972800"/>
+              <a:gd name="connsiteY2" fmla="*/ 0 h 18288"/>
+              <a:gd name="connsiteX3" fmla="*/ 1947672 w 10972800"/>
+              <a:gd name="connsiteY3" fmla="*/ 0 h 18288"/>
+              <a:gd name="connsiteX4" fmla="*/ 2633472 w 10972800"/>
+              <a:gd name="connsiteY4" fmla="*/ 0 h 18288"/>
+              <a:gd name="connsiteX5" fmla="*/ 2990088 w 10972800"/>
+              <a:gd name="connsiteY5" fmla="*/ 0 h 18288"/>
+              <a:gd name="connsiteX6" fmla="*/ 3456432 w 10972800"/>
+              <a:gd name="connsiteY6" fmla="*/ 0 h 18288"/>
+              <a:gd name="connsiteX7" fmla="*/ 4361688 w 10972800"/>
+              <a:gd name="connsiteY7" fmla="*/ 0 h 18288"/>
+              <a:gd name="connsiteX8" fmla="*/ 5266944 w 10972800"/>
+              <a:gd name="connsiteY8" fmla="*/ 0 h 18288"/>
+              <a:gd name="connsiteX9" fmla="*/ 6172200 w 10972800"/>
+              <a:gd name="connsiteY9" fmla="*/ 0 h 18288"/>
+              <a:gd name="connsiteX10" fmla="*/ 6528816 w 10972800"/>
+              <a:gd name="connsiteY10" fmla="*/ 0 h 18288"/>
+              <a:gd name="connsiteX11" fmla="*/ 7214616 w 10972800"/>
+              <a:gd name="connsiteY11" fmla="*/ 0 h 18288"/>
+              <a:gd name="connsiteX12" fmla="*/ 7790688 w 10972800"/>
+              <a:gd name="connsiteY12" fmla="*/ 0 h 18288"/>
+              <a:gd name="connsiteX13" fmla="*/ 8147304 w 10972800"/>
+              <a:gd name="connsiteY13" fmla="*/ 0 h 18288"/>
+              <a:gd name="connsiteX14" fmla="*/ 9052560 w 10972800"/>
+              <a:gd name="connsiteY14" fmla="*/ 0 h 18288"/>
+              <a:gd name="connsiteX15" fmla="*/ 9409176 w 10972800"/>
+              <a:gd name="connsiteY15" fmla="*/ 0 h 18288"/>
+              <a:gd name="connsiteX16" fmla="*/ 9765792 w 10972800"/>
+              <a:gd name="connsiteY16" fmla="*/ 0 h 18288"/>
+              <a:gd name="connsiteX17" fmla="*/ 10341864 w 10972800"/>
+              <a:gd name="connsiteY17" fmla="*/ 0 h 18288"/>
+              <a:gd name="connsiteX18" fmla="*/ 10972800 w 10972800"/>
+              <a:gd name="connsiteY18" fmla="*/ 0 h 18288"/>
+              <a:gd name="connsiteX19" fmla="*/ 10972800 w 10972800"/>
+              <a:gd name="connsiteY19" fmla="*/ 18288 h 18288"/>
+              <a:gd name="connsiteX20" fmla="*/ 10177272 w 10972800"/>
+              <a:gd name="connsiteY20" fmla="*/ 18288 h 18288"/>
+              <a:gd name="connsiteX21" fmla="*/ 9820656 w 10972800"/>
+              <a:gd name="connsiteY21" fmla="*/ 18288 h 18288"/>
+              <a:gd name="connsiteX22" fmla="*/ 9464040 w 10972800"/>
+              <a:gd name="connsiteY22" fmla="*/ 18288 h 18288"/>
+              <a:gd name="connsiteX23" fmla="*/ 8778240 w 10972800"/>
+              <a:gd name="connsiteY23" fmla="*/ 18288 h 18288"/>
+              <a:gd name="connsiteX24" fmla="*/ 8421624 w 10972800"/>
+              <a:gd name="connsiteY24" fmla="*/ 18288 h 18288"/>
+              <a:gd name="connsiteX25" fmla="*/ 7735824 w 10972800"/>
+              <a:gd name="connsiteY25" fmla="*/ 18288 h 18288"/>
+              <a:gd name="connsiteX26" fmla="*/ 6940296 w 10972800"/>
+              <a:gd name="connsiteY26" fmla="*/ 18288 h 18288"/>
+              <a:gd name="connsiteX27" fmla="*/ 6254496 w 10972800"/>
+              <a:gd name="connsiteY27" fmla="*/ 18288 h 18288"/>
+              <a:gd name="connsiteX28" fmla="*/ 5458968 w 10972800"/>
+              <a:gd name="connsiteY28" fmla="*/ 18288 h 18288"/>
+              <a:gd name="connsiteX29" fmla="*/ 4663440 w 10972800"/>
+              <a:gd name="connsiteY29" fmla="*/ 18288 h 18288"/>
+              <a:gd name="connsiteX30" fmla="*/ 4306824 w 10972800"/>
+              <a:gd name="connsiteY30" fmla="*/ 18288 h 18288"/>
+              <a:gd name="connsiteX31" fmla="*/ 3840480 w 10972800"/>
+              <a:gd name="connsiteY31" fmla="*/ 18288 h 18288"/>
+              <a:gd name="connsiteX32" fmla="*/ 3264408 w 10972800"/>
+              <a:gd name="connsiteY32" fmla="*/ 18288 h 18288"/>
+              <a:gd name="connsiteX33" fmla="*/ 2578608 w 10972800"/>
+              <a:gd name="connsiteY33" fmla="*/ 18288 h 18288"/>
+              <a:gd name="connsiteX34" fmla="*/ 1673352 w 10972800"/>
+              <a:gd name="connsiteY34" fmla="*/ 18288 h 18288"/>
+              <a:gd name="connsiteX35" fmla="*/ 877824 w 10972800"/>
+              <a:gd name="connsiteY35" fmla="*/ 18288 h 18288"/>
+              <a:gd name="connsiteX36" fmla="*/ 0 w 10972800"/>
+              <a:gd name="connsiteY36" fmla="*/ 18288 h 18288"/>
+              <a:gd name="connsiteX37" fmla="*/ 0 w 10972800"/>
+              <a:gd name="connsiteY37" fmla="*/ 0 h 18288"/>
+            </a:gdLst>
+            <a:ahLst/>
+            <a:cxnLst>
+              <a:cxn ang="0">
+                <a:pos x="connsiteX0" y="connsiteY0"/>
+              </a:cxn>
+              <a:cxn ang="0">
+                <a:pos x="connsiteX1" y="connsiteY1"/>
+              </a:cxn>
+              <a:cxn ang="0">
+                <a:pos x="connsiteX2" y="connsiteY2"/>
+              </a:cxn>
+              <a:cxn ang="0">
+                <a:pos x="connsiteX3" y="connsiteY3"/>
+              </a:cxn>
+              <a:cxn ang="0">
+                <a:pos x="connsiteX4" y="connsiteY4"/>
+              </a:cxn>
+              <a:cxn ang="0">
+                <a:pos x="connsiteX5" y="connsiteY5"/>
+              </a:cxn>
+              <a:cxn ang="0">
+                <a:pos x="connsiteX6" y="connsiteY6"/>
+              </a:cxn>
+              <a:cxn ang="0">
+                <a:pos x="connsiteX7" y="connsiteY7"/>
+              </a:cxn>
+              <a:cxn ang="0">
+                <a:pos x="connsiteX8" y="connsiteY8"/>
+              </a:cxn>
+              <a:cxn ang="0">
+                <a:pos x="connsiteX9" y="connsiteY9"/>
+              </a:cxn>
+              <a:cxn ang="0">
+                <a:pos x="connsiteX10" y="connsiteY10"/>
+              </a:cxn>
+              <a:cxn ang="0">
+                <a:pos x="connsiteX11" y="connsiteY11"/>
+              </a:cxn>
+              <a:cxn ang="0">
+                <a:pos x="connsiteX12" y="connsiteY12"/>
+              </a:cxn>
+              <a:cxn ang="0">
+                <a:pos x="connsiteX13" y="connsiteY13"/>
+              </a:cxn>
+              <a:cxn ang="0">
+                <a:pos x="connsiteX14" y="connsiteY14"/>
+              </a:cxn>
+              <a:cxn ang="0">
+                <a:pos x="connsiteX15" y="connsiteY15"/>
+              </a:cxn>
+              <a:cxn ang="0">
+                <a:pos x="connsiteX16" y="connsiteY16"/>
+              </a:cxn>
+              <a:cxn ang="0">
+                <a:pos x="connsiteX17" y="connsiteY17"/>
+              </a:cxn>
+              <a:cxn ang="0">
+                <a:pos x="connsiteX18" y="connsiteY18"/>
+              </a:cxn>
+              <a:cxn ang="0">
+                <a:pos x="connsiteX19" y="connsiteY19"/>
+              </a:cxn>
+              <a:cxn ang="0">
+                <a:pos x="connsiteX20" y="connsiteY20"/>
+              </a:cxn>
+              <a:cxn ang="0">
+                <a:pos x="connsiteX21" y="connsiteY21"/>
+              </a:cxn>
+              <a:cxn ang="0">
+                <a:pos x="connsiteX22" y="connsiteY22"/>
+              </a:cxn>
+              <a:cxn ang="0">
+                <a:pos x="connsiteX23" y="connsiteY23"/>
+              </a:cxn>
+              <a:cxn ang="0">
+                <a:pos x="connsiteX24" y="connsiteY24"/>
+              </a:cxn>
+              <a:cxn ang="0">
+                <a:pos x="connsiteX25" y="connsiteY25"/>
+              </a:cxn>
+              <a:cxn ang="0">
+                <a:pos x="connsiteX26" y="connsiteY26"/>
+              </a:cxn>
+              <a:cxn ang="0">
+                <a:pos x="connsiteX27" y="connsiteY27"/>
+              </a:cxn>
+              <a:cxn ang="0">
+                <a:pos x="connsiteX28" y="connsiteY28"/>
+              </a:cxn>
+              <a:cxn ang="0">
+                <a:pos x="connsiteX29" y="connsiteY29"/>
+              </a:cxn>
+              <a:cxn ang="0">
+                <a:pos x="connsiteX30" y="connsiteY30"/>
+              </a:cxn>
+              <a:cxn ang="0">
+                <a:pos x="connsiteX31" y="connsiteY31"/>
+              </a:cxn>
+              <a:cxn ang="0">
+                <a:pos x="connsiteX32" y="connsiteY32"/>
+              </a:cxn>
+              <a:cxn ang="0">
+                <a:pos x="connsiteX33" y="connsiteY33"/>
+              </a:cxn>
+              <a:cxn ang="0">
+                <a:pos x="connsiteX34" y="connsiteY34"/>
+              </a:cxn>
+              <a:cxn ang="0">
+                <a:pos x="connsiteX35" y="connsiteY35"/>
+              </a:cxn>
+              <a:cxn ang="0">
+                <a:pos x="connsiteX36" y="connsiteY36"/>
+              </a:cxn>
+              <a:cxn ang="0">
+                <a:pos x="connsiteX37" y="connsiteY37"/>
+              </a:cxn>
+            </a:cxnLst>
+            <a:rect l="l" t="t" r="r" b="b"/>
+            <a:pathLst>
+              <a:path w="10972800" h="18288" fill="none" extrusionOk="0">
+                <a:moveTo>
+                  <a:pt x="0" y="0"/>
+                </a:moveTo>
+                <a:cubicBezTo>
+                  <a:pt x="165916" y="-1866"/>
+                  <a:pt x="188720" y="13756"/>
+                  <a:pt x="356616" y="0"/>
+                </a:cubicBezTo>
+                <a:cubicBezTo>
+                  <a:pt x="524512" y="-13756"/>
+                  <a:pt x="734781" y="8922"/>
+                  <a:pt x="1042416" y="0"/>
+                </a:cubicBezTo>
+                <a:cubicBezTo>
+                  <a:pt x="1350051" y="-8922"/>
+                  <a:pt x="1595982" y="-26315"/>
+                  <a:pt x="1947672" y="0"/>
+                </a:cubicBezTo>
+                <a:cubicBezTo>
+                  <a:pt x="2299362" y="26315"/>
+                  <a:pt x="2292691" y="-19526"/>
+                  <a:pt x="2633472" y="0"/>
+                </a:cubicBezTo>
+                <a:cubicBezTo>
+                  <a:pt x="2974253" y="19526"/>
+                  <a:pt x="2857309" y="10773"/>
+                  <a:pt x="2990088" y="0"/>
+                </a:cubicBezTo>
+                <a:cubicBezTo>
+                  <a:pt x="3122867" y="-10773"/>
+                  <a:pt x="3359343" y="7194"/>
+                  <a:pt x="3456432" y="0"/>
+                </a:cubicBezTo>
+                <a:cubicBezTo>
+                  <a:pt x="3553521" y="-7194"/>
+                  <a:pt x="4136258" y="5108"/>
+                  <a:pt x="4361688" y="0"/>
+                </a:cubicBezTo>
+                <a:cubicBezTo>
+                  <a:pt x="4587118" y="-5108"/>
+                  <a:pt x="4992424" y="-42958"/>
+                  <a:pt x="5266944" y="0"/>
+                </a:cubicBezTo>
+                <a:cubicBezTo>
+                  <a:pt x="5541464" y="42958"/>
+                  <a:pt x="5882966" y="-3430"/>
+                  <a:pt x="6172200" y="0"/>
+                </a:cubicBezTo>
+                <a:cubicBezTo>
+                  <a:pt x="6461434" y="3430"/>
+                  <a:pt x="6432127" y="6688"/>
+                  <a:pt x="6528816" y="0"/>
+                </a:cubicBezTo>
+                <a:cubicBezTo>
+                  <a:pt x="6625505" y="-6688"/>
+                  <a:pt x="6916805" y="-436"/>
+                  <a:pt x="7214616" y="0"/>
+                </a:cubicBezTo>
+                <a:cubicBezTo>
+                  <a:pt x="7512427" y="436"/>
+                  <a:pt x="7626159" y="-6909"/>
+                  <a:pt x="7790688" y="0"/>
+                </a:cubicBezTo>
+                <a:cubicBezTo>
+                  <a:pt x="7955217" y="6909"/>
+                  <a:pt x="8048891" y="15307"/>
+                  <a:pt x="8147304" y="0"/>
+                </a:cubicBezTo>
+                <a:cubicBezTo>
+                  <a:pt x="8245717" y="-15307"/>
+                  <a:pt x="8645618" y="-11734"/>
+                  <a:pt x="9052560" y="0"/>
+                </a:cubicBezTo>
+                <a:cubicBezTo>
+                  <a:pt x="9459502" y="11734"/>
+                  <a:pt x="9320584" y="8388"/>
+                  <a:pt x="9409176" y="0"/>
+                </a:cubicBezTo>
+                <a:cubicBezTo>
+                  <a:pt x="9497768" y="-8388"/>
+                  <a:pt x="9644192" y="8379"/>
+                  <a:pt x="9765792" y="0"/>
+                </a:cubicBezTo>
+                <a:cubicBezTo>
+                  <a:pt x="9887392" y="-8379"/>
+                  <a:pt x="10105220" y="-12663"/>
+                  <a:pt x="10341864" y="0"/>
+                </a:cubicBezTo>
+                <a:cubicBezTo>
+                  <a:pt x="10578508" y="12663"/>
+                  <a:pt x="10773103" y="-5786"/>
+                  <a:pt x="10972800" y="0"/>
+                </a:cubicBezTo>
+                <a:cubicBezTo>
+                  <a:pt x="10972146" y="8818"/>
+                  <a:pt x="10972240" y="13823"/>
+                  <a:pt x="10972800" y="18288"/>
+                </a:cubicBezTo>
+                <a:cubicBezTo>
+                  <a:pt x="10588778" y="31598"/>
+                  <a:pt x="10543381" y="-12698"/>
+                  <a:pt x="10177272" y="18288"/>
+                </a:cubicBezTo>
+                <a:cubicBezTo>
+                  <a:pt x="9811163" y="49274"/>
+                  <a:pt x="9996817" y="25662"/>
+                  <a:pt x="9820656" y="18288"/>
+                </a:cubicBezTo>
+                <a:cubicBezTo>
+                  <a:pt x="9644495" y="10914"/>
+                  <a:pt x="9607007" y="31631"/>
+                  <a:pt x="9464040" y="18288"/>
+                </a:cubicBezTo>
+                <a:cubicBezTo>
+                  <a:pt x="9321073" y="4945"/>
+                  <a:pt x="9114189" y="28940"/>
+                  <a:pt x="8778240" y="18288"/>
+                </a:cubicBezTo>
+                <a:cubicBezTo>
+                  <a:pt x="8442291" y="7636"/>
+                  <a:pt x="8594763" y="987"/>
+                  <a:pt x="8421624" y="18288"/>
+                </a:cubicBezTo>
+                <a:cubicBezTo>
+                  <a:pt x="8248485" y="35589"/>
+                  <a:pt x="7929515" y="37573"/>
+                  <a:pt x="7735824" y="18288"/>
+                </a:cubicBezTo>
+                <a:cubicBezTo>
+                  <a:pt x="7542133" y="-997"/>
+                  <a:pt x="7252504" y="33858"/>
+                  <a:pt x="6940296" y="18288"/>
+                </a:cubicBezTo>
+                <a:cubicBezTo>
+                  <a:pt x="6628088" y="2718"/>
+                  <a:pt x="6528503" y="48389"/>
+                  <a:pt x="6254496" y="18288"/>
+                </a:cubicBezTo>
+                <a:cubicBezTo>
+                  <a:pt x="5980489" y="-11813"/>
+                  <a:pt x="5695784" y="-3740"/>
+                  <a:pt x="5458968" y="18288"/>
+                </a:cubicBezTo>
+                <a:cubicBezTo>
+                  <a:pt x="5222152" y="40316"/>
+                  <a:pt x="5010751" y="19095"/>
+                  <a:pt x="4663440" y="18288"/>
+                </a:cubicBezTo>
+                <a:cubicBezTo>
+                  <a:pt x="4316129" y="17481"/>
+                  <a:pt x="4425552" y="1606"/>
+                  <a:pt x="4306824" y="18288"/>
+                </a:cubicBezTo>
+                <a:cubicBezTo>
+                  <a:pt x="4188096" y="34970"/>
+                  <a:pt x="3941535" y="7481"/>
+                  <a:pt x="3840480" y="18288"/>
+                </a:cubicBezTo>
+                <a:cubicBezTo>
+                  <a:pt x="3739425" y="29095"/>
+                  <a:pt x="3402388" y="17641"/>
+                  <a:pt x="3264408" y="18288"/>
+                </a:cubicBezTo>
+                <a:cubicBezTo>
+                  <a:pt x="3126428" y="18935"/>
+                  <a:pt x="2776779" y="9983"/>
+                  <a:pt x="2578608" y="18288"/>
+                </a:cubicBezTo>
+                <a:cubicBezTo>
+                  <a:pt x="2380437" y="26593"/>
+                  <a:pt x="1909468" y="25818"/>
+                  <a:pt x="1673352" y="18288"/>
+                </a:cubicBezTo>
+                <a:cubicBezTo>
+                  <a:pt x="1437236" y="10758"/>
+                  <a:pt x="1131180" y="49884"/>
+                  <a:pt x="877824" y="18288"/>
+                </a:cubicBezTo>
+                <a:cubicBezTo>
+                  <a:pt x="624468" y="-13308"/>
+                  <a:pt x="206753" y="2195"/>
+                  <a:pt x="0" y="18288"/>
+                </a:cubicBezTo>
+                <a:cubicBezTo>
+                  <a:pt x="313" y="10654"/>
+                  <a:pt x="-263" y="4056"/>
+                  <a:pt x="0" y="0"/>
+                </a:cubicBezTo>
+                <a:close/>
+              </a:path>
+              <a:path w="10972800" h="18288" stroke="0" extrusionOk="0">
+                <a:moveTo>
+                  <a:pt x="0" y="0"/>
+                </a:moveTo>
+                <a:cubicBezTo>
+                  <a:pt x="164017" y="-17675"/>
+                  <a:pt x="309425" y="9913"/>
+                  <a:pt x="466344" y="0"/>
+                </a:cubicBezTo>
+                <a:cubicBezTo>
+                  <a:pt x="623263" y="-9913"/>
+                  <a:pt x="659300" y="-14524"/>
+                  <a:pt x="822960" y="0"/>
+                </a:cubicBezTo>
+                <a:cubicBezTo>
+                  <a:pt x="986620" y="14524"/>
+                  <a:pt x="1105222" y="-16481"/>
+                  <a:pt x="1289304" y="0"/>
+                </a:cubicBezTo>
+                <a:cubicBezTo>
+                  <a:pt x="1473386" y="16481"/>
+                  <a:pt x="1693223" y="26161"/>
+                  <a:pt x="1975104" y="0"/>
+                </a:cubicBezTo>
+                <a:cubicBezTo>
+                  <a:pt x="2256985" y="-26161"/>
+                  <a:pt x="2435781" y="23061"/>
+                  <a:pt x="2770632" y="0"/>
+                </a:cubicBezTo>
+                <a:cubicBezTo>
+                  <a:pt x="3105483" y="-23061"/>
+                  <a:pt x="3247479" y="-44011"/>
+                  <a:pt x="3675888" y="0"/>
+                </a:cubicBezTo>
+                <a:cubicBezTo>
+                  <a:pt x="4104297" y="44011"/>
+                  <a:pt x="4280918" y="4017"/>
+                  <a:pt x="4581144" y="0"/>
+                </a:cubicBezTo>
+                <a:cubicBezTo>
+                  <a:pt x="4881370" y="-4017"/>
+                  <a:pt x="5021699" y="-11889"/>
+                  <a:pt x="5157216" y="0"/>
+                </a:cubicBezTo>
+                <a:cubicBezTo>
+                  <a:pt x="5292733" y="11889"/>
+                  <a:pt x="5603398" y="-17698"/>
+                  <a:pt x="5952744" y="0"/>
+                </a:cubicBezTo>
+                <a:cubicBezTo>
+                  <a:pt x="6302090" y="17698"/>
+                  <a:pt x="6353093" y="-11909"/>
+                  <a:pt x="6638544" y="0"/>
+                </a:cubicBezTo>
+                <a:cubicBezTo>
+                  <a:pt x="6923995" y="11909"/>
+                  <a:pt x="7053404" y="21630"/>
+                  <a:pt x="7214616" y="0"/>
+                </a:cubicBezTo>
+                <a:cubicBezTo>
+                  <a:pt x="7375828" y="-21630"/>
+                  <a:pt x="7837963" y="3886"/>
+                  <a:pt x="8010144" y="0"/>
+                </a:cubicBezTo>
+                <a:cubicBezTo>
+                  <a:pt x="8182325" y="-3886"/>
+                  <a:pt x="8224183" y="16009"/>
+                  <a:pt x="8366760" y="0"/>
+                </a:cubicBezTo>
+                <a:cubicBezTo>
+                  <a:pt x="8509337" y="-16009"/>
+                  <a:pt x="8687920" y="-5720"/>
+                  <a:pt x="8942832" y="0"/>
+                </a:cubicBezTo>
+                <a:cubicBezTo>
+                  <a:pt x="9197744" y="5720"/>
+                  <a:pt x="9368437" y="20479"/>
+                  <a:pt x="9628632" y="0"/>
+                </a:cubicBezTo>
+                <a:cubicBezTo>
+                  <a:pt x="9888827" y="-20479"/>
+                  <a:pt x="10560858" y="-20746"/>
+                  <a:pt x="10972800" y="0"/>
+                </a:cubicBezTo>
+                <a:cubicBezTo>
+                  <a:pt x="10972186" y="5722"/>
+                  <a:pt x="10972980" y="12495"/>
+                  <a:pt x="10972800" y="18288"/>
+                </a:cubicBezTo>
+                <a:cubicBezTo>
+                  <a:pt x="10786146" y="12536"/>
+                  <a:pt x="10623717" y="14033"/>
+                  <a:pt x="10506456" y="18288"/>
+                </a:cubicBezTo>
+                <a:cubicBezTo>
+                  <a:pt x="10389195" y="22543"/>
+                  <a:pt x="10296178" y="20107"/>
+                  <a:pt x="10149840" y="18288"/>
+                </a:cubicBezTo>
+                <a:cubicBezTo>
+                  <a:pt x="10003502" y="16469"/>
+                  <a:pt x="9767530" y="28891"/>
+                  <a:pt x="9464040" y="18288"/>
+                </a:cubicBezTo>
+                <a:cubicBezTo>
+                  <a:pt x="9160550" y="7685"/>
+                  <a:pt x="9229050" y="2659"/>
+                  <a:pt x="8997696" y="18288"/>
+                </a:cubicBezTo>
+                <a:cubicBezTo>
+                  <a:pt x="8766342" y="33917"/>
+                  <a:pt x="8340136" y="34864"/>
+                  <a:pt x="8092440" y="18288"/>
+                </a:cubicBezTo>
+                <a:cubicBezTo>
+                  <a:pt x="7844744" y="1712"/>
+                  <a:pt x="7863720" y="27405"/>
+                  <a:pt x="7735824" y="18288"/>
+                </a:cubicBezTo>
+                <a:cubicBezTo>
+                  <a:pt x="7607928" y="9171"/>
+                  <a:pt x="7323619" y="461"/>
+                  <a:pt x="7050024" y="18288"/>
+                </a:cubicBezTo>
+                <a:cubicBezTo>
+                  <a:pt x="6776429" y="36115"/>
+                  <a:pt x="6787899" y="28206"/>
+                  <a:pt x="6693408" y="18288"/>
+                </a:cubicBezTo>
+                <a:cubicBezTo>
+                  <a:pt x="6598917" y="8370"/>
+                  <a:pt x="6395231" y="19114"/>
+                  <a:pt x="6227064" y="18288"/>
+                </a:cubicBezTo>
+                <a:cubicBezTo>
+                  <a:pt x="6058897" y="17462"/>
+                  <a:pt x="5618582" y="1091"/>
+                  <a:pt x="5431536" y="18288"/>
+                </a:cubicBezTo>
+                <a:cubicBezTo>
+                  <a:pt x="5244490" y="35485"/>
+                  <a:pt x="4729797" y="-9650"/>
+                  <a:pt x="4526280" y="18288"/>
+                </a:cubicBezTo>
+                <a:cubicBezTo>
+                  <a:pt x="4322763" y="46226"/>
+                  <a:pt x="4216797" y="756"/>
+                  <a:pt x="4059936" y="18288"/>
+                </a:cubicBezTo>
+                <a:cubicBezTo>
+                  <a:pt x="3903075" y="35820"/>
+                  <a:pt x="3537912" y="42098"/>
+                  <a:pt x="3374136" y="18288"/>
+                </a:cubicBezTo>
+                <a:cubicBezTo>
+                  <a:pt x="3210360" y="-5522"/>
+                  <a:pt x="3126842" y="39135"/>
+                  <a:pt x="2907792" y="18288"/>
+                </a:cubicBezTo>
+                <a:cubicBezTo>
+                  <a:pt x="2688742" y="-2559"/>
+                  <a:pt x="2490436" y="34100"/>
+                  <a:pt x="2112264" y="18288"/>
+                </a:cubicBezTo>
+                <a:cubicBezTo>
+                  <a:pt x="1734092" y="2476"/>
+                  <a:pt x="1744622" y="-7274"/>
+                  <a:pt x="1536192" y="18288"/>
+                </a:cubicBezTo>
+                <a:cubicBezTo>
+                  <a:pt x="1327762" y="43850"/>
+                  <a:pt x="1189025" y="6435"/>
+                  <a:pt x="1069848" y="18288"/>
+                </a:cubicBezTo>
+                <a:cubicBezTo>
+                  <a:pt x="950671" y="30141"/>
+                  <a:pt x="858345" y="33684"/>
+                  <a:pt x="713232" y="18288"/>
+                </a:cubicBezTo>
+                <a:cubicBezTo>
+                  <a:pt x="568119" y="2892"/>
+                  <a:pt x="250292" y="5410"/>
+                  <a:pt x="0" y="18288"/>
+                </a:cubicBezTo>
+                <a:cubicBezTo>
+                  <a:pt x="465" y="13062"/>
+                  <a:pt x="-894" y="9029"/>
+                  <a:pt x="0" y="0"/>
+                </a:cubicBezTo>
+                <a:close/>
+              </a:path>
+            </a:pathLst>
+          </a:custGeom>
+          <a:solidFill>
+            <a:schemeClr val="accent2">
+              <a:alpha val="75000"/>
+            </a:schemeClr>
+          </a:solidFill>
+          <a:ln w="44450" cap="rnd">
+            <a:solidFill>
+              <a:schemeClr val="accent2">
+                <a:alpha val="75000"/>
+              </a:schemeClr>
+            </a:solidFill>
+            <a:round/>
+            <a:extLst>
+              <a:ext uri="{C807C97D-BFC1-408E-A445-0C87EB9F89A2}">
+                <ask:lineSketchStyleProps xmlns:ask="http://schemas.microsoft.com/office/drawing/2018/sketchyshapes" sd="2727557108">
+                  <a:prstGeom prst="rect">
+                    <a:avLst/>
+                  </a:prstGeom>
+                  <ask:type>
+                    <ask:lineSketchFreehand/>
+                  </ask:type>
+                </ask:lineSketchStyleProps>
+              </a:ext>
+            </a:extLst>
+          </a:ln>
+        </p:spPr>
+        <p:style>
+          <a:lnRef idx="2">
+            <a:schemeClr val="accent1">
+              <a:shade val="50000"/>
+            </a:schemeClr>
+          </a:lnRef>
+          <a:fillRef idx="1">
+            <a:schemeClr val="accent1"/>
+          </a:fillRef>
+          <a:effectRef idx="0">
+            <a:schemeClr val="accent1"/>
+          </a:effectRef>
+          <a:fontRef idx="minor">
+            <a:schemeClr val="lt1"/>
+          </a:fontRef>
+        </p:style>
+        <p:txBody>
+          <a:bodyPr rtlCol="0" anchor="ctr"/>
+          <a:lstStyle/>
+          <a:p>
+            <a:pPr marL="0" marR="0" lvl="0" indent="0" algn="ctr" defTabSz="914400" rtl="0" eaLnBrk="1" fontAlgn="auto" latinLnBrk="0" hangingPunct="1">
+              <a:lnSpc>
+                <a:spcPct val="100000"/>
+              </a:lnSpc>
+              <a:spcBef>
+                <a:spcPts val="0"/>
+              </a:spcBef>
+              <a:spcAft>
+                <a:spcPts val="0"/>
+              </a:spcAft>
+              <a:buClrTx/>
+              <a:buSzTx/>
+              <a:buFontTx/>
+              <a:buNone/>
+              <a:tabLst/>
+              <a:defRPr/>
+            </a:pPr>
+            <a:endParaRPr kumimoji="0" lang="en-US" sz="1800" b="0" i="0" u="none" strike="noStrike" kern="1200" cap="none" spc="0" normalizeH="0" baseline="0" noProof="0">
+              <a:ln>
+                <a:noFill/>
+              </a:ln>
+              <a:solidFill>
+                <a:prstClr val="white"/>
+              </a:solidFill>
+              <a:effectLst/>
+              <a:uLnTx/>
+              <a:uFillTx/>
+              <a:latin typeface="Calibri" panose="020F0502020204030204"/>
+              <a:ea typeface="+mn-ea"/>
+              <a:cs typeface="+mn-cs"/>
+            </a:endParaRPr>
+          </a:p>
+        </p:txBody>
+      </p:sp>
+      <p:sp>
+        <p:nvSpPr>
+          <p:cNvPr id="3" name="Content Placeholder 2">
+            <a:extLst>
+              <a:ext uri="{FF2B5EF4-FFF2-40B4-BE49-F238E27FC236}">
+                <a16:creationId xmlns:a16="http://schemas.microsoft.com/office/drawing/2014/main" id="{A4FDF02A-F871-ECAC-5C2B-91DC9C23E08C}"/>
+              </a:ext>
+            </a:extLst>
+          </p:cNvPr>
+          <p:cNvSpPr>
+            <a:spLocks noGrp="1"/>
+          </p:cNvSpPr>
+          <p:nvPr>
+            <p:ph idx="1"/>
+          </p:nvPr>
+        </p:nvSpPr>
+        <p:spPr>
+          <a:xfrm>
+            <a:off x="705393" y="1911493"/>
+            <a:ext cx="10648405" cy="4399691"/>
+          </a:xfrm>
+        </p:spPr>
+        <p:txBody>
+          <a:bodyPr anchor="ctr">
+            <a:normAutofit fontScale="92500" lnSpcReduction="10000"/>
+          </a:bodyPr>
+          <a:lstStyle/>
+          <a:p>
+            <a:pPr>
+              <a:lnSpc>
+                <a:spcPct val="110000"/>
+              </a:lnSpc>
+            </a:pPr>
+            <a:r>
+              <a:rPr lang="en-US" dirty="0"/>
+              <a:t>Sitio principal: </a:t>
+            </a:r>
+            <a:r>
+              <a:rPr lang="en-US" dirty="0">
+                <a:hlinkClick r:id="rId3"/>
+              </a:rPr>
+              <a:t>https://music-encoding.org/</a:t>
+            </a:r>
+            <a:endParaRPr lang="en-US" dirty="0"/>
+          </a:p>
+          <a:p>
+            <a:pPr>
+              <a:lnSpc>
+                <a:spcPct val="110000"/>
+              </a:lnSpc>
+            </a:pPr>
+            <a:r>
+              <a:rPr lang="en-US" dirty="0"/>
+              <a:t>Directrices: </a:t>
+            </a:r>
+            <a:r>
+              <a:rPr lang="en-US" dirty="0">
+                <a:hlinkClick r:id="rId4"/>
+              </a:rPr>
+              <a:t>https://music-encoding.org/guidelines/v5/content/index.html</a:t>
+            </a:r>
+            <a:endParaRPr lang="en-US" dirty="0"/>
+          </a:p>
+          <a:p>
+            <a:pPr>
+              <a:lnSpc>
+                <a:spcPct val="110000"/>
+              </a:lnSpc>
+            </a:pPr>
+            <a:r>
+              <a:rPr lang="en-US" dirty="0" err="1"/>
+              <a:t>Tutoriales</a:t>
+            </a:r>
+            <a:r>
+              <a:rPr lang="en-US" dirty="0"/>
+              <a:t>: </a:t>
+            </a:r>
+            <a:r>
+              <a:rPr lang="en-US" dirty="0">
+                <a:hlinkClick r:id="rId5"/>
+              </a:rPr>
+              <a:t>https://music-encoding.org/resources/tutorials.html</a:t>
+            </a:r>
+            <a:endParaRPr lang="en-US" dirty="0"/>
+          </a:p>
+          <a:p>
+            <a:pPr lvl="1">
+              <a:lnSpc>
+                <a:spcPct val="110000"/>
+              </a:lnSpc>
+            </a:pPr>
+            <a:r>
+              <a:rPr lang="en-US" dirty="0" err="1"/>
+              <a:t>Versión</a:t>
+            </a:r>
+            <a:r>
+              <a:rPr lang="en-US" dirty="0"/>
+              <a:t> </a:t>
+            </a:r>
+            <a:r>
+              <a:rPr lang="en-US" dirty="0" err="1"/>
+              <a:t>en</a:t>
+            </a:r>
+            <a:r>
+              <a:rPr lang="en-US" dirty="0"/>
+              <a:t> </a:t>
+            </a:r>
+            <a:r>
+              <a:rPr lang="en-US" dirty="0" err="1"/>
+              <a:t>español</a:t>
+            </a:r>
+            <a:r>
+              <a:rPr lang="en-US" dirty="0"/>
+              <a:t>: </a:t>
+            </a:r>
+            <a:r>
+              <a:rPr lang="en-US" dirty="0">
+                <a:hlinkClick r:id="rId6"/>
+              </a:rPr>
+              <a:t>https://music-encoding.org/resources/tutorials-</a:t>
+            </a:r>
+            <a:r>
+              <a:rPr lang="en-US" dirty="0" err="1">
+                <a:hlinkClick r:id="rId6"/>
+              </a:rPr>
+              <a:t>ES.htm</a:t>
+            </a:r>
+            <a:r>
+              <a:rPr lang="en-US" dirty="0" err="1">
+                <a:hlinkClick r:id="rId6"/>
+              </a:rPr>
+              <a:t>l</a:t>
+            </a:r>
+            <a:endParaRPr lang="en-US" dirty="0"/>
+          </a:p>
+          <a:p>
+            <a:pPr>
+              <a:lnSpc>
+                <a:spcPct val="110000"/>
+              </a:lnSpc>
+            </a:pPr>
+            <a:r>
+              <a:rPr lang="en-US" dirty="0" err="1"/>
+              <a:t>Herramientas</a:t>
+            </a:r>
+            <a:r>
+              <a:rPr lang="en-US" dirty="0"/>
+              <a:t>: </a:t>
+            </a:r>
+            <a:r>
+              <a:rPr lang="en-US" dirty="0">
+                <a:hlinkClick r:id="rId7"/>
+              </a:rPr>
+              <a:t>https://music-encoding.org/resources/tools.html</a:t>
+            </a:r>
+            <a:r>
+              <a:rPr lang="en-US" dirty="0"/>
+              <a:t>, </a:t>
+            </a:r>
+            <a:br>
+              <a:rPr lang="en-US" dirty="0"/>
+            </a:br>
+            <a:r>
+              <a:rPr lang="en-US" dirty="0"/>
+              <a:t>		     </a:t>
+            </a:r>
+            <a:r>
+              <a:rPr lang="en-US" dirty="0" err="1"/>
+              <a:t>incluyendo</a:t>
+            </a:r>
+            <a:r>
+              <a:rPr lang="en-US" dirty="0"/>
+              <a:t> </a:t>
+            </a:r>
+            <a:r>
+              <a:rPr lang="en-US" i="1" dirty="0" err="1"/>
+              <a:t>mei</a:t>
+            </a:r>
+            <a:r>
+              <a:rPr lang="en-US" i="1" dirty="0"/>
+              <a:t>-friend, Verovio</a:t>
+            </a:r>
+            <a:r>
+              <a:rPr lang="en-US" dirty="0"/>
+              <a:t> y </a:t>
+            </a:r>
+            <a:r>
+              <a:rPr lang="en-US" i="1" dirty="0" err="1"/>
+              <a:t>MuseScore</a:t>
+            </a:r>
+            <a:endParaRPr lang="en-US" i="1" dirty="0"/>
+          </a:p>
+          <a:p>
+            <a:pPr>
+              <a:lnSpc>
+                <a:spcPct val="110000"/>
+              </a:lnSpc>
+            </a:pPr>
+            <a:r>
+              <a:rPr lang="en-US" dirty="0" err="1"/>
+              <a:t>Ejemplos</a:t>
+            </a:r>
+            <a:r>
+              <a:rPr lang="en-US" dirty="0"/>
+              <a:t>: </a:t>
+            </a:r>
+            <a:r>
+              <a:rPr lang="en-US" dirty="0">
+                <a:hlinkClick r:id="rId8"/>
+              </a:rPr>
+              <a:t>https://github.com/music-encoding/sample-encodings</a:t>
+            </a:r>
+            <a:endParaRPr lang="en-US" dirty="0"/>
+          </a:p>
+          <a:p>
+            <a:pPr lvl="1">
+              <a:lnSpc>
+                <a:spcPct val="110000"/>
+              </a:lnSpc>
+            </a:pPr>
+            <a:r>
+              <a:rPr lang="en-US" dirty="0"/>
+              <a:t>Para la </a:t>
+            </a:r>
+            <a:r>
+              <a:rPr lang="en-US" dirty="0" err="1"/>
+              <a:t>versión</a:t>
+            </a:r>
+            <a:r>
+              <a:rPr lang="en-US" dirty="0"/>
+              <a:t> actual (MEI 5.0): </a:t>
+            </a:r>
+            <a:r>
+              <a:rPr lang="en-US" dirty="0">
+                <a:hlinkClick r:id="rId9"/>
+              </a:rPr>
+              <a:t>https://github.com/music-encoding/sample-encodings/tree/main/MEI_5.0</a:t>
+            </a:r>
+            <a:endParaRPr lang="en-US" dirty="0"/>
+          </a:p>
+        </p:txBody>
+      </p:sp>
+      <p:sp>
+        <p:nvSpPr>
+          <p:cNvPr id="4" name="Slide Number Placeholder 3">
+            <a:extLst>
+              <a:ext uri="{FF2B5EF4-FFF2-40B4-BE49-F238E27FC236}">
+                <a16:creationId xmlns:a16="http://schemas.microsoft.com/office/drawing/2014/main" id="{B571100F-11F1-D1CB-F30B-5E16161ACC56}"/>
+              </a:ext>
+            </a:extLst>
+          </p:cNvPr>
+          <p:cNvSpPr>
+            <a:spLocks noGrp="1"/>
+          </p:cNvSpPr>
+          <p:nvPr>
+            <p:ph type="sldNum" sz="quarter" idx="12"/>
+          </p:nvPr>
+        </p:nvSpPr>
+        <p:spPr>
+          <a:xfrm>
+            <a:off x="8610600" y="6356350"/>
+            <a:ext cx="2743200" cy="365125"/>
+          </a:xfrm>
+        </p:spPr>
+        <p:txBody>
+          <a:bodyPr>
+            <a:normAutofit/>
+          </a:bodyPr>
+          <a:lstStyle/>
+          <a:p>
+            <a:pPr marL="0" marR="0" lvl="0" indent="0" algn="r" defTabSz="914400" rtl="0" eaLnBrk="1" fontAlgn="auto" latinLnBrk="0" hangingPunct="1">
+              <a:lnSpc>
+                <a:spcPct val="100000"/>
+              </a:lnSpc>
+              <a:spcBef>
+                <a:spcPts val="0"/>
+              </a:spcBef>
+              <a:spcAft>
+                <a:spcPts val="600"/>
+              </a:spcAft>
+              <a:buClrTx/>
+              <a:buSzTx/>
+              <a:buFontTx/>
+              <a:buNone/>
+              <a:tabLst/>
+              <a:defRPr/>
+            </a:pPr>
+            <a:fld id="{D9FF2CE1-4360-5044-9EA9-3D29EE27F344}" type="slidenum">
+              <a:rPr kumimoji="0" lang="en-US" sz="1200" b="0" i="0" u="none" strike="noStrike" kern="1200" cap="none" spc="0" normalizeH="0" baseline="0" noProof="0" smtClean="0">
+                <a:ln>
+                  <a:noFill/>
+                </a:ln>
+                <a:solidFill>
+                  <a:prstClr val="black">
+                    <a:tint val="75000"/>
+                  </a:prstClr>
+                </a:solidFill>
+                <a:effectLst/>
+                <a:uLnTx/>
+                <a:uFillTx/>
+                <a:latin typeface="Calibri" panose="020F0502020204030204"/>
+                <a:ea typeface="+mn-ea"/>
+                <a:cs typeface="+mn-cs"/>
+              </a:rPr>
+              <a:pPr marL="0" marR="0" lvl="0" indent="0" algn="r" defTabSz="914400" rtl="0" eaLnBrk="1" fontAlgn="auto" latinLnBrk="0" hangingPunct="1">
+                <a:lnSpc>
+                  <a:spcPct val="100000"/>
+                </a:lnSpc>
+                <a:spcBef>
+                  <a:spcPts val="0"/>
+                </a:spcBef>
+                <a:spcAft>
+                  <a:spcPts val="600"/>
+                </a:spcAft>
+                <a:buClrTx/>
+                <a:buSzTx/>
+                <a:buFontTx/>
+                <a:buNone/>
+                <a:tabLst/>
+                <a:defRPr/>
+              </a:pPr>
+              <a:t>25</a:t>
+            </a:fld>
+            <a:endParaRPr kumimoji="0" lang="en-US" sz="1200" b="0" i="0" u="none" strike="noStrike" kern="1200" cap="none" spc="0" normalizeH="0" baseline="0" noProof="0">
+              <a:ln>
+                <a:noFill/>
+              </a:ln>
+              <a:solidFill>
+                <a:prstClr val="black">
+                  <a:tint val="75000"/>
+                </a:prstClr>
+              </a:solidFill>
+              <a:effectLst/>
+              <a:uLnTx/>
+              <a:uFillTx/>
+              <a:latin typeface="Calibri" panose="020F0502020204030204"/>
+              <a:ea typeface="+mn-ea"/>
+              <a:cs typeface="+mn-cs"/>
+            </a:endParaRPr>
+          </a:p>
+        </p:txBody>
+      </p:sp>
+    </p:spTree>
+    <p:extLst>
+      <p:ext uri="{BB962C8B-B14F-4D97-AF65-F5344CB8AC3E}">
+        <p14:creationId xmlns:p14="http://schemas.microsoft.com/office/powerpoint/2010/main" val="3111419656"/>
       </p:ext>
     </p:extLst>
   </p:cSld>

</xml_diff>

<commit_message>
Correct a speaker note in the presentation
The attribute for `<scoreDef>` is `@keysig` (not `@key.sig`)
</commit_message>
<xml_diff>
--- a/Presentacion_SemanaHD2024_MThomae.pptx
+++ b/Presentacion_SemanaHD2024_MThomae.pptx
@@ -221,7 +221,7 @@
           <a:p>
             <a:fld id="{4C80AE49-904E-A545-8392-2DB050EA8A4D}" type="datetimeFigureOut">
               <a:rPr lang="en-US" smtClean="0"/>
-              <a:t>5/20/24</a:t>
+              <a:t>10/3/24</a:t>
             </a:fld>
             <a:endParaRPr lang="en-US"/>
           </a:p>
@@ -649,7 +649,7 @@
             </a:pPr>
             <a:r>
               <a:rPr lang="es-ES_tradnl" dirty="0"/>
-              <a:t>Abrir ejercicio completo para que vean lo de la renderización, acceso a directrices, español (cuando empecemos verán el auto-completado y validación)</a:t>
+              <a:t>Abrir la pieza inicial para que vean lo de la renderización, acceso a directrices, español (cuando empecemos verán el auto-completado y validación)</a:t>
             </a:r>
           </a:p>
           <a:p>
@@ -659,13 +659,8 @@
             </a:pPr>
             <a:r>
               <a:rPr lang="es-ES_tradnl" dirty="0"/>
-              <a:t>Se </a:t>
-            </a:r>
-            <a:r>
-              <a:rPr lang="es-ES_tradnl"/>
-              <a:t>puede escuchar</a:t>
-            </a:r>
-            <a:endParaRPr lang="es-ES_tradnl" dirty="0"/>
+              <a:t>Se puede escuchar</a:t>
+            </a:r>
           </a:p>
         </p:txBody>
       </p:sp>
@@ -981,7 +976,7 @@
             </a:pPr>
             <a:r>
               <a:rPr lang="es-ES_tradnl" dirty="0" err="1"/>
-              <a:t>key.sig</a:t>
+              <a:t>keysig</a:t>
             </a:r>
             <a:r>
               <a:rPr lang="es-ES_tradnl" dirty="0"/>
@@ -1542,7 +1537,7 @@
             </a:pPr>
             <a:r>
               <a:rPr lang="es-ES_tradnl" dirty="0" err="1"/>
-              <a:t>key.sig</a:t>
+              <a:t>keysig</a:t>
             </a:r>
             <a:r>
               <a:rPr lang="es-ES_tradnl" dirty="0"/>
@@ -3338,6 +3333,1508 @@
           <a:bodyPr/>
           <a:lstStyle/>
           <a:p>
+            <a:pPr marL="171450" indent="-171450">
+              <a:buFont typeface="Arial" panose="020B0604020202020204" pitchFamily="34" charset="0"/>
+              <a:buChar char="•"/>
+            </a:pPr>
+            <a:r>
+              <a:rPr lang="en-US" dirty="0" err="1"/>
+              <a:t>Parrafo</a:t>
+            </a:r>
+            <a:r>
+              <a:rPr lang="en-US" dirty="0"/>
+              <a:t> 1, mas info </a:t>
+            </a:r>
+            <a:r>
+              <a:rPr lang="en-US" dirty="0" err="1"/>
+              <a:t>en</a:t>
+            </a:r>
+            <a:r>
+              <a:rPr lang="en-US" dirty="0"/>
+              <a:t> </a:t>
+            </a:r>
+            <a:r>
+              <a:rPr lang="en-US" dirty="0" err="1"/>
+              <a:t>este</a:t>
+            </a:r>
+            <a:r>
+              <a:rPr lang="en-US" dirty="0"/>
+              <a:t> </a:t>
+            </a:r>
+            <a:r>
+              <a:rPr lang="en-US" dirty="0" err="1"/>
+              <a:t>capitulo</a:t>
+            </a:r>
+            <a:r>
+              <a:rPr lang="en-US" dirty="0"/>
+              <a:t> de las directrices, y 3</a:t>
+            </a:r>
+          </a:p>
+          <a:p>
+            <a:r>
+              <a:rPr lang="en-US" b="1" dirty="0"/>
+              <a:t>----1 /2</a:t>
+            </a:r>
+          </a:p>
+          <a:p>
+            <a:pPr marL="171450" indent="-171450">
+              <a:buFont typeface="Arial" panose="020B0604020202020204" pitchFamily="34" charset="0"/>
+              <a:buChar char="•"/>
+            </a:pPr>
+            <a:r>
+              <a:rPr lang="en-US" dirty="0" err="1"/>
+              <a:t>Todos</a:t>
+            </a:r>
+            <a:r>
+              <a:rPr lang="en-US" dirty="0"/>
+              <a:t> </a:t>
+            </a:r>
+            <a:r>
+              <a:rPr lang="en-US" dirty="0" err="1"/>
+              <a:t>los</a:t>
+            </a:r>
+            <a:r>
+              <a:rPr lang="en-US" dirty="0"/>
+              <a:t> </a:t>
+            </a:r>
+            <a:r>
+              <a:rPr lang="en-US" dirty="0" err="1"/>
+              <a:t>parrafos</a:t>
+            </a:r>
+            <a:r>
+              <a:rPr lang="en-US" dirty="0"/>
+              <a:t> hasta la </a:t>
+            </a:r>
+            <a:r>
+              <a:rPr lang="en-US" dirty="0" err="1"/>
+              <a:t>tarea</a:t>
+            </a:r>
+            <a:r>
+              <a:rPr lang="en-US" dirty="0"/>
+              <a:t> (inclusive)</a:t>
+            </a:r>
+          </a:p>
+          <a:p>
+            <a:r>
+              <a:rPr lang="en-US" b="1" dirty="0"/>
+              <a:t>----2 /3</a:t>
+            </a:r>
+          </a:p>
+          <a:p>
+            <a:pPr marL="171450" indent="-171450">
+              <a:buFont typeface="Arial" panose="020B0604020202020204" pitchFamily="34" charset="0"/>
+              <a:buChar char="•"/>
+            </a:pPr>
+            <a:r>
+              <a:rPr lang="en-US" dirty="0"/>
+              <a:t>“ESPACIOS DE NOMBRE” + TODO - EXCEPTO UN PARENTESIS: “</a:t>
+            </a:r>
+            <a:r>
+              <a:rPr lang="en-US" dirty="0" err="1"/>
+              <a:t>espacios</a:t>
+            </a:r>
+            <a:r>
+              <a:rPr lang="en-US" dirty="0"/>
+              <a:t> de </a:t>
+            </a:r>
+            <a:r>
+              <a:rPr lang="en-US" dirty="0" err="1"/>
+              <a:t>nombre</a:t>
+            </a:r>
+            <a:r>
+              <a:rPr lang="en-US" dirty="0"/>
+              <a:t>’ + </a:t>
+            </a:r>
+            <a:r>
+              <a:rPr lang="en-US" dirty="0" err="1"/>
+              <a:t>parrafo</a:t>
+            </a:r>
+            <a:r>
+              <a:rPr lang="en-US" dirty="0"/>
+              <a:t> 1 (</a:t>
+            </a:r>
+            <a:r>
+              <a:rPr lang="en-US" dirty="0" err="1"/>
+              <a:t>tecnico</a:t>
+            </a:r>
+            <a:r>
+              <a:rPr lang="en-US" dirty="0"/>
+              <a:t> y ultima </a:t>
+            </a:r>
+            <a:r>
+              <a:rPr lang="en-US" dirty="0" err="1"/>
+              <a:t>linea</a:t>
+            </a:r>
+            <a:r>
+              <a:rPr lang="en-US" dirty="0"/>
+              <a:t>) + 2ndo + 3ro (sin </a:t>
+            </a:r>
+            <a:r>
+              <a:rPr lang="en-US" dirty="0" err="1"/>
+              <a:t>xpath</a:t>
+            </a:r>
+            <a:r>
+              <a:rPr lang="en-US" dirty="0"/>
+              <a:t> </a:t>
+            </a:r>
+            <a:r>
+              <a:rPr lang="en-US" dirty="0" err="1"/>
+              <a:t>parentesis</a:t>
+            </a:r>
+            <a:r>
+              <a:rPr lang="en-US" dirty="0"/>
+              <a:t>, </a:t>
+            </a:r>
+            <a:r>
+              <a:rPr lang="en-US" dirty="0" err="1"/>
+              <a:t>en</a:t>
+            </a:r>
+            <a:r>
+              <a:rPr lang="en-US" dirty="0"/>
+              <a:t> </a:t>
+            </a:r>
+            <a:r>
+              <a:rPr lang="en-US" dirty="0" err="1"/>
+              <a:t>lugar</a:t>
+            </a:r>
+            <a:r>
+              <a:rPr lang="en-US" dirty="0"/>
+              <a:t> de </a:t>
+            </a:r>
+            <a:r>
+              <a:rPr lang="en-US" dirty="0" err="1"/>
+              <a:t>eso</a:t>
+            </a:r>
+            <a:r>
+              <a:rPr lang="en-US" dirty="0"/>
+              <a:t> “</a:t>
+            </a:r>
+            <a:r>
+              <a:rPr lang="en-US" dirty="0" err="1"/>
+              <a:t>atributs</a:t>
+            </a:r>
+            <a:r>
+              <a:rPr lang="en-US" dirty="0"/>
+              <a:t> y </a:t>
+            </a:r>
+            <a:r>
+              <a:rPr lang="en-US" dirty="0" err="1"/>
+              <a:t>elementos</a:t>
+            </a:r>
+            <a:r>
+              <a:rPr lang="en-US" dirty="0"/>
+              <a:t>”), </a:t>
+            </a:r>
+            <a:r>
+              <a:rPr lang="en-US" dirty="0" err="1"/>
+              <a:t>mientras</a:t>
+            </a:r>
+            <a:r>
+              <a:rPr lang="en-US" dirty="0"/>
+              <a:t> das </a:t>
+            </a:r>
+            <a:r>
+              <a:rPr lang="en-US" dirty="0" err="1"/>
+              <a:t>ejemplos</a:t>
+            </a:r>
+            <a:r>
+              <a:rPr lang="en-US" dirty="0"/>
+              <a:t> + </a:t>
+            </a:r>
+            <a:r>
+              <a:rPr lang="en-US" dirty="0" err="1"/>
+              <a:t>tarea</a:t>
+            </a:r>
+            <a:r>
+              <a:rPr lang="en-US" dirty="0"/>
+              <a:t> PISTA!!! --- </a:t>
+            </a:r>
+            <a:r>
+              <a:rPr lang="en-US" dirty="0" err="1"/>
+              <a:t>boton</a:t>
+            </a:r>
+            <a:r>
+              <a:rPr lang="en-US" dirty="0"/>
+              <a:t> de </a:t>
+            </a:r>
+            <a:r>
+              <a:rPr lang="en-US" dirty="0" err="1"/>
+              <a:t>continuar</a:t>
+            </a:r>
+            <a:r>
+              <a:rPr lang="en-US" dirty="0"/>
+              <a:t> </a:t>
+            </a:r>
+            <a:r>
+              <a:rPr lang="en-US" dirty="0" err="1"/>
+              <a:t>abilitado</a:t>
+            </a:r>
+            <a:r>
+              <a:rPr lang="en-US" dirty="0"/>
+              <a:t> --- </a:t>
+            </a:r>
+            <a:r>
+              <a:rPr lang="en-US" dirty="0" err="1"/>
+              <a:t>esta</a:t>
+            </a:r>
+            <a:r>
+              <a:rPr lang="en-US" dirty="0"/>
+              <a:t> </a:t>
+            </a:r>
+            <a:r>
+              <a:rPr lang="en-US" dirty="0" err="1"/>
+              <a:t>apuntando</a:t>
+            </a:r>
+            <a:r>
+              <a:rPr lang="en-US" dirty="0"/>
+              <a:t> al </a:t>
+            </a:r>
+            <a:r>
+              <a:rPr lang="en-US" dirty="0" err="1"/>
+              <a:t>espacio</a:t>
+            </a:r>
+            <a:r>
+              <a:rPr lang="en-US" dirty="0"/>
+              <a:t> de </a:t>
+            </a:r>
+            <a:r>
+              <a:rPr lang="en-US" dirty="0" err="1"/>
+              <a:t>nombres</a:t>
+            </a:r>
+            <a:r>
+              <a:rPr lang="en-US" dirty="0"/>
+              <a:t> de </a:t>
+            </a:r>
+            <a:r>
+              <a:rPr lang="en-US" dirty="0" err="1"/>
+              <a:t>mei</a:t>
+            </a:r>
+            <a:r>
+              <a:rPr lang="en-US" dirty="0"/>
+              <a:t>, </a:t>
+            </a:r>
+            <a:r>
+              <a:rPr lang="en-US" dirty="0" err="1"/>
+              <a:t>permite</a:t>
+            </a:r>
+            <a:r>
+              <a:rPr lang="en-US" dirty="0"/>
+              <a:t> que </a:t>
+            </a:r>
+            <a:r>
+              <a:rPr lang="en-US" dirty="0" err="1"/>
+              <a:t>entienda</a:t>
+            </a:r>
+            <a:r>
+              <a:rPr lang="en-US" dirty="0"/>
+              <a:t> que </a:t>
+            </a:r>
+            <a:r>
+              <a:rPr lang="en-US" dirty="0" err="1"/>
+              <a:t>todo</a:t>
+            </a:r>
+            <a:r>
+              <a:rPr lang="en-US" dirty="0"/>
+              <a:t> </a:t>
+            </a:r>
+            <a:r>
+              <a:rPr lang="en-US" dirty="0" err="1"/>
+              <a:t>el</a:t>
+            </a:r>
+            <a:r>
+              <a:rPr lang="en-US" dirty="0"/>
+              <a:t> </a:t>
+            </a:r>
+            <a:r>
+              <a:rPr lang="en-US" dirty="0" err="1"/>
+              <a:t>codigo</a:t>
+            </a:r>
+            <a:r>
+              <a:rPr lang="en-US" dirty="0"/>
+              <a:t> </a:t>
+            </a:r>
+            <a:r>
+              <a:rPr lang="en-US" dirty="0" err="1"/>
+              <a:t>entrante</a:t>
+            </a:r>
+            <a:r>
+              <a:rPr lang="en-US" dirty="0"/>
+              <a:t> es de </a:t>
+            </a:r>
+            <a:r>
+              <a:rPr lang="en-US" dirty="0" err="1"/>
+              <a:t>mei</a:t>
+            </a:r>
+            <a:r>
+              <a:rPr lang="en-US" dirty="0"/>
+              <a:t> (</a:t>
+            </a:r>
+            <a:r>
+              <a:rPr lang="en-US" dirty="0" err="1"/>
+              <a:t>porque</a:t>
+            </a:r>
+            <a:r>
+              <a:rPr lang="en-US" dirty="0"/>
+              <a:t> </a:t>
+            </a:r>
+            <a:r>
+              <a:rPr lang="en-US" dirty="0" err="1"/>
+              <a:t>pondria</a:t>
+            </a:r>
+            <a:r>
+              <a:rPr lang="en-US" dirty="0"/>
+              <a:t> ser de </a:t>
+            </a:r>
+            <a:r>
+              <a:rPr lang="en-US" dirty="0" err="1"/>
+              <a:t>musicxml</a:t>
+            </a:r>
+            <a:r>
+              <a:rPr lang="en-US" dirty="0"/>
+              <a:t> u </a:t>
+            </a:r>
+            <a:r>
+              <a:rPr lang="en-US" dirty="0" err="1"/>
+              <a:t>otra</a:t>
+            </a:r>
+            <a:r>
+              <a:rPr lang="en-US" dirty="0"/>
+              <a:t> </a:t>
+            </a:r>
+            <a:r>
+              <a:rPr lang="en-US" dirty="0" err="1"/>
+              <a:t>convencion</a:t>
+            </a:r>
+            <a:r>
+              <a:rPr lang="en-US" dirty="0"/>
+              <a:t>)</a:t>
+            </a:r>
+          </a:p>
+          <a:p>
+            <a:r>
+              <a:rPr lang="en-US" b="1" dirty="0"/>
+              <a:t>-----3 /4</a:t>
+            </a:r>
+          </a:p>
+          <a:p>
+            <a:pPr marL="171450" indent="-171450">
+              <a:buFont typeface="Arial" panose="020B0604020202020204" pitchFamily="34" charset="0"/>
+              <a:buChar char="•"/>
+            </a:pPr>
+            <a:r>
+              <a:rPr lang="en-US" dirty="0" err="1"/>
+              <a:t>Pistas</a:t>
+            </a:r>
+            <a:r>
+              <a:rPr lang="en-US" dirty="0"/>
+              <a:t> </a:t>
+            </a:r>
+            <a:r>
+              <a:rPr lang="en-US" dirty="0" err="1"/>
+              <a:t>activadas</a:t>
+            </a:r>
+            <a:r>
+              <a:rPr lang="en-US" dirty="0"/>
+              <a:t> para </a:t>
+            </a:r>
+            <a:r>
+              <a:rPr lang="en-US" dirty="0" err="1"/>
+              <a:t>seguir</a:t>
+            </a:r>
+            <a:endParaRPr lang="en-US" dirty="0"/>
+          </a:p>
+          <a:p>
+            <a:pPr marL="171450" indent="-171450">
+              <a:buFont typeface="Arial" panose="020B0604020202020204" pitchFamily="34" charset="0"/>
+              <a:buChar char="•"/>
+            </a:pPr>
+            <a:r>
+              <a:rPr lang="en-US" dirty="0"/>
+              <a:t>Todo con </a:t>
+            </a:r>
+            <a:r>
+              <a:rPr lang="en-US" dirty="0" err="1"/>
+              <a:t>meiHead</a:t>
+            </a:r>
+            <a:r>
+              <a:rPr lang="en-US" dirty="0"/>
+              <a:t> y music mas </a:t>
+            </a:r>
+            <a:r>
+              <a:rPr lang="en-US" dirty="0" err="1"/>
+              <a:t>explicado</a:t>
+            </a:r>
+            <a:r>
+              <a:rPr lang="en-US" dirty="0"/>
+              <a:t> a </a:t>
+            </a:r>
+            <a:r>
+              <a:rPr lang="en-US" dirty="0" err="1"/>
+              <a:t>pedazos</a:t>
+            </a:r>
+            <a:endParaRPr lang="en-US" dirty="0"/>
+          </a:p>
+          <a:p>
+            <a:pPr marL="171450" indent="-171450">
+              <a:buFont typeface="Arial" panose="020B0604020202020204" pitchFamily="34" charset="0"/>
+              <a:buChar char="•"/>
+            </a:pPr>
+            <a:r>
+              <a:rPr lang="en-US" dirty="0"/>
+              <a:t>Y </a:t>
+            </a:r>
+            <a:r>
+              <a:rPr lang="en-US" dirty="0" err="1"/>
+              <a:t>compartir</a:t>
+            </a:r>
+            <a:r>
+              <a:rPr lang="en-US" dirty="0"/>
+              <a:t> </a:t>
+            </a:r>
+            <a:r>
+              <a:rPr lang="en-US" dirty="0" err="1"/>
+              <a:t>pantalla</a:t>
+            </a:r>
+            <a:r>
+              <a:rPr lang="en-US" dirty="0"/>
+              <a:t> </a:t>
+            </a:r>
+            <a:r>
+              <a:rPr lang="en-US" dirty="0" err="1"/>
+              <a:t>alguien</a:t>
+            </a:r>
+            <a:r>
+              <a:rPr lang="en-US" dirty="0"/>
+              <a:t> mas para </a:t>
+            </a:r>
+            <a:r>
+              <a:rPr lang="en-US" dirty="0" err="1"/>
+              <a:t>hacer</a:t>
+            </a:r>
+            <a:r>
+              <a:rPr lang="en-US" dirty="0"/>
+              <a:t> </a:t>
+            </a:r>
+            <a:r>
+              <a:rPr lang="en-US" dirty="0" err="1"/>
+              <a:t>el</a:t>
+            </a:r>
+            <a:r>
+              <a:rPr lang="en-US" dirty="0"/>
+              <a:t> </a:t>
+            </a:r>
+            <a:r>
+              <a:rPr lang="en-US" dirty="0" err="1"/>
+              <a:t>ejercicio</a:t>
+            </a:r>
+            <a:endParaRPr lang="en-US" dirty="0"/>
+          </a:p>
+          <a:p>
+            <a:r>
+              <a:rPr lang="en-US" b="1" dirty="0"/>
+              <a:t>-----4 /5</a:t>
+            </a:r>
+          </a:p>
+          <a:p>
+            <a:pPr marL="171450" indent="-171450">
+              <a:buFont typeface="Arial" panose="020B0604020202020204" pitchFamily="34" charset="0"/>
+              <a:buChar char="•"/>
+            </a:pPr>
+            <a:r>
+              <a:rPr lang="en-US" dirty="0" err="1"/>
+              <a:t>Otro</a:t>
+            </a:r>
+            <a:r>
+              <a:rPr lang="en-US" dirty="0"/>
+              <a:t> </a:t>
+            </a:r>
+            <a:r>
+              <a:rPr lang="en-US" dirty="0" err="1"/>
+              <a:t>tambien</a:t>
+            </a:r>
+            <a:r>
+              <a:rPr lang="en-US" dirty="0"/>
+              <a:t> </a:t>
+            </a:r>
+            <a:r>
+              <a:rPr lang="en-US" dirty="0" err="1"/>
+              <a:t>compartido</a:t>
+            </a:r>
+            <a:r>
+              <a:rPr lang="en-US" dirty="0"/>
+              <a:t> </a:t>
+            </a:r>
+            <a:r>
+              <a:rPr lang="en-US" dirty="0" err="1"/>
+              <a:t>por</a:t>
+            </a:r>
+            <a:r>
+              <a:rPr lang="en-US" dirty="0"/>
+              <a:t> la </a:t>
+            </a:r>
+            <a:r>
+              <a:rPr lang="en-US" dirty="0" err="1"/>
+              <a:t>misma</a:t>
+            </a:r>
+            <a:r>
+              <a:rPr lang="en-US" dirty="0"/>
+              <a:t> persona</a:t>
+            </a:r>
+          </a:p>
+          <a:p>
+            <a:r>
+              <a:rPr lang="en-US" b="1" dirty="0"/>
+              <a:t>-----5 /6</a:t>
+            </a:r>
+          </a:p>
+          <a:p>
+            <a:pPr marL="171450" indent="-171450">
+              <a:buFont typeface="Arial" panose="020B0604020202020204" pitchFamily="34" charset="0"/>
+              <a:buChar char="•"/>
+            </a:pPr>
+            <a:r>
+              <a:rPr lang="en-US" dirty="0"/>
+              <a:t>Primer </a:t>
+            </a:r>
+            <a:r>
+              <a:rPr lang="en-US" dirty="0" err="1"/>
+              <a:t>archivo</a:t>
+            </a:r>
+            <a:r>
+              <a:rPr lang="en-US" dirty="0"/>
+              <a:t> MEI, </a:t>
+            </a:r>
+            <a:r>
+              <a:rPr lang="en-US" dirty="0" err="1"/>
+              <a:t>el</a:t>
+            </a:r>
+            <a:r>
+              <a:rPr lang="en-US" dirty="0"/>
+              <a:t> mas </a:t>
+            </a:r>
+            <a:r>
+              <a:rPr lang="en-US" dirty="0" err="1"/>
+              <a:t>minimalista</a:t>
+            </a:r>
+            <a:r>
+              <a:rPr lang="en-US" dirty="0"/>
+              <a:t>, </a:t>
+            </a:r>
+            <a:r>
+              <a:rPr lang="en-US" dirty="0" err="1"/>
+              <a:t>pero</a:t>
+            </a:r>
+            <a:r>
+              <a:rPr lang="en-US" dirty="0"/>
+              <a:t> que </a:t>
+            </a:r>
+            <a:r>
+              <a:rPr lang="en-US" dirty="0" err="1"/>
+              <a:t>sigue</a:t>
+            </a:r>
+            <a:r>
+              <a:rPr lang="en-US" dirty="0"/>
+              <a:t> </a:t>
+            </a:r>
+            <a:r>
+              <a:rPr lang="en-US" dirty="0" err="1"/>
+              <a:t>siendo</a:t>
+            </a:r>
+            <a:r>
+              <a:rPr lang="en-US" dirty="0"/>
+              <a:t> un </a:t>
+            </a:r>
+            <a:r>
+              <a:rPr lang="en-US" dirty="0" err="1"/>
+              <a:t>archivo</a:t>
+            </a:r>
+            <a:r>
+              <a:rPr lang="en-US" dirty="0"/>
+              <a:t> MEI </a:t>
+            </a:r>
+            <a:r>
+              <a:rPr lang="en-US" dirty="0" err="1"/>
+              <a:t>valido</a:t>
+            </a:r>
+            <a:r>
+              <a:rPr lang="en-US" dirty="0"/>
+              <a:t>, que se </a:t>
+            </a:r>
+            <a:r>
+              <a:rPr lang="en-US" dirty="0" err="1"/>
+              <a:t>conforma</a:t>
+            </a:r>
+            <a:r>
+              <a:rPr lang="en-US" dirty="0"/>
+              <a:t> con </a:t>
+            </a:r>
+            <a:r>
+              <a:rPr lang="en-US" dirty="0" err="1"/>
+              <a:t>el</a:t>
+            </a:r>
+            <a:r>
+              <a:rPr lang="en-US" dirty="0"/>
+              <a:t> </a:t>
+            </a:r>
+            <a:r>
+              <a:rPr lang="en-US" dirty="0" err="1"/>
+              <a:t>esquema</a:t>
+            </a:r>
+            <a:r>
+              <a:rPr lang="en-US" dirty="0"/>
+              <a:t> / con las </a:t>
+            </a:r>
+            <a:r>
+              <a:rPr lang="en-US" dirty="0" err="1"/>
+              <a:t>reglas</a:t>
+            </a:r>
+            <a:r>
+              <a:rPr lang="en-US" dirty="0"/>
+              <a:t> de MEI</a:t>
+            </a:r>
+          </a:p>
+          <a:p>
+            <a:pPr marL="171450" indent="-171450">
+              <a:buFont typeface="Arial" panose="020B0604020202020204" pitchFamily="34" charset="0"/>
+              <a:buChar char="•"/>
+            </a:pPr>
+            <a:r>
+              <a:rPr lang="en-US" dirty="0"/>
+              <a:t>Solo hay que </a:t>
+            </a:r>
+            <a:r>
+              <a:rPr lang="en-US" dirty="0" err="1"/>
+              <a:t>adaptarse</a:t>
+            </a:r>
+            <a:r>
+              <a:rPr lang="en-US" dirty="0"/>
+              <a:t> a la </a:t>
+            </a:r>
+            <a:r>
+              <a:rPr lang="en-US" dirty="0" err="1"/>
+              <a:t>estructura</a:t>
+            </a:r>
+            <a:r>
+              <a:rPr lang="en-US" dirty="0"/>
+              <a:t>, de </a:t>
+            </a:r>
+            <a:r>
+              <a:rPr lang="en-US" dirty="0" err="1"/>
+              <a:t>abrir</a:t>
+            </a:r>
+            <a:r>
+              <a:rPr lang="en-US" dirty="0"/>
+              <a:t> y </a:t>
+            </a:r>
+            <a:r>
+              <a:rPr lang="en-US" dirty="0" err="1"/>
+              <a:t>cerrar</a:t>
+            </a:r>
+            <a:r>
+              <a:rPr lang="en-US" dirty="0"/>
+              <a:t> </a:t>
+            </a:r>
+            <a:r>
+              <a:rPr lang="en-US" dirty="0" err="1"/>
+              <a:t>etiquetas</a:t>
+            </a:r>
+            <a:r>
+              <a:rPr lang="en-US" dirty="0"/>
+              <a:t>, y </a:t>
+            </a:r>
+            <a:r>
+              <a:rPr lang="en-US" dirty="0" err="1"/>
+              <a:t>cuales</a:t>
+            </a:r>
+            <a:r>
+              <a:rPr lang="en-US" dirty="0"/>
+              <a:t> </a:t>
+            </a:r>
+            <a:r>
+              <a:rPr lang="en-US" dirty="0" err="1"/>
+              <a:t>etiquetas</a:t>
+            </a:r>
+            <a:r>
+              <a:rPr lang="en-US" dirty="0"/>
+              <a:t> van </a:t>
+            </a:r>
+            <a:r>
+              <a:rPr lang="en-US" dirty="0" err="1"/>
+              <a:t>dentro</a:t>
+            </a:r>
+            <a:r>
+              <a:rPr lang="en-US" dirty="0"/>
+              <a:t> de </a:t>
+            </a:r>
+            <a:r>
+              <a:rPr lang="en-US" dirty="0" err="1"/>
+              <a:t>otras</a:t>
+            </a:r>
+            <a:r>
+              <a:rPr lang="en-US" dirty="0"/>
+              <a:t> </a:t>
+            </a:r>
+            <a:r>
+              <a:rPr lang="en-US" dirty="0">
+                <a:sym typeface="Wingdings" pitchFamily="2" charset="2"/>
+              </a:rPr>
+              <a:t> </a:t>
+            </a:r>
+            <a:r>
+              <a:rPr lang="en-US" dirty="0" err="1"/>
+              <a:t>Principios</a:t>
+            </a:r>
+            <a:r>
+              <a:rPr lang="en-US" dirty="0"/>
+              <a:t> de XML, que son la base de MEI</a:t>
+            </a:r>
+          </a:p>
+          <a:p>
+            <a:pPr marL="171450" indent="-171450">
+              <a:buFont typeface="Arial" panose="020B0604020202020204" pitchFamily="34" charset="0"/>
+              <a:buChar char="•"/>
+            </a:pPr>
+            <a:r>
+              <a:rPr lang="en-US" dirty="0"/>
+              <a:t>ULTIMO PUNTITO</a:t>
+            </a:r>
+          </a:p>
+          <a:p>
+            <a:endParaRPr lang="en-US" dirty="0"/>
+          </a:p>
+          <a:p>
+            <a:endParaRPr lang="en-US" dirty="0"/>
+          </a:p>
+          <a:p>
+            <a:r>
+              <a:rPr lang="en-US" b="1" dirty="0"/>
+              <a:t>==== SIGUIENTE TUTORIAL =====</a:t>
+            </a:r>
+          </a:p>
+          <a:p>
+            <a:endParaRPr lang="en-US" dirty="0"/>
+          </a:p>
+          <a:p>
+            <a:r>
+              <a:rPr lang="en-US" dirty="0" err="1"/>
+              <a:t>Empiezo</a:t>
+            </a:r>
+            <a:r>
+              <a:rPr lang="en-US" dirty="0"/>
+              <a:t> </a:t>
+            </a:r>
+            <a:r>
+              <a:rPr lang="en-US" dirty="0" err="1"/>
+              <a:t>yo</a:t>
+            </a:r>
+            <a:r>
+              <a:rPr lang="en-US" dirty="0"/>
+              <a:t> </a:t>
+            </a:r>
+            <a:r>
+              <a:rPr lang="en-US" dirty="0" err="1"/>
+              <a:t>otra</a:t>
+            </a:r>
+            <a:r>
+              <a:rPr lang="en-US" dirty="0"/>
+              <a:t> </a:t>
+            </a:r>
+            <a:r>
+              <a:rPr lang="en-US" dirty="0" err="1"/>
+              <a:t>vez</a:t>
+            </a:r>
+            <a:endParaRPr lang="en-US" dirty="0"/>
+          </a:p>
+          <a:p>
+            <a:endParaRPr lang="en-US" dirty="0"/>
+          </a:p>
+          <a:p>
+            <a:r>
+              <a:rPr lang="en-US" dirty="0" err="1"/>
+              <a:t>Estructua</a:t>
+            </a:r>
+            <a:r>
+              <a:rPr lang="en-US" dirty="0"/>
+              <a:t> de MEI </a:t>
+            </a:r>
+            <a:r>
+              <a:rPr lang="en-US" dirty="0">
+                <a:sym typeface="Wingdings" pitchFamily="2" charset="2"/>
+              </a:rPr>
+              <a:t> </a:t>
+            </a:r>
+            <a:r>
+              <a:rPr lang="en-US" dirty="0" err="1">
+                <a:sym typeface="Wingdings" pitchFamily="2" charset="2"/>
+              </a:rPr>
+              <a:t>Codificar</a:t>
+            </a:r>
+            <a:r>
+              <a:rPr lang="en-US" dirty="0">
+                <a:sym typeface="Wingdings" pitchFamily="2" charset="2"/>
+              </a:rPr>
+              <a:t> </a:t>
+            </a:r>
+            <a:r>
+              <a:rPr lang="en-US" dirty="0" err="1">
+                <a:sym typeface="Wingdings" pitchFamily="2" charset="2"/>
+              </a:rPr>
+              <a:t>musica</a:t>
+            </a:r>
+            <a:endParaRPr lang="en-US" dirty="0">
+              <a:sym typeface="Wingdings" pitchFamily="2" charset="2"/>
+            </a:endParaRPr>
+          </a:p>
+          <a:p>
+            <a:endParaRPr lang="en-US" dirty="0">
+              <a:sym typeface="Wingdings" pitchFamily="2" charset="2"/>
+            </a:endParaRPr>
+          </a:p>
+          <a:p>
+            <a:pPr marL="171450" indent="-171450">
+              <a:buFont typeface="Arial" panose="020B0604020202020204" pitchFamily="34" charset="0"/>
+              <a:buChar char="•"/>
+            </a:pPr>
+            <a:r>
+              <a:rPr lang="en-US" dirty="0">
+                <a:sym typeface="Wingdings" pitchFamily="2" charset="2"/>
+              </a:rPr>
+              <a:t>Solo </a:t>
+            </a:r>
+            <a:r>
+              <a:rPr lang="en-US" dirty="0" err="1">
+                <a:sym typeface="Wingdings" pitchFamily="2" charset="2"/>
+              </a:rPr>
+              <a:t>el</a:t>
+            </a:r>
+            <a:r>
+              <a:rPr lang="en-US" dirty="0">
+                <a:sym typeface="Wingdings" pitchFamily="2" charset="2"/>
+              </a:rPr>
+              <a:t> 2ndo </a:t>
+            </a:r>
+            <a:r>
+              <a:rPr lang="en-US" dirty="0" err="1">
+                <a:sym typeface="Wingdings" pitchFamily="2" charset="2"/>
+              </a:rPr>
+              <a:t>parrafo</a:t>
+            </a:r>
+            <a:r>
+              <a:rPr lang="en-US" dirty="0">
+                <a:sym typeface="Wingdings" pitchFamily="2" charset="2"/>
+              </a:rPr>
+              <a:t> (EL RENDERIZADO)</a:t>
+            </a:r>
+          </a:p>
+          <a:p>
+            <a:r>
+              <a:rPr lang="en-US" b="1" dirty="0">
+                <a:sym typeface="Wingdings" pitchFamily="2" charset="2"/>
+              </a:rPr>
+              <a:t>-----1 /2</a:t>
+            </a:r>
+          </a:p>
+          <a:p>
+            <a:pPr marL="171450" indent="-171450">
+              <a:buFont typeface="Arial" panose="020B0604020202020204" pitchFamily="34" charset="0"/>
+              <a:buChar char="•"/>
+            </a:pPr>
+            <a:r>
+              <a:rPr lang="en-US" dirty="0">
+                <a:sym typeface="Wingdings" pitchFamily="2" charset="2"/>
+              </a:rPr>
+              <a:t>TODO hasta la </a:t>
+            </a:r>
+            <a:r>
+              <a:rPr lang="en-US" dirty="0" err="1">
+                <a:sym typeface="Wingdings" pitchFamily="2" charset="2"/>
+              </a:rPr>
+              <a:t>Tarea</a:t>
+            </a:r>
+            <a:r>
+              <a:rPr lang="en-US" dirty="0">
+                <a:sym typeface="Wingdings" pitchFamily="2" charset="2"/>
+              </a:rPr>
+              <a:t>. </a:t>
+            </a:r>
+            <a:r>
+              <a:rPr lang="en-US" dirty="0" err="1">
+                <a:sym typeface="Wingdings" pitchFamily="2" charset="2"/>
+              </a:rPr>
+              <a:t>Hazlo</a:t>
+            </a:r>
+            <a:r>
+              <a:rPr lang="en-US" dirty="0">
+                <a:sym typeface="Wingdings" pitchFamily="2" charset="2"/>
+              </a:rPr>
+              <a:t> </a:t>
+            </a:r>
+            <a:r>
+              <a:rPr lang="en-US" dirty="0" err="1">
+                <a:sym typeface="Wingdings" pitchFamily="2" charset="2"/>
+              </a:rPr>
+              <a:t>tu</a:t>
+            </a:r>
+            <a:r>
+              <a:rPr lang="en-US" dirty="0">
+                <a:sym typeface="Wingdings" pitchFamily="2" charset="2"/>
+              </a:rPr>
+              <a:t>, con “</a:t>
+            </a:r>
+            <a:r>
+              <a:rPr lang="en-US" dirty="0" err="1">
+                <a:sym typeface="Wingdings" pitchFamily="2" charset="2"/>
+              </a:rPr>
+              <a:t>mostrar</a:t>
+            </a:r>
+            <a:r>
+              <a:rPr lang="en-US" dirty="0">
+                <a:sym typeface="Wingdings" pitchFamily="2" charset="2"/>
+              </a:rPr>
+              <a:t> la </a:t>
+            </a:r>
+            <a:r>
+              <a:rPr lang="en-US" dirty="0" err="1">
+                <a:sym typeface="Wingdings" pitchFamily="2" charset="2"/>
+              </a:rPr>
+              <a:t>pista</a:t>
+            </a:r>
+            <a:r>
+              <a:rPr lang="en-US" dirty="0">
+                <a:sym typeface="Wingdings" pitchFamily="2" charset="2"/>
+              </a:rPr>
+              <a:t>”</a:t>
+            </a:r>
+          </a:p>
+          <a:p>
+            <a:pPr marL="171450" indent="-171450">
+              <a:buFont typeface="Arial" panose="020B0604020202020204" pitchFamily="34" charset="0"/>
+              <a:buChar char="•"/>
+            </a:pPr>
+            <a:r>
+              <a:rPr lang="en-US" dirty="0" err="1">
+                <a:sym typeface="Wingdings" pitchFamily="2" charset="2"/>
+              </a:rPr>
+              <a:t>Completar</a:t>
+            </a:r>
+            <a:r>
+              <a:rPr lang="en-US" dirty="0">
+                <a:sym typeface="Wingdings" pitchFamily="2" charset="2"/>
+              </a:rPr>
+              <a:t> </a:t>
+            </a:r>
+          </a:p>
+          <a:p>
+            <a:pPr marL="171450" indent="-171450">
+              <a:buFont typeface="Arial" panose="020B0604020202020204" pitchFamily="34" charset="0"/>
+              <a:buChar char="•"/>
+            </a:pPr>
+            <a:r>
+              <a:rPr lang="en-US" dirty="0">
+                <a:sym typeface="Wingdings" pitchFamily="2" charset="2"/>
+              </a:rPr>
+              <a:t>Luego </a:t>
+            </a:r>
+            <a:r>
+              <a:rPr lang="en-US" dirty="0" err="1">
+                <a:sym typeface="Wingdings" pitchFamily="2" charset="2"/>
+              </a:rPr>
+              <a:t>pedir</a:t>
+            </a:r>
+            <a:r>
+              <a:rPr lang="en-US" dirty="0">
+                <a:sym typeface="Wingdings" pitchFamily="2" charset="2"/>
+              </a:rPr>
+              <a:t> a </a:t>
+            </a:r>
+            <a:r>
+              <a:rPr lang="en-US" dirty="0" err="1">
+                <a:sym typeface="Wingdings" pitchFamily="2" charset="2"/>
+              </a:rPr>
+              <a:t>alguien</a:t>
+            </a:r>
+            <a:r>
+              <a:rPr lang="en-US" dirty="0">
+                <a:sym typeface="Wingdings" pitchFamily="2" charset="2"/>
+              </a:rPr>
+              <a:t> mas que </a:t>
+            </a:r>
+            <a:r>
+              <a:rPr lang="en-US" dirty="0" err="1">
+                <a:sym typeface="Wingdings" pitchFamily="2" charset="2"/>
+              </a:rPr>
+              <a:t>comparta</a:t>
+            </a:r>
+            <a:r>
+              <a:rPr lang="en-US" dirty="0">
+                <a:sym typeface="Wingdings" pitchFamily="2" charset="2"/>
+              </a:rPr>
+              <a:t> la </a:t>
+            </a:r>
+            <a:r>
+              <a:rPr lang="en-US" dirty="0" err="1">
+                <a:sym typeface="Wingdings" pitchFamily="2" charset="2"/>
+              </a:rPr>
+              <a:t>pantalla</a:t>
+            </a:r>
+            <a:r>
+              <a:rPr lang="en-US" dirty="0">
+                <a:sym typeface="Wingdings" pitchFamily="2" charset="2"/>
+              </a:rPr>
+              <a:t> + </a:t>
+            </a:r>
+            <a:r>
+              <a:rPr lang="en-US" dirty="0" err="1">
+                <a:sym typeface="Wingdings" pitchFamily="2" charset="2"/>
+              </a:rPr>
+              <a:t>cambiar</a:t>
+            </a:r>
+            <a:r>
+              <a:rPr lang="en-US" dirty="0">
+                <a:sym typeface="Wingdings" pitchFamily="2" charset="2"/>
+              </a:rPr>
+              <a:t> </a:t>
+            </a:r>
+            <a:r>
+              <a:rPr lang="en-US" dirty="0" err="1">
+                <a:sym typeface="Wingdings" pitchFamily="2" charset="2"/>
+              </a:rPr>
+              <a:t>valores</a:t>
+            </a:r>
+            <a:r>
+              <a:rPr lang="en-US" dirty="0">
+                <a:sym typeface="Wingdings" pitchFamily="2" charset="2"/>
+              </a:rPr>
+              <a:t> para </a:t>
+            </a:r>
+            <a:r>
+              <a:rPr lang="en-US" dirty="0" err="1">
+                <a:sym typeface="Wingdings" pitchFamily="2" charset="2"/>
+              </a:rPr>
+              <a:t>ver</a:t>
+            </a:r>
+            <a:r>
+              <a:rPr lang="en-US" dirty="0">
+                <a:sym typeface="Wingdings" pitchFamily="2" charset="2"/>
+              </a:rPr>
+              <a:t> </a:t>
+            </a:r>
+            <a:r>
+              <a:rPr lang="en-US" dirty="0" err="1">
+                <a:sym typeface="Wingdings" pitchFamily="2" charset="2"/>
+              </a:rPr>
+              <a:t>como</a:t>
+            </a:r>
+            <a:r>
+              <a:rPr lang="en-US" dirty="0">
+                <a:sym typeface="Wingdings" pitchFamily="2" charset="2"/>
+              </a:rPr>
+              <a:t> </a:t>
+            </a:r>
+            <a:r>
+              <a:rPr lang="en-US" dirty="0" err="1">
+                <a:sym typeface="Wingdings" pitchFamily="2" charset="2"/>
+              </a:rPr>
+              <a:t>salta</a:t>
+            </a:r>
+            <a:r>
+              <a:rPr lang="en-US" dirty="0">
+                <a:sym typeface="Wingdings" pitchFamily="2" charset="2"/>
+              </a:rPr>
+              <a:t> la </a:t>
+            </a:r>
+            <a:r>
+              <a:rPr lang="en-US" dirty="0" err="1">
+                <a:sym typeface="Wingdings" pitchFamily="2" charset="2"/>
+              </a:rPr>
+              <a:t>notita</a:t>
+            </a:r>
+            <a:r>
+              <a:rPr lang="en-US" dirty="0">
+                <a:sym typeface="Wingdings" pitchFamily="2" charset="2"/>
+              </a:rPr>
+              <a:t>.</a:t>
+            </a:r>
+          </a:p>
+          <a:p>
+            <a:r>
+              <a:rPr lang="en-US" b="1" dirty="0">
+                <a:sym typeface="Wingdings" pitchFamily="2" charset="2"/>
+              </a:rPr>
+              <a:t>-----2 /3</a:t>
+            </a:r>
+          </a:p>
+          <a:p>
+            <a:pPr marL="0" indent="0">
+              <a:buFont typeface="Arial" panose="020B0604020202020204" pitchFamily="34" charset="0"/>
+              <a:buNone/>
+            </a:pPr>
+            <a:r>
+              <a:rPr lang="en-US" dirty="0" err="1"/>
+              <a:t>Sigue</a:t>
+            </a:r>
+            <a:r>
+              <a:rPr lang="en-US" dirty="0"/>
+              <a:t> </a:t>
+            </a:r>
+            <a:r>
+              <a:rPr lang="en-US" dirty="0" err="1"/>
+              <a:t>esa</a:t>
+            </a:r>
+            <a:r>
+              <a:rPr lang="en-US" dirty="0"/>
+              <a:t> persona</a:t>
+            </a:r>
+          </a:p>
+          <a:p>
+            <a:pPr marL="171450" indent="-171450">
+              <a:buFont typeface="Arial" panose="020B0604020202020204" pitchFamily="34" charset="0"/>
+              <a:buChar char="•"/>
+            </a:pPr>
+            <a:r>
+              <a:rPr lang="en-US" dirty="0" err="1"/>
+              <a:t>Varias</a:t>
+            </a:r>
+            <a:r>
+              <a:rPr lang="en-US" dirty="0"/>
+              <a:t> </a:t>
+            </a:r>
+            <a:r>
+              <a:rPr lang="en-US" dirty="0" err="1"/>
+              <a:t>notas</a:t>
+            </a:r>
+            <a:r>
+              <a:rPr lang="en-US" dirty="0"/>
+              <a:t> </a:t>
+            </a:r>
+            <a:r>
+              <a:rPr lang="en-US" dirty="0">
+                <a:sym typeface="Wingdings" pitchFamily="2" charset="2"/>
+              </a:rPr>
+              <a:t> </a:t>
+            </a:r>
+            <a:r>
+              <a:rPr lang="en-US" dirty="0" err="1">
+                <a:sym typeface="Wingdings" pitchFamily="2" charset="2"/>
+              </a:rPr>
+              <a:t>siempre</a:t>
+            </a:r>
+            <a:r>
+              <a:rPr lang="en-US" dirty="0">
+                <a:sym typeface="Wingdings" pitchFamily="2" charset="2"/>
+              </a:rPr>
+              <a:t> es </a:t>
+            </a:r>
+            <a:r>
+              <a:rPr lang="en-US" dirty="0" err="1">
+                <a:sym typeface="Wingdings" pitchFamily="2" charset="2"/>
+              </a:rPr>
+              <a:t>el</a:t>
+            </a:r>
+            <a:r>
+              <a:rPr lang="en-US" dirty="0">
+                <a:sym typeface="Wingdings" pitchFamily="2" charset="2"/>
+              </a:rPr>
+              <a:t> </a:t>
+            </a:r>
+            <a:r>
+              <a:rPr lang="en-US" dirty="0" err="1">
+                <a:sym typeface="Wingdings" pitchFamily="2" charset="2"/>
+              </a:rPr>
+              <a:t>mismo</a:t>
+            </a:r>
+            <a:r>
+              <a:rPr lang="en-US" dirty="0">
+                <a:sym typeface="Wingdings" pitchFamily="2" charset="2"/>
+              </a:rPr>
+              <a:t> </a:t>
+            </a:r>
+            <a:r>
+              <a:rPr lang="en-US" dirty="0" err="1">
+                <a:sym typeface="Wingdings" pitchFamily="2" charset="2"/>
+              </a:rPr>
+              <a:t>tipo</a:t>
+            </a:r>
+            <a:r>
+              <a:rPr lang="en-US" dirty="0">
+                <a:sym typeface="Wingdings" pitchFamily="2" charset="2"/>
+              </a:rPr>
+              <a:t> de nota, </a:t>
+            </a:r>
+            <a:r>
+              <a:rPr lang="en-US" dirty="0" err="1">
+                <a:sym typeface="Wingdings" pitchFamily="2" charset="2"/>
+              </a:rPr>
+              <a:t>una</a:t>
+            </a:r>
+            <a:r>
+              <a:rPr lang="en-US" dirty="0">
+                <a:sym typeface="Wingdings" pitchFamily="2" charset="2"/>
+              </a:rPr>
+              <a:t> </a:t>
+            </a:r>
+            <a:r>
+              <a:rPr lang="en-US" dirty="0" err="1">
+                <a:sym typeface="Wingdings" pitchFamily="2" charset="2"/>
+              </a:rPr>
+              <a:t>negra</a:t>
+            </a:r>
+            <a:r>
+              <a:rPr lang="en-US" dirty="0">
+                <a:sym typeface="Wingdings" pitchFamily="2" charset="2"/>
+              </a:rPr>
+              <a:t>, </a:t>
+            </a:r>
+            <a:r>
+              <a:rPr lang="en-US" dirty="0" err="1">
+                <a:sym typeface="Wingdings" pitchFamily="2" charset="2"/>
+              </a:rPr>
+              <a:t>pero</a:t>
+            </a:r>
+            <a:r>
+              <a:rPr lang="en-US" dirty="0">
+                <a:sym typeface="Wingdings" pitchFamily="2" charset="2"/>
+              </a:rPr>
+              <a:t> </a:t>
+            </a:r>
+            <a:r>
+              <a:rPr lang="en-US" dirty="0" err="1">
+                <a:sym typeface="Wingdings" pitchFamily="2" charset="2"/>
+              </a:rPr>
+              <a:t>diferentes</a:t>
+            </a:r>
+            <a:r>
+              <a:rPr lang="en-US" dirty="0">
+                <a:sym typeface="Wingdings" pitchFamily="2" charset="2"/>
+              </a:rPr>
+              <a:t> tonos</a:t>
+            </a:r>
+          </a:p>
+          <a:p>
+            <a:pPr marL="171450" indent="-171450">
+              <a:buFont typeface="Arial" panose="020B0604020202020204" pitchFamily="34" charset="0"/>
+              <a:buChar char="•"/>
+            </a:pPr>
+            <a:r>
+              <a:rPr lang="en-US" dirty="0">
+                <a:sym typeface="Wingdings" pitchFamily="2" charset="2"/>
+              </a:rPr>
+              <a:t>TODO </a:t>
+            </a:r>
+            <a:r>
+              <a:rPr lang="en-US" dirty="0" err="1">
+                <a:sym typeface="Wingdings" pitchFamily="2" charset="2"/>
+              </a:rPr>
+              <a:t>incluso</a:t>
+            </a:r>
+            <a:r>
+              <a:rPr lang="en-US" dirty="0">
+                <a:sym typeface="Wingdings" pitchFamily="2" charset="2"/>
+              </a:rPr>
+              <a:t> la </a:t>
+            </a:r>
+            <a:r>
+              <a:rPr lang="en-US" dirty="0" err="1">
+                <a:sym typeface="Wingdings" pitchFamily="2" charset="2"/>
+              </a:rPr>
+              <a:t>tarea</a:t>
+            </a:r>
+            <a:endParaRPr lang="en-US" dirty="0">
+              <a:sym typeface="Wingdings" pitchFamily="2" charset="2"/>
+            </a:endParaRPr>
+          </a:p>
+          <a:p>
+            <a:pPr marL="0" indent="0">
+              <a:buFont typeface="Arial" panose="020B0604020202020204" pitchFamily="34" charset="0"/>
+              <a:buNone/>
+            </a:pPr>
+            <a:r>
+              <a:rPr lang="en-US" b="1" dirty="0">
+                <a:sym typeface="Wingdings" pitchFamily="2" charset="2"/>
+              </a:rPr>
+              <a:t>------3 /4</a:t>
+            </a:r>
+          </a:p>
+          <a:p>
+            <a:pPr marL="171450" indent="-171450">
+              <a:buFont typeface="Arial" panose="020B0604020202020204" pitchFamily="34" charset="0"/>
+              <a:buChar char="•"/>
+            </a:pPr>
+            <a:r>
+              <a:rPr lang="en-US" dirty="0" err="1">
+                <a:sym typeface="Wingdings" pitchFamily="2" charset="2"/>
+              </a:rPr>
+              <a:t>Mismos</a:t>
+            </a:r>
+            <a:r>
+              <a:rPr lang="en-US" dirty="0">
+                <a:sym typeface="Wingdings" pitchFamily="2" charset="2"/>
+              </a:rPr>
+              <a:t> tonos que antes (no </a:t>
+            </a:r>
+            <a:r>
+              <a:rPr lang="en-US" dirty="0" err="1">
+                <a:sym typeface="Wingdings" pitchFamily="2" charset="2"/>
+              </a:rPr>
+              <a:t>tengo</a:t>
+            </a:r>
+            <a:r>
+              <a:rPr lang="en-US" dirty="0">
+                <a:sym typeface="Wingdings" pitchFamily="2" charset="2"/>
+              </a:rPr>
+              <a:t> que </a:t>
+            </a:r>
+            <a:r>
+              <a:rPr lang="en-US" dirty="0" err="1">
+                <a:sym typeface="Wingdings" pitchFamily="2" charset="2"/>
+              </a:rPr>
+              <a:t>cambiar</a:t>
+            </a:r>
+            <a:r>
+              <a:rPr lang="en-US" dirty="0">
+                <a:sym typeface="Wingdings" pitchFamily="2" charset="2"/>
+              </a:rPr>
+              <a:t> </a:t>
+            </a:r>
+            <a:r>
+              <a:rPr lang="en-US" dirty="0" err="1">
+                <a:sym typeface="Wingdings" pitchFamily="2" charset="2"/>
+              </a:rPr>
+              <a:t>pname</a:t>
+            </a:r>
+            <a:r>
+              <a:rPr lang="en-US" dirty="0">
+                <a:sym typeface="Wingdings" pitchFamily="2" charset="2"/>
+              </a:rPr>
+              <a:t>, </a:t>
+            </a:r>
+            <a:r>
+              <a:rPr lang="en-US" dirty="0" err="1">
+                <a:sym typeface="Wingdings" pitchFamily="2" charset="2"/>
+              </a:rPr>
+              <a:t>ni</a:t>
+            </a:r>
+            <a:r>
+              <a:rPr lang="en-US" dirty="0">
+                <a:sym typeface="Wingdings" pitchFamily="2" charset="2"/>
+              </a:rPr>
+              <a:t> octave)</a:t>
+            </a:r>
+          </a:p>
+          <a:p>
+            <a:pPr marL="171450" indent="-171450">
+              <a:buFont typeface="Arial" panose="020B0604020202020204" pitchFamily="34" charset="0"/>
+              <a:buChar char="•"/>
+            </a:pPr>
+            <a:r>
+              <a:rPr lang="en-US" dirty="0">
+                <a:sym typeface="Wingdings" pitchFamily="2" charset="2"/>
+              </a:rPr>
+              <a:t>Lo que hay que </a:t>
+            </a:r>
+            <a:r>
+              <a:rPr lang="en-US" dirty="0" err="1">
+                <a:sym typeface="Wingdings" pitchFamily="2" charset="2"/>
+              </a:rPr>
+              <a:t>cambiar</a:t>
+            </a:r>
+            <a:r>
+              <a:rPr lang="en-US" dirty="0">
+                <a:sym typeface="Wingdings" pitchFamily="2" charset="2"/>
+              </a:rPr>
+              <a:t> son las </a:t>
+            </a:r>
+            <a:r>
+              <a:rPr lang="en-US" dirty="0" err="1">
+                <a:sym typeface="Wingdings" pitchFamily="2" charset="2"/>
+              </a:rPr>
+              <a:t>duraciones</a:t>
+            </a:r>
+            <a:endParaRPr lang="en-US" dirty="0">
+              <a:sym typeface="Wingdings" pitchFamily="2" charset="2"/>
+            </a:endParaRPr>
+          </a:p>
+          <a:p>
+            <a:pPr marL="171450" indent="-171450">
+              <a:buFont typeface="Arial" panose="020B0604020202020204" pitchFamily="34" charset="0"/>
+              <a:buChar char="•"/>
+            </a:pPr>
+            <a:r>
+              <a:rPr lang="en-US" dirty="0"/>
+              <a:t>LA PARTE DE DOTS (ultima </a:t>
+            </a:r>
+            <a:r>
+              <a:rPr lang="en-US" dirty="0" err="1"/>
+              <a:t>oracion</a:t>
+            </a:r>
+            <a:r>
+              <a:rPr lang="en-US" dirty="0"/>
+              <a:t> de la </a:t>
+            </a:r>
+            <a:r>
+              <a:rPr lang="en-US" dirty="0" err="1"/>
+              <a:t>tarea</a:t>
+            </a:r>
+            <a:r>
+              <a:rPr lang="en-US" dirty="0"/>
+              <a:t>)</a:t>
+            </a:r>
+          </a:p>
+          <a:p>
+            <a:pPr marL="0" indent="0">
+              <a:buFont typeface="Arial" panose="020B0604020202020204" pitchFamily="34" charset="0"/>
+              <a:buNone/>
+            </a:pPr>
+            <a:r>
+              <a:rPr lang="en-US" b="1" dirty="0"/>
+              <a:t>------4 /5</a:t>
+            </a:r>
+          </a:p>
+          <a:p>
+            <a:pPr marL="0" indent="0">
+              <a:buFont typeface="Arial" panose="020B0604020202020204" pitchFamily="34" charset="0"/>
+              <a:buNone/>
+            </a:pPr>
+            <a:r>
+              <a:rPr lang="en-US" dirty="0"/>
+              <a:t>PARRAFO 1!</a:t>
+            </a:r>
+          </a:p>
+          <a:p>
+            <a:pPr marL="0" indent="0">
+              <a:buFont typeface="Arial" panose="020B0604020202020204" pitchFamily="34" charset="0"/>
+              <a:buNone/>
+            </a:pPr>
+            <a:r>
+              <a:rPr lang="en-US" b="1" dirty="0"/>
+              <a:t>=======</a:t>
+            </a:r>
+          </a:p>
+          <a:p>
+            <a:pPr marL="0" indent="0">
+              <a:buFont typeface="Arial" panose="020B0604020202020204" pitchFamily="34" charset="0"/>
+              <a:buNone/>
+            </a:pPr>
+            <a:endParaRPr lang="en-US" b="1" dirty="0"/>
+          </a:p>
+          <a:p>
+            <a:pPr marL="0" indent="0">
+              <a:buFont typeface="Arial" panose="020B0604020202020204" pitchFamily="34" charset="0"/>
+              <a:buNone/>
+            </a:pPr>
+            <a:endParaRPr lang="en-US" dirty="0"/>
+          </a:p>
+          <a:p>
+            <a:pPr marL="0" indent="0">
+              <a:buFont typeface="Arial" panose="020B0604020202020204" pitchFamily="34" charset="0"/>
+              <a:buNone/>
+            </a:pPr>
+            <a:r>
+              <a:rPr lang="en-US" b="1" dirty="0"/>
+              <a:t>MOSTRAR CODIFFICACION COMPLETA !!!!</a:t>
+            </a:r>
+          </a:p>
+          <a:p>
             <a:endParaRPr lang="en-US" dirty="0"/>
           </a:p>
         </p:txBody>
@@ -3525,7 +5022,7 @@
           <a:p>
             <a:fld id="{D72A4351-1B9A-5247-9733-F401CABD49E4}" type="datetime1">
               <a:rPr lang="en-CA" smtClean="0"/>
-              <a:t>2024-05-20</a:t>
+              <a:t>2024-10-03</a:t>
             </a:fld>
             <a:endParaRPr lang="en-US"/>
           </a:p>
@@ -3723,7 +5220,7 @@
           <a:p>
             <a:fld id="{55546085-FE39-024C-8828-93A4D8BEB30E}" type="datetime1">
               <a:rPr lang="en-CA" smtClean="0"/>
-              <a:t>2024-05-20</a:t>
+              <a:t>2024-10-03</a:t>
             </a:fld>
             <a:endParaRPr lang="en-US"/>
           </a:p>
@@ -3931,7 +5428,7 @@
           <a:p>
             <a:fld id="{1C91B419-4FDB-FC44-AE10-A5A74FFF9ACB}" type="datetime1">
               <a:rPr lang="en-CA" smtClean="0"/>
-              <a:t>2024-05-20</a:t>
+              <a:t>2024-10-03</a:t>
             </a:fld>
             <a:endParaRPr lang="en-US"/>
           </a:p>
@@ -4129,7 +5626,7 @@
           <a:p>
             <a:fld id="{73132208-7EE6-BD4F-9C6F-045F7F0FBCD4}" type="datetime1">
               <a:rPr lang="en-CA" smtClean="0"/>
-              <a:t>2024-05-20</a:t>
+              <a:t>2024-10-03</a:t>
             </a:fld>
             <a:endParaRPr lang="en-US"/>
           </a:p>
@@ -4404,7 +5901,7 @@
           <a:p>
             <a:fld id="{697AF1C9-F089-6A4B-B2BE-6DD92B88CA78}" type="datetime1">
               <a:rPr lang="en-CA" smtClean="0"/>
-              <a:t>2024-05-20</a:t>
+              <a:t>2024-10-03</a:t>
             </a:fld>
             <a:endParaRPr lang="en-US"/>
           </a:p>
@@ -4669,7 +6166,7 @@
           <a:p>
             <a:fld id="{0A21100E-15EE-D346-BC53-DA634AAD23C4}" type="datetime1">
               <a:rPr lang="en-CA" smtClean="0"/>
-              <a:t>2024-05-20</a:t>
+              <a:t>2024-10-03</a:t>
             </a:fld>
             <a:endParaRPr lang="en-US"/>
           </a:p>
@@ -5081,7 +6578,7 @@
           <a:p>
             <a:fld id="{FA8D015C-E953-9D43-BEE3-8A6F545454BC}" type="datetime1">
               <a:rPr lang="en-CA" smtClean="0"/>
-              <a:t>2024-05-20</a:t>
+              <a:t>2024-10-03</a:t>
             </a:fld>
             <a:endParaRPr lang="en-US"/>
           </a:p>
@@ -5222,7 +6719,7 @@
           <a:p>
             <a:fld id="{F91C8DD8-9ED3-4A4A-95B2-3E48AE13A99C}" type="datetime1">
               <a:rPr lang="en-CA" smtClean="0"/>
-              <a:t>2024-05-20</a:t>
+              <a:t>2024-10-03</a:t>
             </a:fld>
             <a:endParaRPr lang="en-US"/>
           </a:p>
@@ -5335,7 +6832,7 @@
           <a:p>
             <a:fld id="{5CC70C3F-E4CA-CD4B-93C3-F3E3B377CF21}" type="datetime1">
               <a:rPr lang="en-CA" smtClean="0"/>
-              <a:t>2024-05-20</a:t>
+              <a:t>2024-10-03</a:t>
             </a:fld>
             <a:endParaRPr lang="en-US"/>
           </a:p>
@@ -5646,7 +7143,7 @@
           <a:p>
             <a:fld id="{A83E720B-189A-1642-8004-F040DCFE2BE5}" type="datetime1">
               <a:rPr lang="en-CA" smtClean="0"/>
-              <a:t>2024-05-20</a:t>
+              <a:t>2024-10-03</a:t>
             </a:fld>
             <a:endParaRPr lang="en-US"/>
           </a:p>
@@ -5934,7 +7431,7 @@
           <a:p>
             <a:fld id="{94D07268-2AFA-974B-9F2C-D9A83B40191F}" type="datetime1">
               <a:rPr lang="en-CA" smtClean="0"/>
-              <a:t>2024-05-20</a:t>
+              <a:t>2024-10-03</a:t>
             </a:fld>
             <a:endParaRPr lang="en-US"/>
           </a:p>
@@ -6175,7 +7672,7 @@
           <a:p>
             <a:fld id="{7EECFB77-99B8-2E4E-8647-1EF115C287AD}" type="datetime1">
               <a:rPr lang="en-CA" smtClean="0"/>
-              <a:t>2024-05-20</a:t>
+              <a:t>2024-10-03</a:t>
             </a:fld>
             <a:endParaRPr lang="en-US"/>
           </a:p>
@@ -23502,13 +24999,7 @@
               <a:rPr lang="en-US" dirty="0" err="1">
                 <a:hlinkClick r:id="rId6"/>
               </a:rPr>
-              <a:t>ES.htm</a:t>
-            </a:r>
-            <a:r>
-              <a:rPr lang="en-US" dirty="0" err="1">
-                <a:hlinkClick r:id="rId6"/>
-              </a:rPr>
-              <a:t>l</a:t>
+              <a:t>ES.html</a:t>
             </a:r>
             <a:endParaRPr lang="en-US" dirty="0"/>
           </a:p>

</xml_diff>